<commit_message>
presentation last page updated
</commit_message>
<xml_diff>
--- a/Sales And Inventory Management System.pptx
+++ b/Sales And Inventory Management System.pptx
@@ -212,7 +212,7 @@
             <a:pPr rtl="0"/>
             <a:fld id="{8C8FA638-5455-4C32-A4C8-DEF71E47F8B7}" type="datetime1">
               <a:rPr lang="en-GB" smtClean="0"/>
-              <a:t>15/06/2023</a:t>
+              <a:t>20/06/2023</a:t>
             </a:fld>
             <a:endParaRPr lang="en-GB" dirty="0"/>
           </a:p>
@@ -381,7 +381,7 @@
             <a:fld id="{BD8FB18E-DED5-4D56-8319-667830F89FAD}" type="datetime1">
               <a:rPr lang="en-GB" smtClean="0"/>
               <a:pPr/>
-              <a:t>15/06/2023</a:t>
+              <a:t>20/06/2023</a:t>
             </a:fld>
             <a:endParaRPr lang="en-GB" dirty="0"/>
           </a:p>
@@ -1414,7 +1414,7 @@
             <a:pPr rtl="0"/>
             <a:fld id="{B6122F43-D8E4-4D72-B71C-BEADB581BA92}" type="datetime1">
               <a:rPr lang="en-GB" noProof="0" smtClean="0"/>
-              <a:t>15/06/2023</a:t>
+              <a:t>20/06/2023</a:t>
             </a:fld>
             <a:endParaRPr lang="en-GB" noProof="0" dirty="0"/>
           </a:p>
@@ -1711,7 +1711,7 @@
             <a:pPr rtl="0"/>
             <a:fld id="{13138419-1D08-4BE5-9CF7-B157F613FF31}" type="datetime1">
               <a:rPr lang="en-GB" noProof="0" smtClean="0"/>
-              <a:t>15/06/2023</a:t>
+              <a:t>20/06/2023</a:t>
             </a:fld>
             <a:endParaRPr lang="en-GB" noProof="0" dirty="0"/>
           </a:p>
@@ -1959,7 +1959,7 @@
             <a:pPr rtl="0"/>
             <a:fld id="{1B83ECF2-B140-4759-8515-1D852FDAEB2C}" type="datetime1">
               <a:rPr lang="en-GB" noProof="0" smtClean="0"/>
-              <a:t>15/06/2023</a:t>
+              <a:t>20/06/2023</a:t>
             </a:fld>
             <a:endParaRPr lang="en-GB" noProof="0" dirty="0"/>
           </a:p>
@@ -2499,7 +2499,7 @@
             <a:pPr rtl="0"/>
             <a:fld id="{DD22D497-1F26-4DF0-B354-872FCC4712F7}" type="datetime1">
               <a:rPr lang="en-GB" noProof="0" smtClean="0"/>
-              <a:t>15/06/2023</a:t>
+              <a:t>20/06/2023</a:t>
             </a:fld>
             <a:endParaRPr lang="en-GB" noProof="0" dirty="0"/>
           </a:p>
@@ -2747,7 +2747,7 @@
             <a:pPr rtl="0"/>
             <a:fld id="{81CAE508-7317-4D08-B748-FA7A328757F2}" type="datetime1">
               <a:rPr lang="en-GB" noProof="0" smtClean="0"/>
-              <a:t>15/06/2023</a:t>
+              <a:t>20/06/2023</a:t>
             </a:fld>
             <a:endParaRPr lang="en-GB" noProof="0" dirty="0"/>
           </a:p>
@@ -3279,7 +3279,7 @@
             <a:pPr rtl="0"/>
             <a:fld id="{839AD1B7-17CB-4083-AA3E-7C14CB746BBA}" type="datetime1">
               <a:rPr lang="en-GB" noProof="0" smtClean="0"/>
-              <a:t>15/06/2023</a:t>
+              <a:t>20/06/2023</a:t>
             </a:fld>
             <a:endParaRPr lang="en-GB" noProof="0" dirty="0"/>
           </a:p>
@@ -3575,7 +3575,7 @@
             <a:pPr rtl="0"/>
             <a:fld id="{C3B36315-EBE6-4A9D-A383-D6CD2A2EBB00}" type="datetime1">
               <a:rPr lang="en-GB" noProof="0" smtClean="0"/>
-              <a:t>15/06/2023</a:t>
+              <a:t>20/06/2023</a:t>
             </a:fld>
             <a:endParaRPr lang="en-GB" noProof="0" dirty="0"/>
           </a:p>
@@ -3749,7 +3749,7 @@
             <a:pPr rtl="0"/>
             <a:fld id="{53407383-3427-4575-B0AB-FC9F7CA42AAD}" type="datetime1">
               <a:rPr lang="en-GB" noProof="0" smtClean="0"/>
-              <a:t>15/06/2023</a:t>
+              <a:t>20/06/2023</a:t>
             </a:fld>
             <a:endParaRPr lang="en-GB" noProof="0" dirty="0"/>
           </a:p>
@@ -3929,7 +3929,7 @@
             <a:pPr rtl="0"/>
             <a:fld id="{926A8485-45A6-40DF-913D-0935769CD3C8}" type="datetime1">
               <a:rPr lang="en-GB" noProof="0" smtClean="0"/>
-              <a:t>15/06/2023</a:t>
+              <a:t>20/06/2023</a:t>
             </a:fld>
             <a:endParaRPr lang="en-GB" noProof="0" dirty="0"/>
           </a:p>
@@ -4038,7 +4038,7 @@
           <a:noFill/>
           <a:extLst>
             <a:ext uri="{909E8E84-426E-40dd-AFC4-6F175D3DCCD1}">
-              <a14:hiddenFill xmlns:a14="http://schemas.microsoft.com/office/drawing/2010/main" xmlns="">
+              <a14:hiddenFill xmlns="" xmlns:a14="http://schemas.microsoft.com/office/drawing/2010/main">
                 <a:solidFill>
                   <a:srgbClr val="FFFFFF"/>
                 </a:solidFill>
@@ -4098,7 +4098,7 @@
             </a:ln>
             <a:extLst>
               <a:ext uri="{91240B29-F687-4f45-9708-019B960494DF}">
-                <a14:hiddenLine xmlns:a14="http://schemas.microsoft.com/office/drawing/2010/main" xmlns="" w="9525">
+                <a14:hiddenLine xmlns="" xmlns:a14="http://schemas.microsoft.com/office/drawing/2010/main" w="9525">
                   <a:solidFill>
                     <a:srgbClr val="000000"/>
                   </a:solidFill>
@@ -4188,7 +4188,7 @@
             </a:ln>
             <a:extLst>
               <a:ext uri="{91240B29-F687-4f45-9708-019B960494DF}">
-                <a14:hiddenLine xmlns:a14="http://schemas.microsoft.com/office/drawing/2010/main" xmlns="" w="9525">
+                <a14:hiddenLine xmlns="" xmlns:a14="http://schemas.microsoft.com/office/drawing/2010/main" w="9525">
                   <a:solidFill>
                     <a:srgbClr val="000000"/>
                   </a:solidFill>
@@ -4278,7 +4278,7 @@
             </a:ln>
             <a:extLst>
               <a:ext uri="{91240B29-F687-4f45-9708-019B960494DF}">
-                <a14:hiddenLine xmlns:a14="http://schemas.microsoft.com/office/drawing/2010/main" xmlns="" w="9525">
+                <a14:hiddenLine xmlns="" xmlns:a14="http://schemas.microsoft.com/office/drawing/2010/main" w="9525">
                   <a:solidFill>
                     <a:srgbClr val="000000"/>
                   </a:solidFill>
@@ -4312,7 +4312,7 @@
             </a:ln>
             <a:extLst>
               <a:ext uri="{91240B29-F687-4f45-9708-019B960494DF}">
-                <a14:hiddenLine xmlns:a14="http://schemas.microsoft.com/office/drawing/2010/main" xmlns="" w="9525">
+                <a14:hiddenLine xmlns="" xmlns:a14="http://schemas.microsoft.com/office/drawing/2010/main" w="9525">
                   <a:solidFill>
                     <a:srgbClr val="000000"/>
                   </a:solidFill>
@@ -4402,7 +4402,7 @@
             </a:ln>
             <a:extLst>
               <a:ext uri="{91240B29-F687-4f45-9708-019B960494DF}">
-                <a14:hiddenLine xmlns:a14="http://schemas.microsoft.com/office/drawing/2010/main" xmlns="" w="9525">
+                <a14:hiddenLine xmlns="" xmlns:a14="http://schemas.microsoft.com/office/drawing/2010/main" w="9525">
                   <a:solidFill>
                     <a:srgbClr val="000000"/>
                   </a:solidFill>
@@ -4464,7 +4464,7 @@
             </a:ln>
             <a:extLst>
               <a:ext uri="{91240B29-F687-4f45-9708-019B960494DF}">
-                <a14:hiddenLine xmlns:a14="http://schemas.microsoft.com/office/drawing/2010/main" xmlns="" w="9525">
+                <a14:hiddenLine xmlns="" xmlns:a14="http://schemas.microsoft.com/office/drawing/2010/main" w="9525">
                   <a:solidFill>
                     <a:srgbClr val="000000"/>
                   </a:solidFill>
@@ -4526,7 +4526,7 @@
             </a:ln>
             <a:extLst>
               <a:ext uri="{91240B29-F687-4f45-9708-019B960494DF}">
-                <a14:hiddenLine xmlns:a14="http://schemas.microsoft.com/office/drawing/2010/main" xmlns="" w="9525">
+                <a14:hiddenLine xmlns="" xmlns:a14="http://schemas.microsoft.com/office/drawing/2010/main" w="9525">
                   <a:solidFill>
                     <a:srgbClr val="000000"/>
                   </a:solidFill>
@@ -4616,7 +4616,7 @@
             </a:ln>
             <a:extLst>
               <a:ext uri="{91240B29-F687-4f45-9708-019B960494DF}">
-                <a14:hiddenLine xmlns:a14="http://schemas.microsoft.com/office/drawing/2010/main" xmlns="" w="9525">
+                <a14:hiddenLine xmlns="" xmlns:a14="http://schemas.microsoft.com/office/drawing/2010/main" w="9525">
                   <a:solidFill>
                     <a:srgbClr val="000000"/>
                   </a:solidFill>
@@ -4678,7 +4678,7 @@
             </a:ln>
             <a:extLst>
               <a:ext uri="{91240B29-F687-4f45-9708-019B960494DF}">
-                <a14:hiddenLine xmlns:a14="http://schemas.microsoft.com/office/drawing/2010/main" xmlns="" w="9525">
+                <a14:hiddenLine xmlns="" xmlns:a14="http://schemas.microsoft.com/office/drawing/2010/main" w="9525">
                   <a:solidFill>
                     <a:srgbClr val="000000"/>
                   </a:solidFill>
@@ -4740,7 +4740,7 @@
             </a:ln>
             <a:extLst>
               <a:ext uri="{91240B29-F687-4f45-9708-019B960494DF}">
-                <a14:hiddenLine xmlns:a14="http://schemas.microsoft.com/office/drawing/2010/main" xmlns="" w="9525">
+                <a14:hiddenLine xmlns="" xmlns:a14="http://schemas.microsoft.com/office/drawing/2010/main" w="9525">
                   <a:solidFill>
                     <a:srgbClr val="000000"/>
                   </a:solidFill>
@@ -4830,7 +4830,7 @@
             </a:ln>
             <a:extLst>
               <a:ext uri="{91240B29-F687-4f45-9708-019B960494DF}">
-                <a14:hiddenLine xmlns:a14="http://schemas.microsoft.com/office/drawing/2010/main" xmlns="" w="9525">
+                <a14:hiddenLine xmlns="" xmlns:a14="http://schemas.microsoft.com/office/drawing/2010/main" w="9525">
                   <a:solidFill>
                     <a:srgbClr val="000000"/>
                   </a:solidFill>
@@ -4920,7 +4920,7 @@
             </a:ln>
             <a:extLst>
               <a:ext uri="{91240B29-F687-4f45-9708-019B960494DF}">
-                <a14:hiddenLine xmlns:a14="http://schemas.microsoft.com/office/drawing/2010/main" xmlns="" w="9525">
+                <a14:hiddenLine xmlns="" xmlns:a14="http://schemas.microsoft.com/office/drawing/2010/main" w="9525">
                   <a:solidFill>
                     <a:srgbClr val="000000"/>
                   </a:solidFill>
@@ -4982,7 +4982,7 @@
             </a:ln>
             <a:extLst>
               <a:ext uri="{91240B29-F687-4f45-9708-019B960494DF}">
-                <a14:hiddenLine xmlns:a14="http://schemas.microsoft.com/office/drawing/2010/main" xmlns="" w="9525">
+                <a14:hiddenLine xmlns="" xmlns:a14="http://schemas.microsoft.com/office/drawing/2010/main" w="9525">
                   <a:solidFill>
                     <a:srgbClr val="000000"/>
                   </a:solidFill>
@@ -5092,7 +5092,7 @@
             </a:ln>
             <a:extLst>
               <a:ext uri="{91240B29-F687-4f45-9708-019B960494DF}">
-                <a14:hiddenLine xmlns:a14="http://schemas.microsoft.com/office/drawing/2010/main" xmlns="" w="9525">
+                <a14:hiddenLine xmlns="" xmlns:a14="http://schemas.microsoft.com/office/drawing/2010/main" w="9525">
                   <a:solidFill>
                     <a:srgbClr val="000000"/>
                   </a:solidFill>
@@ -5154,7 +5154,7 @@
             </a:ln>
             <a:extLst>
               <a:ext uri="{91240B29-F687-4f45-9708-019B960494DF}">
-                <a14:hiddenLine xmlns:a14="http://schemas.microsoft.com/office/drawing/2010/main" xmlns="" w="9525">
+                <a14:hiddenLine xmlns="" xmlns:a14="http://schemas.microsoft.com/office/drawing/2010/main" w="9525">
                   <a:solidFill>
                     <a:srgbClr val="000000"/>
                   </a:solidFill>
@@ -5244,7 +5244,7 @@
             </a:ln>
             <a:extLst>
               <a:ext uri="{91240B29-F687-4f45-9708-019B960494DF}">
-                <a14:hiddenLine xmlns:a14="http://schemas.microsoft.com/office/drawing/2010/main" xmlns="" w="9525">
+                <a14:hiddenLine xmlns="" xmlns:a14="http://schemas.microsoft.com/office/drawing/2010/main" w="9525">
                   <a:solidFill>
                     <a:srgbClr val="000000"/>
                   </a:solidFill>
@@ -5334,7 +5334,7 @@
             </a:ln>
             <a:extLst>
               <a:ext uri="{91240B29-F687-4f45-9708-019B960494DF}">
-                <a14:hiddenLine xmlns:a14="http://schemas.microsoft.com/office/drawing/2010/main" xmlns="" w="9525">
+                <a14:hiddenLine xmlns="" xmlns:a14="http://schemas.microsoft.com/office/drawing/2010/main" w="9525">
                   <a:solidFill>
                     <a:srgbClr val="000000"/>
                   </a:solidFill>
@@ -5396,7 +5396,7 @@
             </a:ln>
             <a:extLst>
               <a:ext uri="{91240B29-F687-4f45-9708-019B960494DF}">
-                <a14:hiddenLine xmlns:a14="http://schemas.microsoft.com/office/drawing/2010/main" xmlns="" w="9525">
+                <a14:hiddenLine xmlns="" xmlns:a14="http://schemas.microsoft.com/office/drawing/2010/main" w="9525">
                   <a:solidFill>
                     <a:srgbClr val="000000"/>
                   </a:solidFill>
@@ -5486,7 +5486,7 @@
             </a:ln>
             <a:extLst>
               <a:ext uri="{91240B29-F687-4f45-9708-019B960494DF}">
-                <a14:hiddenLine xmlns:a14="http://schemas.microsoft.com/office/drawing/2010/main" xmlns="" w="9525">
+                <a14:hiddenLine xmlns="" xmlns:a14="http://schemas.microsoft.com/office/drawing/2010/main" w="9525">
                   <a:solidFill>
                     <a:srgbClr val="000000"/>
                   </a:solidFill>
@@ -5576,7 +5576,7 @@
             </a:ln>
             <a:extLst>
               <a:ext uri="{91240B29-F687-4f45-9708-019B960494DF}">
-                <a14:hiddenLine xmlns:a14="http://schemas.microsoft.com/office/drawing/2010/main" xmlns="" w="9525">
+                <a14:hiddenLine xmlns="" xmlns:a14="http://schemas.microsoft.com/office/drawing/2010/main" w="9525">
                   <a:solidFill>
                     <a:srgbClr val="000000"/>
                   </a:solidFill>
@@ -5632,7 +5632,7 @@
             </a:ln>
             <a:extLst>
               <a:ext uri="{91240B29-F687-4f45-9708-019B960494DF}">
-                <a14:hiddenLine xmlns:a14="http://schemas.microsoft.com/office/drawing/2010/main" xmlns="" w="9525">
+                <a14:hiddenLine xmlns="" xmlns:a14="http://schemas.microsoft.com/office/drawing/2010/main" w="9525">
                   <a:solidFill>
                     <a:srgbClr val="000000"/>
                   </a:solidFill>
@@ -5722,7 +5722,7 @@
             </a:ln>
             <a:extLst>
               <a:ext uri="{91240B29-F687-4f45-9708-019B960494DF}">
-                <a14:hiddenLine xmlns:a14="http://schemas.microsoft.com/office/drawing/2010/main" xmlns="" w="9525">
+                <a14:hiddenLine xmlns="" xmlns:a14="http://schemas.microsoft.com/office/drawing/2010/main" w="9525">
                   <a:solidFill>
                     <a:srgbClr val="000000"/>
                   </a:solidFill>
@@ -5778,7 +5778,7 @@
             </a:ln>
             <a:extLst>
               <a:ext uri="{91240B29-F687-4f45-9708-019B960494DF}">
-                <a14:hiddenLine xmlns:a14="http://schemas.microsoft.com/office/drawing/2010/main" xmlns="" w="9525">
+                <a14:hiddenLine xmlns="" xmlns:a14="http://schemas.microsoft.com/office/drawing/2010/main" w="9525">
                   <a:solidFill>
                     <a:srgbClr val="000000"/>
                   </a:solidFill>
@@ -5868,7 +5868,7 @@
             </a:ln>
             <a:extLst>
               <a:ext uri="{91240B29-F687-4f45-9708-019B960494DF}">
-                <a14:hiddenLine xmlns:a14="http://schemas.microsoft.com/office/drawing/2010/main" xmlns="" w="9525">
+                <a14:hiddenLine xmlns="" xmlns:a14="http://schemas.microsoft.com/office/drawing/2010/main" w="9525">
                   <a:solidFill>
                     <a:srgbClr val="000000"/>
                   </a:solidFill>
@@ -5936,7 +5936,7 @@
             </a:ln>
             <a:extLst>
               <a:ext uri="{91240B29-F687-4f45-9708-019B960494DF}">
-                <a14:hiddenLine xmlns:a14="http://schemas.microsoft.com/office/drawing/2010/main" xmlns="" w="9525">
+                <a14:hiddenLine xmlns="" xmlns:a14="http://schemas.microsoft.com/office/drawing/2010/main" w="9525">
                   <a:solidFill>
                     <a:srgbClr val="000000"/>
                   </a:solidFill>
@@ -6026,7 +6026,7 @@
             </a:ln>
             <a:extLst>
               <a:ext uri="{91240B29-F687-4f45-9708-019B960494DF}">
-                <a14:hiddenLine xmlns:a14="http://schemas.microsoft.com/office/drawing/2010/main" xmlns="" w="9525">
+                <a14:hiddenLine xmlns="" xmlns:a14="http://schemas.microsoft.com/office/drawing/2010/main" w="9525">
                   <a:solidFill>
                     <a:srgbClr val="000000"/>
                   </a:solidFill>
@@ -6094,7 +6094,7 @@
             </a:ln>
             <a:extLst>
               <a:ext uri="{91240B29-F687-4f45-9708-019B960494DF}">
-                <a14:hiddenLine xmlns:a14="http://schemas.microsoft.com/office/drawing/2010/main" xmlns="" w="9525">
+                <a14:hiddenLine xmlns="" xmlns:a14="http://schemas.microsoft.com/office/drawing/2010/main" w="9525">
                   <a:solidFill>
                     <a:srgbClr val="000000"/>
                   </a:solidFill>
@@ -6184,7 +6184,7 @@
             </a:ln>
             <a:extLst>
               <a:ext uri="{91240B29-F687-4f45-9708-019B960494DF}">
-                <a14:hiddenLine xmlns:a14="http://schemas.microsoft.com/office/drawing/2010/main" xmlns="" w="9525">
+                <a14:hiddenLine xmlns="" xmlns:a14="http://schemas.microsoft.com/office/drawing/2010/main" w="9525">
                   <a:solidFill>
                     <a:srgbClr val="000000"/>
                   </a:solidFill>
@@ -6218,7 +6218,7 @@
             </a:ln>
             <a:extLst>
               <a:ext uri="{91240B29-F687-4f45-9708-019B960494DF}">
-                <a14:hiddenLine xmlns:a14="http://schemas.microsoft.com/office/drawing/2010/main" xmlns="" w="9525">
+                <a14:hiddenLine xmlns="" xmlns:a14="http://schemas.microsoft.com/office/drawing/2010/main" w="9525">
                   <a:solidFill>
                     <a:srgbClr val="000000"/>
                   </a:solidFill>
@@ -6308,7 +6308,7 @@
             </a:ln>
             <a:extLst>
               <a:ext uri="{91240B29-F687-4f45-9708-019B960494DF}">
-                <a14:hiddenLine xmlns:a14="http://schemas.microsoft.com/office/drawing/2010/main" xmlns="" w="9525">
+                <a14:hiddenLine xmlns="" xmlns:a14="http://schemas.microsoft.com/office/drawing/2010/main" w="9525">
                   <a:solidFill>
                     <a:srgbClr val="000000"/>
                   </a:solidFill>
@@ -6370,7 +6370,7 @@
             </a:ln>
             <a:extLst>
               <a:ext uri="{91240B29-F687-4f45-9708-019B960494DF}">
-                <a14:hiddenLine xmlns:a14="http://schemas.microsoft.com/office/drawing/2010/main" xmlns="" w="9525">
+                <a14:hiddenLine xmlns="" xmlns:a14="http://schemas.microsoft.com/office/drawing/2010/main" w="9525">
                   <a:solidFill>
                     <a:srgbClr val="000000"/>
                   </a:solidFill>
@@ -6432,7 +6432,7 @@
             </a:ln>
             <a:extLst>
               <a:ext uri="{91240B29-F687-4f45-9708-019B960494DF}">
-                <a14:hiddenLine xmlns:a14="http://schemas.microsoft.com/office/drawing/2010/main" xmlns="" w="9525">
+                <a14:hiddenLine xmlns="" xmlns:a14="http://schemas.microsoft.com/office/drawing/2010/main" w="9525">
                   <a:solidFill>
                     <a:srgbClr val="000000"/>
                   </a:solidFill>
@@ -6522,7 +6522,7 @@
             </a:ln>
             <a:extLst>
               <a:ext uri="{91240B29-F687-4f45-9708-019B960494DF}">
-                <a14:hiddenLine xmlns:a14="http://schemas.microsoft.com/office/drawing/2010/main" xmlns="" w="9525">
+                <a14:hiddenLine xmlns="" xmlns:a14="http://schemas.microsoft.com/office/drawing/2010/main" w="9525">
                   <a:solidFill>
                     <a:srgbClr val="000000"/>
                   </a:solidFill>
@@ -6590,7 +6590,7 @@
             </a:ln>
             <a:extLst>
               <a:ext uri="{91240B29-F687-4f45-9708-019B960494DF}">
-                <a14:hiddenLine xmlns:a14="http://schemas.microsoft.com/office/drawing/2010/main" xmlns="" w="9525">
+                <a14:hiddenLine xmlns="" xmlns:a14="http://schemas.microsoft.com/office/drawing/2010/main" w="9525">
                   <a:solidFill>
                     <a:srgbClr val="000000"/>
                   </a:solidFill>
@@ -6652,7 +6652,7 @@
             </a:ln>
             <a:extLst>
               <a:ext uri="{91240B29-F687-4f45-9708-019B960494DF}">
-                <a14:hiddenLine xmlns:a14="http://schemas.microsoft.com/office/drawing/2010/main" xmlns="" w="9525">
+                <a14:hiddenLine xmlns="" xmlns:a14="http://schemas.microsoft.com/office/drawing/2010/main" w="9525">
                   <a:solidFill>
                     <a:srgbClr val="000000"/>
                   </a:solidFill>
@@ -6742,7 +6742,7 @@
             </a:ln>
             <a:extLst>
               <a:ext uri="{91240B29-F687-4f45-9708-019B960494DF}">
-                <a14:hiddenLine xmlns:a14="http://schemas.microsoft.com/office/drawing/2010/main" xmlns="" w="9525">
+                <a14:hiddenLine xmlns="" xmlns:a14="http://schemas.microsoft.com/office/drawing/2010/main" w="9525">
                   <a:solidFill>
                     <a:srgbClr val="000000"/>
                   </a:solidFill>
@@ -6804,7 +6804,7 @@
             </a:ln>
             <a:extLst>
               <a:ext uri="{91240B29-F687-4f45-9708-019B960494DF}">
-                <a14:hiddenLine xmlns:a14="http://schemas.microsoft.com/office/drawing/2010/main" xmlns="" w="9525">
+                <a14:hiddenLine xmlns="" xmlns:a14="http://schemas.microsoft.com/office/drawing/2010/main" w="9525">
                   <a:solidFill>
                     <a:srgbClr val="000000"/>
                   </a:solidFill>
@@ -6894,7 +6894,7 @@
             </a:ln>
             <a:extLst>
               <a:ext uri="{91240B29-F687-4f45-9708-019B960494DF}">
-                <a14:hiddenLine xmlns:a14="http://schemas.microsoft.com/office/drawing/2010/main" xmlns="" w="9525">
+                <a14:hiddenLine xmlns="" xmlns:a14="http://schemas.microsoft.com/office/drawing/2010/main" w="9525">
                   <a:solidFill>
                     <a:srgbClr val="000000"/>
                   </a:solidFill>
@@ -6956,7 +6956,7 @@
             </a:ln>
             <a:extLst>
               <a:ext uri="{91240B29-F687-4f45-9708-019B960494DF}">
-                <a14:hiddenLine xmlns:a14="http://schemas.microsoft.com/office/drawing/2010/main" xmlns="" w="9525">
+                <a14:hiddenLine xmlns="" xmlns:a14="http://schemas.microsoft.com/office/drawing/2010/main" w="9525">
                   <a:solidFill>
                     <a:srgbClr val="000000"/>
                   </a:solidFill>
@@ -7046,7 +7046,7 @@
             </a:ln>
             <a:extLst>
               <a:ext uri="{91240B29-F687-4f45-9708-019B960494DF}">
-                <a14:hiddenLine xmlns:a14="http://schemas.microsoft.com/office/drawing/2010/main" xmlns="" w="9525">
+                <a14:hiddenLine xmlns="" xmlns:a14="http://schemas.microsoft.com/office/drawing/2010/main" w="9525">
                   <a:solidFill>
                     <a:srgbClr val="000000"/>
                   </a:solidFill>
@@ -7080,7 +7080,7 @@
             </a:ln>
             <a:extLst>
               <a:ext uri="{91240B29-F687-4f45-9708-019B960494DF}">
-                <a14:hiddenLine xmlns:a14="http://schemas.microsoft.com/office/drawing/2010/main" xmlns="" w="9525">
+                <a14:hiddenLine xmlns="" xmlns:a14="http://schemas.microsoft.com/office/drawing/2010/main" w="9525">
                   <a:solidFill>
                     <a:srgbClr val="000000"/>
                   </a:solidFill>
@@ -7145,7 +7145,7 @@
             </a:ln>
             <a:extLst>
               <a:ext uri="{91240B29-F687-4f45-9708-019B960494DF}">
-                <a14:hiddenLine xmlns:a14="http://schemas.microsoft.com/office/drawing/2010/main" xmlns="" w="9525">
+                <a14:hiddenLine xmlns="" xmlns:a14="http://schemas.microsoft.com/office/drawing/2010/main" w="9525">
                   <a:solidFill>
                     <a:srgbClr val="000000"/>
                   </a:solidFill>
@@ -7235,7 +7235,7 @@
             </a:ln>
             <a:extLst>
               <a:ext uri="{91240B29-F687-4f45-9708-019B960494DF}">
-                <a14:hiddenLine xmlns:a14="http://schemas.microsoft.com/office/drawing/2010/main" xmlns="" w="9525">
+                <a14:hiddenLine xmlns="" xmlns:a14="http://schemas.microsoft.com/office/drawing/2010/main" w="9525">
                   <a:solidFill>
                     <a:srgbClr val="000000"/>
                   </a:solidFill>
@@ -7297,7 +7297,7 @@
             </a:ln>
             <a:extLst>
               <a:ext uri="{91240B29-F687-4f45-9708-019B960494DF}">
-                <a14:hiddenLine xmlns:a14="http://schemas.microsoft.com/office/drawing/2010/main" xmlns="" w="9525">
+                <a14:hiddenLine xmlns="" xmlns:a14="http://schemas.microsoft.com/office/drawing/2010/main" w="9525">
                   <a:solidFill>
                     <a:srgbClr val="000000"/>
                   </a:solidFill>
@@ -7387,7 +7387,7 @@
             </a:ln>
             <a:extLst>
               <a:ext uri="{91240B29-F687-4f45-9708-019B960494DF}">
-                <a14:hiddenLine xmlns:a14="http://schemas.microsoft.com/office/drawing/2010/main" xmlns="" w="9525">
+                <a14:hiddenLine xmlns="" xmlns:a14="http://schemas.microsoft.com/office/drawing/2010/main" w="9525">
                   <a:solidFill>
                     <a:srgbClr val="000000"/>
                   </a:solidFill>
@@ -7477,7 +7477,7 @@
             </a:ln>
             <a:extLst>
               <a:ext uri="{91240B29-F687-4f45-9708-019B960494DF}">
-                <a14:hiddenLine xmlns:a14="http://schemas.microsoft.com/office/drawing/2010/main" xmlns="" w="9525">
+                <a14:hiddenLine xmlns="" xmlns:a14="http://schemas.microsoft.com/office/drawing/2010/main" w="9525">
                   <a:solidFill>
                     <a:srgbClr val="000000"/>
                   </a:solidFill>
@@ -7542,7 +7542,7 @@
             </a:ln>
             <a:extLst>
               <a:ext uri="{91240B29-F687-4f45-9708-019B960494DF}">
-                <a14:hiddenLine xmlns:a14="http://schemas.microsoft.com/office/drawing/2010/main" xmlns="" w="9525">
+                <a14:hiddenLine xmlns="" xmlns:a14="http://schemas.microsoft.com/office/drawing/2010/main" w="9525">
                   <a:solidFill>
                     <a:srgbClr val="000000"/>
                   </a:solidFill>
@@ -7604,7 +7604,7 @@
             </a:ln>
             <a:extLst>
               <a:ext uri="{91240B29-F687-4f45-9708-019B960494DF}">
-                <a14:hiddenLine xmlns:a14="http://schemas.microsoft.com/office/drawing/2010/main" xmlns="" w="9525">
+                <a14:hiddenLine xmlns="" xmlns:a14="http://schemas.microsoft.com/office/drawing/2010/main" w="9525">
                   <a:solidFill>
                     <a:srgbClr val="000000"/>
                   </a:solidFill>
@@ -7694,7 +7694,7 @@
             </a:ln>
             <a:extLst>
               <a:ext uri="{91240B29-F687-4f45-9708-019B960494DF}">
-                <a14:hiddenLine xmlns:a14="http://schemas.microsoft.com/office/drawing/2010/main" xmlns="" w="9525">
+                <a14:hiddenLine xmlns="" xmlns:a14="http://schemas.microsoft.com/office/drawing/2010/main" w="9525">
                   <a:solidFill>
                     <a:srgbClr val="000000"/>
                   </a:solidFill>
@@ -7784,7 +7784,7 @@
             </a:ln>
             <a:extLst>
               <a:ext uri="{91240B29-F687-4f45-9708-019B960494DF}">
-                <a14:hiddenLine xmlns:a14="http://schemas.microsoft.com/office/drawing/2010/main" xmlns="" w="9525">
+                <a14:hiddenLine xmlns="" xmlns:a14="http://schemas.microsoft.com/office/drawing/2010/main" w="9525">
                   <a:solidFill>
                     <a:srgbClr val="000000"/>
                   </a:solidFill>
@@ -7846,7 +7846,7 @@
             </a:ln>
             <a:extLst>
               <a:ext uri="{91240B29-F687-4f45-9708-019B960494DF}">
-                <a14:hiddenLine xmlns:a14="http://schemas.microsoft.com/office/drawing/2010/main" xmlns="" w="9525">
+                <a14:hiddenLine xmlns="" xmlns:a14="http://schemas.microsoft.com/office/drawing/2010/main" w="9525">
                   <a:solidFill>
                     <a:srgbClr val="000000"/>
                   </a:solidFill>
@@ -7966,7 +7966,7 @@
             </a:ln>
             <a:extLst>
               <a:ext uri="{91240B29-F687-4f45-9708-019B960494DF}">
-                <a14:hiddenLine xmlns:a14="http://schemas.microsoft.com/office/drawing/2010/main" xmlns="" w="9525">
+                <a14:hiddenLine xmlns="" xmlns:a14="http://schemas.microsoft.com/office/drawing/2010/main" w="9525">
                   <a:solidFill>
                     <a:srgbClr val="000000"/>
                   </a:solidFill>
@@ -8034,7 +8034,7 @@
             </a:ln>
             <a:extLst>
               <a:ext uri="{91240B29-F687-4f45-9708-019B960494DF}">
-                <a14:hiddenLine xmlns:a14="http://schemas.microsoft.com/office/drawing/2010/main" xmlns="" w="9525">
+                <a14:hiddenLine xmlns="" xmlns:a14="http://schemas.microsoft.com/office/drawing/2010/main" w="9525">
                   <a:solidFill>
                     <a:srgbClr val="000000"/>
                   </a:solidFill>
@@ -8124,7 +8124,7 @@
             </a:ln>
             <a:extLst>
               <a:ext uri="{91240B29-F687-4f45-9708-019B960494DF}">
-                <a14:hiddenLine xmlns:a14="http://schemas.microsoft.com/office/drawing/2010/main" xmlns="" w="9525">
+                <a14:hiddenLine xmlns="" xmlns:a14="http://schemas.microsoft.com/office/drawing/2010/main" w="9525">
                   <a:solidFill>
                     <a:srgbClr val="000000"/>
                   </a:solidFill>
@@ -8265,7 +8265,7 @@
             <a:pPr rtl="0"/>
             <a:fld id="{B6122F43-D8E4-4D72-B71C-BEADB581BA92}" type="datetime1">
               <a:rPr lang="en-GB" noProof="0" smtClean="0"/>
-              <a:t>15/06/2023</a:t>
+              <a:t>20/06/2023</a:t>
             </a:fld>
             <a:endParaRPr lang="en-GB" noProof="0" dirty="0"/>
           </a:p>
@@ -8449,7 +8449,7 @@
             <a:pPr rtl="0"/>
             <a:fld id="{E8800FE2-65C8-4DC2-A2F6-9C236BCE11B6}" type="datetime1">
               <a:rPr lang="en-GB" noProof="0" smtClean="0"/>
-              <a:t>15/06/2023</a:t>
+              <a:t>20/06/2023</a:t>
             </a:fld>
             <a:endParaRPr lang="en-GB" noProof="0" dirty="0"/>
           </a:p>
@@ -8624,7 +8624,7 @@
             <a:pPr rtl="0"/>
             <a:fld id="{E8800FE2-65C8-4DC2-A2F6-9C236BCE11B6}" type="datetime1">
               <a:rPr lang="en-GB" noProof="0" smtClean="0"/>
-              <a:t>15/06/2023</a:t>
+              <a:t>20/06/2023</a:t>
             </a:fld>
             <a:endParaRPr lang="en-GB" noProof="0" dirty="0"/>
           </a:p>
@@ -8878,7 +8878,7 @@
             <a:pPr rtl="0"/>
             <a:fld id="{9EAC4B12-FF4F-4B0F-B49D-1D95A60E6059}" type="datetime1">
               <a:rPr lang="en-GB" noProof="0" smtClean="0"/>
-              <a:t>15/06/2023</a:t>
+              <a:t>20/06/2023</a:t>
             </a:fld>
             <a:endParaRPr lang="en-GB" noProof="0" dirty="0"/>
           </a:p>
@@ -9114,7 +9114,7 @@
             <a:pPr rtl="0"/>
             <a:fld id="{30FAAE8A-B70F-4344-95B0-FCFC673E6B70}" type="datetime1">
               <a:rPr lang="en-GB" noProof="0" smtClean="0"/>
-              <a:t>15/06/2023</a:t>
+              <a:t>20/06/2023</a:t>
             </a:fld>
             <a:endParaRPr lang="en-GB" noProof="0" dirty="0"/>
           </a:p>
@@ -9499,7 +9499,7 @@
             <a:pPr rtl="0"/>
             <a:fld id="{5EAE5AB8-E0EE-4529-9042-13F8EA4FCA1B}" type="datetime1">
               <a:rPr lang="en-GB" noProof="0" smtClean="0"/>
-              <a:t>15/06/2023</a:t>
+              <a:t>20/06/2023</a:t>
             </a:fld>
             <a:endParaRPr lang="en-GB" noProof="0" dirty="0"/>
           </a:p>
@@ -9621,7 +9621,7 @@
             <a:pPr rtl="0"/>
             <a:fld id="{067F6980-FBDF-47E7-A9A0-7D51CF19BC58}" type="datetime1">
               <a:rPr lang="en-GB" noProof="0" smtClean="0"/>
-              <a:t>15/06/2023</a:t>
+              <a:t>20/06/2023</a:t>
             </a:fld>
             <a:endParaRPr lang="en-GB" noProof="0" dirty="0"/>
           </a:p>
@@ -9720,7 +9720,7 @@
             <a:pPr rtl="0"/>
             <a:fld id="{DB2F54A5-82D7-4EC4-8346-7B245564B263}" type="datetime1">
               <a:rPr lang="en-GB" noProof="0" smtClean="0"/>
-              <a:t>15/06/2023</a:t>
+              <a:t>20/06/2023</a:t>
             </a:fld>
             <a:endParaRPr lang="en-GB" noProof="0" dirty="0"/>
           </a:p>
@@ -9973,7 +9973,7 @@
             <a:pPr rtl="0"/>
             <a:fld id="{558AD4CE-9003-43E6-84E8-9A172E90259F}" type="datetime1">
               <a:rPr lang="en-GB" noProof="0" smtClean="0"/>
-              <a:t>15/06/2023</a:t>
+              <a:t>20/06/2023</a:t>
             </a:fld>
             <a:endParaRPr lang="en-GB" noProof="0" dirty="0"/>
           </a:p>
@@ -10257,7 +10257,7 @@
             <a:pPr rtl="0"/>
             <a:fld id="{0E743C15-1F85-42AD-B2CA-CABBBF57FB0D}" type="datetime1">
               <a:rPr lang="en-GB" noProof="0" smtClean="0"/>
-              <a:t>15/06/2023</a:t>
+              <a:t>20/06/2023</a:t>
             </a:fld>
             <a:endParaRPr lang="en-GB" noProof="0" dirty="0"/>
           </a:p>
@@ -10518,7 +10518,7 @@
             <a:pPr rtl="0"/>
             <a:fld id="{13138419-1D08-4BE5-9CF7-B157F613FF31}" type="datetime1">
               <a:rPr lang="en-GB" noProof="0" smtClean="0"/>
-              <a:t>15/06/2023</a:t>
+              <a:t>20/06/2023</a:t>
             </a:fld>
             <a:endParaRPr lang="en-GB" noProof="0" dirty="0"/>
           </a:p>
@@ -10718,7 +10718,7 @@
             <a:pPr rtl="0"/>
             <a:fld id="{4E758538-EE2D-41E9-BC6C-040DE836FFCF}" type="datetime1">
               <a:rPr lang="en-GB" noProof="0" smtClean="0"/>
-              <a:t>15/06/2023</a:t>
+              <a:t>20/06/2023</a:t>
             </a:fld>
             <a:endParaRPr lang="en-GB" noProof="0" dirty="0"/>
           </a:p>
@@ -10986,7 +10986,7 @@
             <a:pPr rtl="0"/>
             <a:fld id="{4E758538-EE2D-41E9-BC6C-040DE836FFCF}" type="datetime1">
               <a:rPr lang="en-GB" noProof="0" smtClean="0"/>
-              <a:t>15/06/2023</a:t>
+              <a:t>20/06/2023</a:t>
             </a:fld>
             <a:endParaRPr lang="en-GB" noProof="0" dirty="0"/>
           </a:p>
@@ -11476,7 +11476,7 @@
             <a:pPr rtl="0"/>
             <a:fld id="{9EAC4B12-FF4F-4B0F-B49D-1D95A60E6059}" type="datetime1">
               <a:rPr lang="en-GB" noProof="0" smtClean="0"/>
-              <a:t>15/06/2023</a:t>
+              <a:t>20/06/2023</a:t>
             </a:fld>
             <a:endParaRPr lang="en-GB" noProof="0" dirty="0"/>
           </a:p>
@@ -11671,7 +11671,7 @@
             <a:pPr rtl="0"/>
             <a:fld id="{4E758538-EE2D-41E9-BC6C-040DE836FFCF}" type="datetime1">
               <a:rPr lang="en-GB" noProof="0" smtClean="0"/>
-              <a:t>15/06/2023</a:t>
+              <a:t>20/06/2023</a:t>
             </a:fld>
             <a:endParaRPr lang="en-GB" noProof="0" dirty="0"/>
           </a:p>
@@ -12222,7 +12222,7 @@
             <a:pPr rtl="0"/>
             <a:fld id="{4E758538-EE2D-41E9-BC6C-040DE836FFCF}" type="datetime1">
               <a:rPr lang="en-GB" noProof="0" smtClean="0"/>
-              <a:t>15/06/2023</a:t>
+              <a:t>20/06/2023</a:t>
             </a:fld>
             <a:endParaRPr lang="en-GB" noProof="0" dirty="0"/>
           </a:p>
@@ -12947,7 +12947,7 @@
             <a:pPr rtl="0"/>
             <a:fld id="{4E758538-EE2D-41E9-BC6C-040DE836FFCF}" type="datetime1">
               <a:rPr lang="en-GB" noProof="0" smtClean="0"/>
-              <a:t>15/06/2023</a:t>
+              <a:t>20/06/2023</a:t>
             </a:fld>
             <a:endParaRPr lang="en-GB" noProof="0" dirty="0"/>
           </a:p>
@@ -13122,7 +13122,7 @@
             <a:pPr rtl="0"/>
             <a:fld id="{53407383-3427-4575-B0AB-FC9F7CA42AAD}" type="datetime1">
               <a:rPr lang="en-GB" noProof="0" smtClean="0"/>
-              <a:t>15/06/2023</a:t>
+              <a:t>20/06/2023</a:t>
             </a:fld>
             <a:endParaRPr lang="en-GB" noProof="0" dirty="0"/>
           </a:p>
@@ -13306,7 +13306,7 @@
             <a:pPr rtl="0"/>
             <a:fld id="{926A8485-45A6-40DF-913D-0935769CD3C8}" type="datetime1">
               <a:rPr lang="en-GB" noProof="0" smtClean="0"/>
-              <a:t>15/06/2023</a:t>
+              <a:t>20/06/2023</a:t>
             </a:fld>
             <a:endParaRPr lang="en-GB" noProof="0" dirty="0"/>
           </a:p>
@@ -13608,7 +13608,7 @@
             <a:pPr rtl="0"/>
             <a:fld id="{30FAAE8A-B70F-4344-95B0-FCFC673E6B70}" type="datetime1">
               <a:rPr lang="en-GB" noProof="0" smtClean="0"/>
-              <a:t>15/06/2023</a:t>
+              <a:t>20/06/2023</a:t>
             </a:fld>
             <a:endParaRPr lang="en-GB" noProof="0" dirty="0"/>
           </a:p>
@@ -14050,7 +14050,7 @@
             <a:pPr rtl="0"/>
             <a:fld id="{5EAE5AB8-E0EE-4529-9042-13F8EA4FCA1B}" type="datetime1">
               <a:rPr lang="en-GB" noProof="0" smtClean="0"/>
-              <a:t>15/06/2023</a:t>
+              <a:t>20/06/2023</a:t>
             </a:fld>
             <a:endParaRPr lang="en-GB" noProof="0" dirty="0"/>
           </a:p>
@@ -14168,7 +14168,7 @@
             <a:pPr rtl="0"/>
             <a:fld id="{067F6980-FBDF-47E7-A9A0-7D51CF19BC58}" type="datetime1">
               <a:rPr lang="en-GB" noProof="0" smtClean="0"/>
-              <a:t>15/06/2023</a:t>
+              <a:t>20/06/2023</a:t>
             </a:fld>
             <a:endParaRPr lang="en-GB" noProof="0" dirty="0"/>
           </a:p>
@@ -14262,7 +14262,7 @@
             <a:pPr rtl="0"/>
             <a:fld id="{DB2F54A5-82D7-4EC4-8346-7B245564B263}" type="datetime1">
               <a:rPr lang="en-GB" noProof="0" smtClean="0"/>
-              <a:t>15/06/2023</a:t>
+              <a:t>20/06/2023</a:t>
             </a:fld>
             <a:endParaRPr lang="en-GB" noProof="0" dirty="0"/>
           </a:p>
@@ -14545,7 +14545,7 @@
             <a:pPr rtl="0"/>
             <a:fld id="{558AD4CE-9003-43E6-84E8-9A172E90259F}" type="datetime1">
               <a:rPr lang="en-GB" noProof="0" smtClean="0"/>
-              <a:t>15/06/2023</a:t>
+              <a:t>20/06/2023</a:t>
             </a:fld>
             <a:endParaRPr lang="en-GB" noProof="0" dirty="0"/>
           </a:p>
@@ -14837,7 +14837,7 @@
             <a:pPr rtl="0"/>
             <a:fld id="{0E743C15-1F85-42AD-B2CA-CABBBF57FB0D}" type="datetime1">
               <a:rPr lang="en-GB" noProof="0" smtClean="0"/>
-              <a:t>15/06/2023</a:t>
+              <a:t>20/06/2023</a:t>
             </a:fld>
             <a:endParaRPr lang="en-GB" noProof="0" dirty="0"/>
           </a:p>
@@ -15367,7 +15367,7 @@
             <a:pPr rtl="0"/>
             <a:fld id="{4E758538-EE2D-41E9-BC6C-040DE836FFCF}" type="datetime1">
               <a:rPr lang="en-GB" noProof="0" smtClean="0"/>
-              <a:t>15/06/2023</a:t>
+              <a:t>20/06/2023</a:t>
             </a:fld>
             <a:endParaRPr lang="en-GB" noProof="0" dirty="0"/>
           </a:p>
@@ -15935,7 +15935,7 @@
           <a:noFill/>
           <a:extLst>
             <a:ext uri="{909E8E84-426E-40dd-AFC4-6F175D3DCCD1}">
-              <a14:hiddenFill xmlns:a14="http://schemas.microsoft.com/office/drawing/2010/main" xmlns="">
+              <a14:hiddenFill xmlns="" xmlns:a14="http://schemas.microsoft.com/office/drawing/2010/main">
                 <a:solidFill>
                   <a:srgbClr val="FFFFFF"/>
                 </a:solidFill>
@@ -16009,7 +16009,7 @@
               </a:ln>
               <a:extLst>
                 <a:ext uri="{91240B29-F687-4f45-9708-019B960494DF}">
-                  <a14:hiddenLine xmlns:a14="http://schemas.microsoft.com/office/drawing/2010/main" xmlns="" w="9525">
+                  <a14:hiddenLine xmlns="" xmlns:a14="http://schemas.microsoft.com/office/drawing/2010/main" w="9525">
                     <a:solidFill>
                       <a:srgbClr val="000000"/>
                     </a:solidFill>
@@ -16099,7 +16099,7 @@
               </a:ln>
               <a:extLst>
                 <a:ext uri="{91240B29-F687-4f45-9708-019B960494DF}">
-                  <a14:hiddenLine xmlns:a14="http://schemas.microsoft.com/office/drawing/2010/main" xmlns="" w="9525">
+                  <a14:hiddenLine xmlns="" xmlns:a14="http://schemas.microsoft.com/office/drawing/2010/main" w="9525">
                     <a:solidFill>
                       <a:srgbClr val="000000"/>
                     </a:solidFill>
@@ -16189,7 +16189,7 @@
               </a:ln>
               <a:extLst>
                 <a:ext uri="{91240B29-F687-4f45-9708-019B960494DF}">
-                  <a14:hiddenLine xmlns:a14="http://schemas.microsoft.com/office/drawing/2010/main" xmlns="" w="9525">
+                  <a14:hiddenLine xmlns="" xmlns:a14="http://schemas.microsoft.com/office/drawing/2010/main" w="9525">
                     <a:solidFill>
                       <a:srgbClr val="000000"/>
                     </a:solidFill>
@@ -16251,7 +16251,7 @@
               </a:ln>
               <a:extLst>
                 <a:ext uri="{91240B29-F687-4f45-9708-019B960494DF}">
-                  <a14:hiddenLine xmlns:a14="http://schemas.microsoft.com/office/drawing/2010/main" xmlns="" w="9525">
+                  <a14:hiddenLine xmlns="" xmlns:a14="http://schemas.microsoft.com/office/drawing/2010/main" w="9525">
                     <a:solidFill>
                       <a:srgbClr val="000000"/>
                     </a:solidFill>
@@ -16341,7 +16341,7 @@
               </a:ln>
               <a:extLst>
                 <a:ext uri="{91240B29-F687-4f45-9708-019B960494DF}">
-                  <a14:hiddenLine xmlns:a14="http://schemas.microsoft.com/office/drawing/2010/main" xmlns="" w="9525">
+                  <a14:hiddenLine xmlns="" xmlns:a14="http://schemas.microsoft.com/office/drawing/2010/main" w="9525">
                     <a:solidFill>
                       <a:srgbClr val="000000"/>
                     </a:solidFill>
@@ -16403,7 +16403,7 @@
               </a:ln>
               <a:extLst>
                 <a:ext uri="{91240B29-F687-4f45-9708-019B960494DF}">
-                  <a14:hiddenLine xmlns:a14="http://schemas.microsoft.com/office/drawing/2010/main" xmlns="" w="9525">
+                  <a14:hiddenLine xmlns="" xmlns:a14="http://schemas.microsoft.com/office/drawing/2010/main" w="9525">
                     <a:solidFill>
                       <a:srgbClr val="000000"/>
                     </a:solidFill>
@@ -16465,7 +16465,7 @@
               </a:ln>
               <a:extLst>
                 <a:ext uri="{91240B29-F687-4f45-9708-019B960494DF}">
-                  <a14:hiddenLine xmlns:a14="http://schemas.microsoft.com/office/drawing/2010/main" xmlns="" w="9525">
+                  <a14:hiddenLine xmlns="" xmlns:a14="http://schemas.microsoft.com/office/drawing/2010/main" w="9525">
                     <a:solidFill>
                       <a:srgbClr val="000000"/>
                     </a:solidFill>
@@ -16555,7 +16555,7 @@
               </a:ln>
               <a:extLst>
                 <a:ext uri="{91240B29-F687-4f45-9708-019B960494DF}">
-                  <a14:hiddenLine xmlns:a14="http://schemas.microsoft.com/office/drawing/2010/main" xmlns="" w="9525">
+                  <a14:hiddenLine xmlns="" xmlns:a14="http://schemas.microsoft.com/office/drawing/2010/main" w="9525">
                     <a:solidFill>
                       <a:srgbClr val="000000"/>
                     </a:solidFill>
@@ -16645,7 +16645,7 @@
               </a:ln>
               <a:extLst>
                 <a:ext uri="{91240B29-F687-4f45-9708-019B960494DF}">
-                  <a14:hiddenLine xmlns:a14="http://schemas.microsoft.com/office/drawing/2010/main" xmlns="" w="9525">
+                  <a14:hiddenLine xmlns="" xmlns:a14="http://schemas.microsoft.com/office/drawing/2010/main" w="9525">
                     <a:solidFill>
                       <a:srgbClr val="000000"/>
                     </a:solidFill>
@@ -16707,7 +16707,7 @@
               </a:ln>
               <a:extLst>
                 <a:ext uri="{91240B29-F687-4f45-9708-019B960494DF}">
-                  <a14:hiddenLine xmlns:a14="http://schemas.microsoft.com/office/drawing/2010/main" xmlns="" w="9525">
+                  <a14:hiddenLine xmlns="" xmlns:a14="http://schemas.microsoft.com/office/drawing/2010/main" w="9525">
                     <a:solidFill>
                       <a:srgbClr val="000000"/>
                     </a:solidFill>
@@ -16817,7 +16817,7 @@
               </a:ln>
               <a:extLst>
                 <a:ext uri="{91240B29-F687-4f45-9708-019B960494DF}">
-                  <a14:hiddenLine xmlns:a14="http://schemas.microsoft.com/office/drawing/2010/main" xmlns="" w="9525">
+                  <a14:hiddenLine xmlns="" xmlns:a14="http://schemas.microsoft.com/office/drawing/2010/main" w="9525">
                     <a:solidFill>
                       <a:srgbClr val="000000"/>
                     </a:solidFill>
@@ -16901,7 +16901,7 @@
               </a:ln>
               <a:extLst>
                 <a:ext uri="{91240B29-F687-4f45-9708-019B960494DF}">
-                  <a14:hiddenLine xmlns:a14="http://schemas.microsoft.com/office/drawing/2010/main" xmlns="" w="9525">
+                  <a14:hiddenLine xmlns="" xmlns:a14="http://schemas.microsoft.com/office/drawing/2010/main" w="9525">
                     <a:solidFill>
                       <a:srgbClr val="000000"/>
                     </a:solidFill>
@@ -16963,7 +16963,7 @@
               </a:ln>
               <a:extLst>
                 <a:ext uri="{91240B29-F687-4f45-9708-019B960494DF}">
-                  <a14:hiddenLine xmlns:a14="http://schemas.microsoft.com/office/drawing/2010/main" xmlns="" w="9525">
+                  <a14:hiddenLine xmlns="" xmlns:a14="http://schemas.microsoft.com/office/drawing/2010/main" w="9525">
                     <a:solidFill>
                       <a:srgbClr val="000000"/>
                     </a:solidFill>
@@ -17025,7 +17025,7 @@
               </a:ln>
               <a:extLst>
                 <a:ext uri="{91240B29-F687-4f45-9708-019B960494DF}">
-                  <a14:hiddenLine xmlns:a14="http://schemas.microsoft.com/office/drawing/2010/main" xmlns="" w="9525">
+                  <a14:hiddenLine xmlns="" xmlns:a14="http://schemas.microsoft.com/office/drawing/2010/main" w="9525">
                     <a:solidFill>
                       <a:srgbClr val="000000"/>
                     </a:solidFill>
@@ -17115,7 +17115,7 @@
               </a:ln>
               <a:extLst>
                 <a:ext uri="{91240B29-F687-4f45-9708-019B960494DF}">
-                  <a14:hiddenLine xmlns:a14="http://schemas.microsoft.com/office/drawing/2010/main" xmlns="" w="9525">
+                  <a14:hiddenLine xmlns="" xmlns:a14="http://schemas.microsoft.com/office/drawing/2010/main" w="9525">
                     <a:solidFill>
                       <a:srgbClr val="000000"/>
                     </a:solidFill>
@@ -17149,7 +17149,7 @@
               </a:ln>
               <a:extLst>
                 <a:ext uri="{91240B29-F687-4f45-9708-019B960494DF}">
-                  <a14:hiddenLine xmlns:a14="http://schemas.microsoft.com/office/drawing/2010/main" xmlns="" w="9525">
+                  <a14:hiddenLine xmlns="" xmlns:a14="http://schemas.microsoft.com/office/drawing/2010/main" w="9525">
                     <a:solidFill>
                       <a:srgbClr val="000000"/>
                     </a:solidFill>
@@ -17214,7 +17214,7 @@
               </a:ln>
               <a:extLst>
                 <a:ext uri="{91240B29-F687-4f45-9708-019B960494DF}">
-                  <a14:hiddenLine xmlns:a14="http://schemas.microsoft.com/office/drawing/2010/main" xmlns="" w="9525">
+                  <a14:hiddenLine xmlns="" xmlns:a14="http://schemas.microsoft.com/office/drawing/2010/main" w="9525">
                     <a:solidFill>
                       <a:srgbClr val="000000"/>
                     </a:solidFill>
@@ -17304,7 +17304,7 @@
               </a:ln>
               <a:extLst>
                 <a:ext uri="{91240B29-F687-4f45-9708-019B960494DF}">
-                  <a14:hiddenLine xmlns:a14="http://schemas.microsoft.com/office/drawing/2010/main" xmlns="" w="9525">
+                  <a14:hiddenLine xmlns="" xmlns:a14="http://schemas.microsoft.com/office/drawing/2010/main" w="9525">
                     <a:solidFill>
                       <a:srgbClr val="000000"/>
                     </a:solidFill>
@@ -17366,7 +17366,7 @@
               </a:ln>
               <a:extLst>
                 <a:ext uri="{91240B29-F687-4f45-9708-019B960494DF}">
-                  <a14:hiddenLine xmlns:a14="http://schemas.microsoft.com/office/drawing/2010/main" xmlns="" w="9525">
+                  <a14:hiddenLine xmlns="" xmlns:a14="http://schemas.microsoft.com/office/drawing/2010/main" w="9525">
                     <a:solidFill>
                       <a:srgbClr val="000000"/>
                     </a:solidFill>
@@ -17456,7 +17456,7 @@
               </a:ln>
               <a:extLst>
                 <a:ext uri="{91240B29-F687-4f45-9708-019B960494DF}">
-                  <a14:hiddenLine xmlns:a14="http://schemas.microsoft.com/office/drawing/2010/main" xmlns="" w="9525">
+                  <a14:hiddenLine xmlns="" xmlns:a14="http://schemas.microsoft.com/office/drawing/2010/main" w="9525">
                     <a:solidFill>
                       <a:srgbClr val="000000"/>
                     </a:solidFill>
@@ -17521,7 +17521,7 @@
               </a:ln>
               <a:extLst>
                 <a:ext uri="{91240B29-F687-4f45-9708-019B960494DF}">
-                  <a14:hiddenLine xmlns:a14="http://schemas.microsoft.com/office/drawing/2010/main" xmlns="" w="9525">
+                  <a14:hiddenLine xmlns="" xmlns:a14="http://schemas.microsoft.com/office/drawing/2010/main" w="9525">
                     <a:solidFill>
                       <a:srgbClr val="000000"/>
                     </a:solidFill>
@@ -17583,7 +17583,7 @@
               </a:ln>
               <a:extLst>
                 <a:ext uri="{91240B29-F687-4f45-9708-019B960494DF}">
-                  <a14:hiddenLine xmlns:a14="http://schemas.microsoft.com/office/drawing/2010/main" xmlns="" w="9525">
+                  <a14:hiddenLine xmlns="" xmlns:a14="http://schemas.microsoft.com/office/drawing/2010/main" w="9525">
                     <a:solidFill>
                       <a:srgbClr val="000000"/>
                     </a:solidFill>
@@ -17673,7 +17673,7 @@
               </a:ln>
               <a:extLst>
                 <a:ext uri="{91240B29-F687-4f45-9708-019B960494DF}">
-                  <a14:hiddenLine xmlns:a14="http://schemas.microsoft.com/office/drawing/2010/main" xmlns="" w="9525">
+                  <a14:hiddenLine xmlns="" xmlns:a14="http://schemas.microsoft.com/office/drawing/2010/main" w="9525">
                     <a:solidFill>
                       <a:srgbClr val="000000"/>
                     </a:solidFill>
@@ -17763,7 +17763,7 @@
               </a:ln>
               <a:extLst>
                 <a:ext uri="{91240B29-F687-4f45-9708-019B960494DF}">
-                  <a14:hiddenLine xmlns:a14="http://schemas.microsoft.com/office/drawing/2010/main" xmlns="" w="9525">
+                  <a14:hiddenLine xmlns="" xmlns:a14="http://schemas.microsoft.com/office/drawing/2010/main" w="9525">
                     <a:solidFill>
                       <a:srgbClr val="000000"/>
                     </a:solidFill>
@@ -17828,7 +17828,7 @@
               </a:ln>
               <a:extLst>
                 <a:ext uri="{91240B29-F687-4f45-9708-019B960494DF}">
-                  <a14:hiddenLine xmlns:a14="http://schemas.microsoft.com/office/drawing/2010/main" xmlns="" w="9525">
+                  <a14:hiddenLine xmlns="" xmlns:a14="http://schemas.microsoft.com/office/drawing/2010/main" w="9525">
                     <a:solidFill>
                       <a:srgbClr val="000000"/>
                     </a:solidFill>
@@ -17948,7 +17948,7 @@
               </a:ln>
               <a:extLst>
                 <a:ext uri="{91240B29-F687-4f45-9708-019B960494DF}">
-                  <a14:hiddenLine xmlns:a14="http://schemas.microsoft.com/office/drawing/2010/main" xmlns="" w="9525">
+                  <a14:hiddenLine xmlns="" xmlns:a14="http://schemas.microsoft.com/office/drawing/2010/main" w="9525">
                     <a:solidFill>
                       <a:srgbClr val="000000"/>
                     </a:solidFill>
@@ -18046,7 +18046,7 @@
               </a:ln>
               <a:extLst>
                 <a:ext uri="{91240B29-F687-4f45-9708-019B960494DF}">
-                  <a14:hiddenLine xmlns:a14="http://schemas.microsoft.com/office/drawing/2010/main" xmlns="" w="9525">
+                  <a14:hiddenLine xmlns="" xmlns:a14="http://schemas.microsoft.com/office/drawing/2010/main" w="9525">
                     <a:solidFill>
                       <a:srgbClr val="000000"/>
                     </a:solidFill>
@@ -18161,7 +18161,7 @@
               </a:ln>
               <a:extLst>
                 <a:ext uri="{91240B29-F687-4f45-9708-019B960494DF}">
-                  <a14:hiddenLine xmlns:a14="http://schemas.microsoft.com/office/drawing/2010/main" xmlns="" w="9525">
+                  <a14:hiddenLine xmlns="" xmlns:a14="http://schemas.microsoft.com/office/drawing/2010/main" w="9525">
                     <a:solidFill>
                       <a:srgbClr val="000000"/>
                     </a:solidFill>
@@ -18251,7 +18251,7 @@
               </a:ln>
               <a:extLst>
                 <a:ext uri="{91240B29-F687-4f45-9708-019B960494DF}">
-                  <a14:hiddenLine xmlns:a14="http://schemas.microsoft.com/office/drawing/2010/main" xmlns="" w="9525">
+                  <a14:hiddenLine xmlns="" xmlns:a14="http://schemas.microsoft.com/office/drawing/2010/main" w="9525">
                     <a:solidFill>
                       <a:srgbClr val="000000"/>
                     </a:solidFill>
@@ -18316,7 +18316,7 @@
               </a:ln>
               <a:extLst>
                 <a:ext uri="{91240B29-F687-4f45-9708-019B960494DF}">
-                  <a14:hiddenLine xmlns:a14="http://schemas.microsoft.com/office/drawing/2010/main" xmlns="" w="9525">
+                  <a14:hiddenLine xmlns="" xmlns:a14="http://schemas.microsoft.com/office/drawing/2010/main" w="9525">
                     <a:solidFill>
                       <a:srgbClr val="000000"/>
                     </a:solidFill>
@@ -18406,7 +18406,7 @@
               </a:ln>
               <a:extLst>
                 <a:ext uri="{91240B29-F687-4f45-9708-019B960494DF}">
-                  <a14:hiddenLine xmlns:a14="http://schemas.microsoft.com/office/drawing/2010/main" xmlns="" w="9525">
+                  <a14:hiddenLine xmlns="" xmlns:a14="http://schemas.microsoft.com/office/drawing/2010/main" w="9525">
                     <a:solidFill>
                       <a:srgbClr val="000000"/>
                     </a:solidFill>
@@ -18474,7 +18474,7 @@
               </a:ln>
               <a:extLst>
                 <a:ext uri="{91240B29-F687-4f45-9708-019B960494DF}">
-                  <a14:hiddenLine xmlns:a14="http://schemas.microsoft.com/office/drawing/2010/main" xmlns="" w="9525">
+                  <a14:hiddenLine xmlns="" xmlns:a14="http://schemas.microsoft.com/office/drawing/2010/main" w="9525">
                     <a:solidFill>
                       <a:srgbClr val="000000"/>
                     </a:solidFill>
@@ -18564,7 +18564,7 @@
               </a:ln>
               <a:extLst>
                 <a:ext uri="{91240B29-F687-4f45-9708-019B960494DF}">
-                  <a14:hiddenLine xmlns:a14="http://schemas.microsoft.com/office/drawing/2010/main" xmlns="" w="9525">
+                  <a14:hiddenLine xmlns="" xmlns:a14="http://schemas.microsoft.com/office/drawing/2010/main" w="9525">
                     <a:solidFill>
                       <a:srgbClr val="000000"/>
                     </a:solidFill>
@@ -18632,7 +18632,7 @@
               </a:ln>
               <a:extLst>
                 <a:ext uri="{91240B29-F687-4f45-9708-019B960494DF}">
-                  <a14:hiddenLine xmlns:a14="http://schemas.microsoft.com/office/drawing/2010/main" xmlns="" w="9525">
+                  <a14:hiddenLine xmlns="" xmlns:a14="http://schemas.microsoft.com/office/drawing/2010/main" w="9525">
                     <a:solidFill>
                       <a:srgbClr val="000000"/>
                     </a:solidFill>
@@ -18722,7 +18722,7 @@
               </a:ln>
               <a:extLst>
                 <a:ext uri="{91240B29-F687-4f45-9708-019B960494DF}">
-                  <a14:hiddenLine xmlns:a14="http://schemas.microsoft.com/office/drawing/2010/main" xmlns="" w="9525">
+                  <a14:hiddenLine xmlns="" xmlns:a14="http://schemas.microsoft.com/office/drawing/2010/main" w="9525">
                     <a:solidFill>
                       <a:srgbClr val="000000"/>
                     </a:solidFill>
@@ -18756,7 +18756,7 @@
               </a:ln>
               <a:extLst>
                 <a:ext uri="{91240B29-F687-4f45-9708-019B960494DF}">
-                  <a14:hiddenLine xmlns:a14="http://schemas.microsoft.com/office/drawing/2010/main" xmlns="" w="9525">
+                  <a14:hiddenLine xmlns="" xmlns:a14="http://schemas.microsoft.com/office/drawing/2010/main" w="9525">
                     <a:solidFill>
                       <a:srgbClr val="000000"/>
                     </a:solidFill>
@@ -18897,7 +18897,7 @@
             <a:pPr rtl="0"/>
             <a:fld id="{4E758538-EE2D-41E9-BC6C-040DE836FFCF}" type="datetime1">
               <a:rPr lang="en-GB" noProof="0" smtClean="0"/>
-              <a:t>15/06/2023</a:t>
+              <a:t>20/06/2023</a:t>
             </a:fld>
             <a:endParaRPr lang="en-GB" noProof="0" dirty="0"/>
           </a:p>
@@ -21079,7 +21079,7 @@
         </p:spPr>
         <p:txBody>
           <a:bodyPr>
-            <a:normAutofit fontScale="85000" lnSpcReduction="20000"/>
+            <a:normAutofit fontScale="92500" lnSpcReduction="20000"/>
           </a:bodyPr>
           <a:lstStyle/>
           <a:p>
@@ -21121,49 +21121,340 @@
           <a:p>
             <a:r>
               <a:rPr lang="en-GB" dirty="0"/>
+              <a:t>Visual Studio Code</a:t>
+            </a:r>
+          </a:p>
+          <a:p>
+            <a:r>
+              <a:rPr lang="en-GB" dirty="0"/>
+              <a:t>UI Framework</a:t>
+            </a:r>
+          </a:p>
+          <a:p>
+            <a:r>
+              <a:rPr lang="en-GB" dirty="0"/>
+              <a:t>Bootstrap</a:t>
+            </a:r>
+          </a:p>
+          <a:p>
+            <a:r>
+              <a:rPr lang="en-GB" dirty="0"/>
+              <a:t>Database</a:t>
+            </a:r>
+          </a:p>
+          <a:p>
+            <a:r>
+              <a:rPr lang="en-GB" dirty="0"/>
+              <a:t>MySQL</a:t>
+            </a:r>
+          </a:p>
+          <a:p>
+            <a:r>
+              <a:rPr lang="en-GB" dirty="0"/>
+              <a:t>Web Server Solution</a:t>
+            </a:r>
+          </a:p>
+          <a:p>
+            <a:r>
+              <a:rPr lang="en-GB" dirty="0"/>
+              <a:t>WAMPP</a:t>
+            </a:r>
+          </a:p>
+        </p:txBody>
+      </p:sp>
+      <p:sp>
+        <p:nvSpPr>
+          <p:cNvPr id="4" name="TextBox 3">
+            <a:extLst>
+              <a:ext uri="{FF2B5EF4-FFF2-40B4-BE49-F238E27FC236}">
+                <a16:creationId xmlns:a16="http://schemas.microsoft.com/office/drawing/2014/main" id="{19F2F744-B3E0-D60E-DFCB-B5C8E6ECF287}"/>
+              </a:ext>
+            </a:extLst>
+          </p:cNvPr>
+          <p:cNvSpPr txBox="1"/>
+          <p:nvPr/>
+        </p:nvSpPr>
+        <p:spPr>
+          <a:xfrm>
+            <a:off x="1577076" y="4220308"/>
+            <a:ext cx="522900" cy="369332"/>
+          </a:xfrm>
+          <a:prstGeom prst="rect">
+            <a:avLst/>
+          </a:prstGeom>
+          <a:noFill/>
+        </p:spPr>
+        <p:txBody>
+          <a:bodyPr wrap="none" rtlCol="0">
+            <a:spAutoFit/>
+          </a:bodyPr>
+          <a:lstStyle/>
+          <a:p>
+            <a:r>
+              <a:rPr lang="en-GB" dirty="0"/>
               <a:t>IDE</a:t>
             </a:r>
           </a:p>
+        </p:txBody>
+      </p:sp>
+      <p:sp>
+        <p:nvSpPr>
+          <p:cNvPr id="5" name="Content Placeholder 2">
+            <a:extLst>
+              <a:ext uri="{FF2B5EF4-FFF2-40B4-BE49-F238E27FC236}">
+                <a16:creationId xmlns:a16="http://schemas.microsoft.com/office/drawing/2014/main" id="{8A12F7A5-40F2-A68C-F4F8-430A1A5F04A0}"/>
+              </a:ext>
+            </a:extLst>
+          </p:cNvPr>
+          <p:cNvSpPr txBox="1">
+            <a:spLocks/>
+          </p:cNvSpPr>
+          <p:nvPr/>
+        </p:nvSpPr>
+        <p:spPr>
+          <a:xfrm>
+            <a:off x="1577076" y="4600700"/>
+            <a:ext cx="2900664" cy="503582"/>
+          </a:xfrm>
+          <a:prstGeom prst="rect">
+            <a:avLst/>
+          </a:prstGeom>
+        </p:spPr>
+        <p:txBody>
+          <a:bodyPr vert="horz" lIns="91440" tIns="45720" rIns="91440" bIns="45720" rtlCol="0" anchor="ctr">
+            <a:normAutofit/>
+          </a:bodyPr>
+          <a:lstStyle>
+            <a:lvl1pPr marL="285750" indent="-285750" algn="l" defTabSz="457200" rtl="0" eaLnBrk="1" latinLnBrk="0" hangingPunct="1">
+              <a:spcBef>
+                <a:spcPct val="20000"/>
+              </a:spcBef>
+              <a:spcAft>
+                <a:spcPts val="600"/>
+              </a:spcAft>
+              <a:buClr>
+                <a:schemeClr val="accent1">
+                  <a:lumMod val="75000"/>
+                </a:schemeClr>
+              </a:buClr>
+              <a:buSzPct val="145000"/>
+              <a:buFont typeface="Arial"/>
+              <a:buChar char="•"/>
+              <a:defRPr sz="2400" kern="1200" cap="none">
+                <a:solidFill>
+                  <a:schemeClr val="tx1"/>
+                </a:solidFill>
+                <a:effectLst/>
+                <a:latin typeface="+mn-lt"/>
+                <a:ea typeface="+mn-ea"/>
+                <a:cs typeface="+mn-cs"/>
+              </a:defRPr>
+            </a:lvl1pPr>
+            <a:lvl2pPr marL="742950" indent="-285750" algn="l" defTabSz="457200" rtl="0" eaLnBrk="1" latinLnBrk="0" hangingPunct="1">
+              <a:spcBef>
+                <a:spcPct val="20000"/>
+              </a:spcBef>
+              <a:spcAft>
+                <a:spcPts val="600"/>
+              </a:spcAft>
+              <a:buClr>
+                <a:schemeClr val="accent1">
+                  <a:lumMod val="75000"/>
+                </a:schemeClr>
+              </a:buClr>
+              <a:buSzPct val="145000"/>
+              <a:buFont typeface="Arial"/>
+              <a:buChar char="•"/>
+              <a:defRPr sz="2000" kern="1200" cap="none">
+                <a:solidFill>
+                  <a:schemeClr val="tx1"/>
+                </a:solidFill>
+                <a:effectLst/>
+                <a:latin typeface="+mn-lt"/>
+                <a:ea typeface="+mn-ea"/>
+                <a:cs typeface="+mn-cs"/>
+              </a:defRPr>
+            </a:lvl2pPr>
+            <a:lvl3pPr marL="1200150" indent="-285750" algn="l" defTabSz="457200" rtl="0" eaLnBrk="1" latinLnBrk="0" hangingPunct="1">
+              <a:spcBef>
+                <a:spcPct val="20000"/>
+              </a:spcBef>
+              <a:spcAft>
+                <a:spcPts val="600"/>
+              </a:spcAft>
+              <a:buClr>
+                <a:schemeClr val="accent1">
+                  <a:lumMod val="75000"/>
+                </a:schemeClr>
+              </a:buClr>
+              <a:buSzPct val="145000"/>
+              <a:buFont typeface="Arial"/>
+              <a:buChar char="•"/>
+              <a:defRPr sz="1800" kern="1200" cap="none">
+                <a:solidFill>
+                  <a:schemeClr val="tx1"/>
+                </a:solidFill>
+                <a:effectLst/>
+                <a:latin typeface="+mn-lt"/>
+                <a:ea typeface="+mn-ea"/>
+                <a:cs typeface="+mn-cs"/>
+              </a:defRPr>
+            </a:lvl3pPr>
+            <a:lvl4pPr marL="1543050" indent="-171450" algn="l" defTabSz="457200" rtl="0" eaLnBrk="1" latinLnBrk="0" hangingPunct="1">
+              <a:spcBef>
+                <a:spcPct val="20000"/>
+              </a:spcBef>
+              <a:spcAft>
+                <a:spcPts val="600"/>
+              </a:spcAft>
+              <a:buClr>
+                <a:schemeClr val="accent1">
+                  <a:lumMod val="75000"/>
+                </a:schemeClr>
+              </a:buClr>
+              <a:buSzPct val="145000"/>
+              <a:buFont typeface="Arial"/>
+              <a:buChar char="•"/>
+              <a:defRPr sz="1600" kern="1200" cap="none">
+                <a:solidFill>
+                  <a:schemeClr val="tx1"/>
+                </a:solidFill>
+                <a:effectLst/>
+                <a:latin typeface="+mn-lt"/>
+                <a:ea typeface="+mn-ea"/>
+                <a:cs typeface="+mn-cs"/>
+              </a:defRPr>
+            </a:lvl4pPr>
+            <a:lvl5pPr marL="2000250" indent="-171450" algn="l" defTabSz="457200" rtl="0" eaLnBrk="1" latinLnBrk="0" hangingPunct="1">
+              <a:spcBef>
+                <a:spcPct val="20000"/>
+              </a:spcBef>
+              <a:spcAft>
+                <a:spcPts val="600"/>
+              </a:spcAft>
+              <a:buClr>
+                <a:schemeClr val="accent1">
+                  <a:lumMod val="75000"/>
+                </a:schemeClr>
+              </a:buClr>
+              <a:buSzPct val="145000"/>
+              <a:buFont typeface="Arial"/>
+              <a:buChar char="•"/>
+              <a:defRPr sz="1400" kern="1200" cap="none">
+                <a:solidFill>
+                  <a:schemeClr val="tx1"/>
+                </a:solidFill>
+                <a:effectLst/>
+                <a:latin typeface="+mn-lt"/>
+                <a:ea typeface="+mn-ea"/>
+                <a:cs typeface="+mn-cs"/>
+              </a:defRPr>
+            </a:lvl5pPr>
+            <a:lvl6pPr marL="2514600" indent="-228600" algn="l" defTabSz="457200" rtl="0" eaLnBrk="1" latinLnBrk="0" hangingPunct="1">
+              <a:spcBef>
+                <a:spcPct val="20000"/>
+              </a:spcBef>
+              <a:spcAft>
+                <a:spcPts val="600"/>
+              </a:spcAft>
+              <a:buClr>
+                <a:schemeClr val="accent1">
+                  <a:lumMod val="75000"/>
+                </a:schemeClr>
+              </a:buClr>
+              <a:buSzPct val="145000"/>
+              <a:buFont typeface="Arial"/>
+              <a:buChar char="•"/>
+              <a:defRPr sz="1400" kern="1200" cap="none">
+                <a:solidFill>
+                  <a:schemeClr val="tx1"/>
+                </a:solidFill>
+                <a:effectLst/>
+                <a:latin typeface="+mn-lt"/>
+                <a:ea typeface="+mn-ea"/>
+                <a:cs typeface="+mn-cs"/>
+              </a:defRPr>
+            </a:lvl6pPr>
+            <a:lvl7pPr marL="2971800" indent="-228600" algn="l" defTabSz="457200" rtl="0" eaLnBrk="1" latinLnBrk="0" hangingPunct="1">
+              <a:spcBef>
+                <a:spcPct val="20000"/>
+              </a:spcBef>
+              <a:spcAft>
+                <a:spcPts val="600"/>
+              </a:spcAft>
+              <a:buClr>
+                <a:schemeClr val="accent1">
+                  <a:lumMod val="75000"/>
+                </a:schemeClr>
+              </a:buClr>
+              <a:buSzPct val="145000"/>
+              <a:buFont typeface="Arial"/>
+              <a:buChar char="•"/>
+              <a:defRPr sz="1400" kern="1200" cap="none">
+                <a:solidFill>
+                  <a:schemeClr val="tx1"/>
+                </a:solidFill>
+                <a:effectLst/>
+                <a:latin typeface="+mn-lt"/>
+                <a:ea typeface="+mn-ea"/>
+                <a:cs typeface="+mn-cs"/>
+              </a:defRPr>
+            </a:lvl7pPr>
+            <a:lvl8pPr marL="3429000" indent="-228600" algn="l" defTabSz="457200" rtl="0" eaLnBrk="1" latinLnBrk="0" hangingPunct="1">
+              <a:spcBef>
+                <a:spcPct val="20000"/>
+              </a:spcBef>
+              <a:spcAft>
+                <a:spcPts val="600"/>
+              </a:spcAft>
+              <a:buClr>
+                <a:schemeClr val="accent1">
+                  <a:lumMod val="75000"/>
+                </a:schemeClr>
+              </a:buClr>
+              <a:buSzPct val="145000"/>
+              <a:buFont typeface="Arial"/>
+              <a:buChar char="•"/>
+              <a:defRPr sz="1400" kern="1200" cap="none">
+                <a:solidFill>
+                  <a:schemeClr val="tx1"/>
+                </a:solidFill>
+                <a:effectLst/>
+                <a:latin typeface="+mn-lt"/>
+                <a:ea typeface="+mn-ea"/>
+                <a:cs typeface="+mn-cs"/>
+              </a:defRPr>
+            </a:lvl8pPr>
+            <a:lvl9pPr marL="3886200" indent="-228600" algn="l" defTabSz="457200" rtl="0" eaLnBrk="1" latinLnBrk="0" hangingPunct="1">
+              <a:spcBef>
+                <a:spcPct val="20000"/>
+              </a:spcBef>
+              <a:spcAft>
+                <a:spcPts val="600"/>
+              </a:spcAft>
+              <a:buClr>
+                <a:schemeClr val="accent1">
+                  <a:lumMod val="75000"/>
+                </a:schemeClr>
+              </a:buClr>
+              <a:buSzPct val="145000"/>
+              <a:buFont typeface="Arial"/>
+              <a:buChar char="•"/>
+              <a:defRPr sz="1400" kern="1200" cap="none">
+                <a:solidFill>
+                  <a:schemeClr val="tx1"/>
+                </a:solidFill>
+                <a:effectLst/>
+                <a:latin typeface="+mn-lt"/>
+                <a:ea typeface="+mn-ea"/>
+                <a:cs typeface="+mn-cs"/>
+              </a:defRPr>
+            </a:lvl9pPr>
+          </a:lstStyle>
           <a:p>
             <a:r>
               <a:rPr lang="en-GB" dirty="0"/>
               <a:t>Visual Studio Code</a:t>
-            </a:r>
-          </a:p>
-          <a:p>
-            <a:r>
-              <a:rPr lang="en-GB" dirty="0"/>
-              <a:t>UI Framework</a:t>
-            </a:r>
-          </a:p>
-          <a:p>
-            <a:r>
-              <a:rPr lang="en-GB" dirty="0"/>
-              <a:t>Bootstrap</a:t>
-            </a:r>
-          </a:p>
-          <a:p>
-            <a:r>
-              <a:rPr lang="en-GB" dirty="0"/>
-              <a:t>Database</a:t>
-            </a:r>
-          </a:p>
-          <a:p>
-            <a:r>
-              <a:rPr lang="en-GB" dirty="0"/>
-              <a:t>MySQL</a:t>
-            </a:r>
-          </a:p>
-          <a:p>
-            <a:r>
-              <a:rPr lang="en-GB" dirty="0"/>
-              <a:t>Web Server Solution</a:t>
-            </a:r>
-          </a:p>
-          <a:p>
-            <a:r>
-              <a:rPr lang="en-GB" dirty="0"/>
-              <a:t>WAMPP</a:t>
             </a:r>
           </a:p>
         </p:txBody>
@@ -22358,20 +22649,20 @@
 </file>
 
 <file path=customXml/item1.xml><?xml version="1.0" encoding="utf-8"?>
-<p:properties xmlns:p="http://schemas.microsoft.com/office/2006/metadata/properties" xmlns:xsi="http://www.w3.org/2001/XMLSchema-instance" xmlns:pc="http://schemas.microsoft.com/office/infopath/2007/PartnerControls">
-  <documentManagement>
-    <MediaServiceKeyPoints xmlns="71af3243-3dd4-4a8d-8c0d-dd76da1f02a5" xsi:nil="true"/>
-  </documentManagement>
-</p:properties>
-</file>
-
-<file path=customXml/item2.xml><?xml version="1.0" encoding="utf-8"?>
 <?mso-contentType ?>
 <FormTemplates xmlns="http://schemas.microsoft.com/sharepoint/v3/contenttype/forms">
   <Display>DocumentLibraryForm</Display>
   <Edit>DocumentLibraryForm</Edit>
   <New>DocumentLibraryForm</New>
 </FormTemplates>
+</file>
+
+<file path=customXml/item2.xml><?xml version="1.0" encoding="utf-8"?>
+<p:properties xmlns:p="http://schemas.microsoft.com/office/2006/metadata/properties" xmlns:xsi="http://www.w3.org/2001/XMLSchema-instance" xmlns:pc="http://schemas.microsoft.com/office/infopath/2007/PartnerControls">
+  <documentManagement>
+    <MediaServiceKeyPoints xmlns="71af3243-3dd4-4a8d-8c0d-dd76da1f02a5" xsi:nil="true"/>
+  </documentManagement>
+</p:properties>
 </file>
 
 <file path=customXml/item3.xml><?xml version="1.0" encoding="utf-8"?>
@@ -22586,19 +22877,19 @@
 </file>
 
 <file path=customXml/itemProps1.xml><?xml version="1.0" encoding="utf-8"?>
+<ds:datastoreItem xmlns:ds="http://schemas.openxmlformats.org/officeDocument/2006/customXml" ds:itemID="{33315AA3-EAE3-44ED-8368-BAC2FFFB4817}">
+  <ds:schemaRefs>
+    <ds:schemaRef ds:uri="http://schemas.microsoft.com/sharepoint/v3/contenttype/forms"/>
+  </ds:schemaRefs>
+</ds:datastoreItem>
+</file>
+
+<file path=customXml/itemProps2.xml><?xml version="1.0" encoding="utf-8"?>
 <ds:datastoreItem xmlns:ds="http://schemas.openxmlformats.org/officeDocument/2006/customXml" ds:itemID="{D7023227-530E-4024-91EF-312A851A758C}">
   <ds:schemaRefs>
     <ds:schemaRef ds:uri="http://schemas.microsoft.com/office/2006/metadata/properties"/>
     <ds:schemaRef ds:uri="http://schemas.microsoft.com/office/infopath/2007/PartnerControls"/>
     <ds:schemaRef ds:uri="71af3243-3dd4-4a8d-8c0d-dd76da1f02a5"/>
-  </ds:schemaRefs>
-</ds:datastoreItem>
-</file>
-
-<file path=customXml/itemProps2.xml><?xml version="1.0" encoding="utf-8"?>
-<ds:datastoreItem xmlns:ds="http://schemas.openxmlformats.org/officeDocument/2006/customXml" ds:itemID="{33315AA3-EAE3-44ED-8368-BAC2FFFB4817}">
-  <ds:schemaRefs>
-    <ds:schemaRef ds:uri="http://schemas.microsoft.com/sharepoint/v3/contenttype/forms"/>
   </ds:schemaRefs>
 </ds:datastoreItem>
 </file>

</xml_diff>

<commit_message>
dashboard profile image issue fixed
</commit_message>
<xml_diff>
--- a/Sales And Inventory Management System.pptx
+++ b/Sales And Inventory Management System.pptx
@@ -4038,7 +4038,7 @@
           <a:noFill/>
           <a:extLst>
             <a:ext uri="{909E8E84-426E-40dd-AFC4-6F175D3DCCD1}">
-              <a14:hiddenFill xmlns="" xmlns:a14="http://schemas.microsoft.com/office/drawing/2010/main">
+              <a14:hiddenFill xmlns:a14="http://schemas.microsoft.com/office/drawing/2010/main" xmlns="">
                 <a:solidFill>
                   <a:srgbClr val="FFFFFF"/>
                 </a:solidFill>
@@ -4098,7 +4098,7 @@
             </a:ln>
             <a:extLst>
               <a:ext uri="{91240B29-F687-4f45-9708-019B960494DF}">
-                <a14:hiddenLine xmlns="" xmlns:a14="http://schemas.microsoft.com/office/drawing/2010/main" w="9525">
+                <a14:hiddenLine xmlns:a14="http://schemas.microsoft.com/office/drawing/2010/main" xmlns="" w="9525">
                   <a:solidFill>
                     <a:srgbClr val="000000"/>
                   </a:solidFill>
@@ -4188,7 +4188,7 @@
             </a:ln>
             <a:extLst>
               <a:ext uri="{91240B29-F687-4f45-9708-019B960494DF}">
-                <a14:hiddenLine xmlns="" xmlns:a14="http://schemas.microsoft.com/office/drawing/2010/main" w="9525">
+                <a14:hiddenLine xmlns:a14="http://schemas.microsoft.com/office/drawing/2010/main" xmlns="" w="9525">
                   <a:solidFill>
                     <a:srgbClr val="000000"/>
                   </a:solidFill>
@@ -4278,7 +4278,7 @@
             </a:ln>
             <a:extLst>
               <a:ext uri="{91240B29-F687-4f45-9708-019B960494DF}">
-                <a14:hiddenLine xmlns="" xmlns:a14="http://schemas.microsoft.com/office/drawing/2010/main" w="9525">
+                <a14:hiddenLine xmlns:a14="http://schemas.microsoft.com/office/drawing/2010/main" xmlns="" w="9525">
                   <a:solidFill>
                     <a:srgbClr val="000000"/>
                   </a:solidFill>
@@ -4312,7 +4312,7 @@
             </a:ln>
             <a:extLst>
               <a:ext uri="{91240B29-F687-4f45-9708-019B960494DF}">
-                <a14:hiddenLine xmlns="" xmlns:a14="http://schemas.microsoft.com/office/drawing/2010/main" w="9525">
+                <a14:hiddenLine xmlns:a14="http://schemas.microsoft.com/office/drawing/2010/main" xmlns="" w="9525">
                   <a:solidFill>
                     <a:srgbClr val="000000"/>
                   </a:solidFill>
@@ -4402,7 +4402,7 @@
             </a:ln>
             <a:extLst>
               <a:ext uri="{91240B29-F687-4f45-9708-019B960494DF}">
-                <a14:hiddenLine xmlns="" xmlns:a14="http://schemas.microsoft.com/office/drawing/2010/main" w="9525">
+                <a14:hiddenLine xmlns:a14="http://schemas.microsoft.com/office/drawing/2010/main" xmlns="" w="9525">
                   <a:solidFill>
                     <a:srgbClr val="000000"/>
                   </a:solidFill>
@@ -4464,7 +4464,7 @@
             </a:ln>
             <a:extLst>
               <a:ext uri="{91240B29-F687-4f45-9708-019B960494DF}">
-                <a14:hiddenLine xmlns="" xmlns:a14="http://schemas.microsoft.com/office/drawing/2010/main" w="9525">
+                <a14:hiddenLine xmlns:a14="http://schemas.microsoft.com/office/drawing/2010/main" xmlns="" w="9525">
                   <a:solidFill>
                     <a:srgbClr val="000000"/>
                   </a:solidFill>
@@ -4526,7 +4526,7 @@
             </a:ln>
             <a:extLst>
               <a:ext uri="{91240B29-F687-4f45-9708-019B960494DF}">
-                <a14:hiddenLine xmlns="" xmlns:a14="http://schemas.microsoft.com/office/drawing/2010/main" w="9525">
+                <a14:hiddenLine xmlns:a14="http://schemas.microsoft.com/office/drawing/2010/main" xmlns="" w="9525">
                   <a:solidFill>
                     <a:srgbClr val="000000"/>
                   </a:solidFill>
@@ -4616,7 +4616,7 @@
             </a:ln>
             <a:extLst>
               <a:ext uri="{91240B29-F687-4f45-9708-019B960494DF}">
-                <a14:hiddenLine xmlns="" xmlns:a14="http://schemas.microsoft.com/office/drawing/2010/main" w="9525">
+                <a14:hiddenLine xmlns:a14="http://schemas.microsoft.com/office/drawing/2010/main" xmlns="" w="9525">
                   <a:solidFill>
                     <a:srgbClr val="000000"/>
                   </a:solidFill>
@@ -4678,7 +4678,7 @@
             </a:ln>
             <a:extLst>
               <a:ext uri="{91240B29-F687-4f45-9708-019B960494DF}">
-                <a14:hiddenLine xmlns="" xmlns:a14="http://schemas.microsoft.com/office/drawing/2010/main" w="9525">
+                <a14:hiddenLine xmlns:a14="http://schemas.microsoft.com/office/drawing/2010/main" xmlns="" w="9525">
                   <a:solidFill>
                     <a:srgbClr val="000000"/>
                   </a:solidFill>
@@ -4740,7 +4740,7 @@
             </a:ln>
             <a:extLst>
               <a:ext uri="{91240B29-F687-4f45-9708-019B960494DF}">
-                <a14:hiddenLine xmlns="" xmlns:a14="http://schemas.microsoft.com/office/drawing/2010/main" w="9525">
+                <a14:hiddenLine xmlns:a14="http://schemas.microsoft.com/office/drawing/2010/main" xmlns="" w="9525">
                   <a:solidFill>
                     <a:srgbClr val="000000"/>
                   </a:solidFill>
@@ -4830,7 +4830,7 @@
             </a:ln>
             <a:extLst>
               <a:ext uri="{91240B29-F687-4f45-9708-019B960494DF}">
-                <a14:hiddenLine xmlns="" xmlns:a14="http://schemas.microsoft.com/office/drawing/2010/main" w="9525">
+                <a14:hiddenLine xmlns:a14="http://schemas.microsoft.com/office/drawing/2010/main" xmlns="" w="9525">
                   <a:solidFill>
                     <a:srgbClr val="000000"/>
                   </a:solidFill>
@@ -4920,7 +4920,7 @@
             </a:ln>
             <a:extLst>
               <a:ext uri="{91240B29-F687-4f45-9708-019B960494DF}">
-                <a14:hiddenLine xmlns="" xmlns:a14="http://schemas.microsoft.com/office/drawing/2010/main" w="9525">
+                <a14:hiddenLine xmlns:a14="http://schemas.microsoft.com/office/drawing/2010/main" xmlns="" w="9525">
                   <a:solidFill>
                     <a:srgbClr val="000000"/>
                   </a:solidFill>
@@ -4982,7 +4982,7 @@
             </a:ln>
             <a:extLst>
               <a:ext uri="{91240B29-F687-4f45-9708-019B960494DF}">
-                <a14:hiddenLine xmlns="" xmlns:a14="http://schemas.microsoft.com/office/drawing/2010/main" w="9525">
+                <a14:hiddenLine xmlns:a14="http://schemas.microsoft.com/office/drawing/2010/main" xmlns="" w="9525">
                   <a:solidFill>
                     <a:srgbClr val="000000"/>
                   </a:solidFill>
@@ -5092,7 +5092,7 @@
             </a:ln>
             <a:extLst>
               <a:ext uri="{91240B29-F687-4f45-9708-019B960494DF}">
-                <a14:hiddenLine xmlns="" xmlns:a14="http://schemas.microsoft.com/office/drawing/2010/main" w="9525">
+                <a14:hiddenLine xmlns:a14="http://schemas.microsoft.com/office/drawing/2010/main" xmlns="" w="9525">
                   <a:solidFill>
                     <a:srgbClr val="000000"/>
                   </a:solidFill>
@@ -5154,7 +5154,7 @@
             </a:ln>
             <a:extLst>
               <a:ext uri="{91240B29-F687-4f45-9708-019B960494DF}">
-                <a14:hiddenLine xmlns="" xmlns:a14="http://schemas.microsoft.com/office/drawing/2010/main" w="9525">
+                <a14:hiddenLine xmlns:a14="http://schemas.microsoft.com/office/drawing/2010/main" xmlns="" w="9525">
                   <a:solidFill>
                     <a:srgbClr val="000000"/>
                   </a:solidFill>
@@ -5244,7 +5244,7 @@
             </a:ln>
             <a:extLst>
               <a:ext uri="{91240B29-F687-4f45-9708-019B960494DF}">
-                <a14:hiddenLine xmlns="" xmlns:a14="http://schemas.microsoft.com/office/drawing/2010/main" w="9525">
+                <a14:hiddenLine xmlns:a14="http://schemas.microsoft.com/office/drawing/2010/main" xmlns="" w="9525">
                   <a:solidFill>
                     <a:srgbClr val="000000"/>
                   </a:solidFill>
@@ -5334,7 +5334,7 @@
             </a:ln>
             <a:extLst>
               <a:ext uri="{91240B29-F687-4f45-9708-019B960494DF}">
-                <a14:hiddenLine xmlns="" xmlns:a14="http://schemas.microsoft.com/office/drawing/2010/main" w="9525">
+                <a14:hiddenLine xmlns:a14="http://schemas.microsoft.com/office/drawing/2010/main" xmlns="" w="9525">
                   <a:solidFill>
                     <a:srgbClr val="000000"/>
                   </a:solidFill>
@@ -5396,7 +5396,7 @@
             </a:ln>
             <a:extLst>
               <a:ext uri="{91240B29-F687-4f45-9708-019B960494DF}">
-                <a14:hiddenLine xmlns="" xmlns:a14="http://schemas.microsoft.com/office/drawing/2010/main" w="9525">
+                <a14:hiddenLine xmlns:a14="http://schemas.microsoft.com/office/drawing/2010/main" xmlns="" w="9525">
                   <a:solidFill>
                     <a:srgbClr val="000000"/>
                   </a:solidFill>
@@ -5486,7 +5486,7 @@
             </a:ln>
             <a:extLst>
               <a:ext uri="{91240B29-F687-4f45-9708-019B960494DF}">
-                <a14:hiddenLine xmlns="" xmlns:a14="http://schemas.microsoft.com/office/drawing/2010/main" w="9525">
+                <a14:hiddenLine xmlns:a14="http://schemas.microsoft.com/office/drawing/2010/main" xmlns="" w="9525">
                   <a:solidFill>
                     <a:srgbClr val="000000"/>
                   </a:solidFill>
@@ -5576,7 +5576,7 @@
             </a:ln>
             <a:extLst>
               <a:ext uri="{91240B29-F687-4f45-9708-019B960494DF}">
-                <a14:hiddenLine xmlns="" xmlns:a14="http://schemas.microsoft.com/office/drawing/2010/main" w="9525">
+                <a14:hiddenLine xmlns:a14="http://schemas.microsoft.com/office/drawing/2010/main" xmlns="" w="9525">
                   <a:solidFill>
                     <a:srgbClr val="000000"/>
                   </a:solidFill>
@@ -5632,7 +5632,7 @@
             </a:ln>
             <a:extLst>
               <a:ext uri="{91240B29-F687-4f45-9708-019B960494DF}">
-                <a14:hiddenLine xmlns="" xmlns:a14="http://schemas.microsoft.com/office/drawing/2010/main" w="9525">
+                <a14:hiddenLine xmlns:a14="http://schemas.microsoft.com/office/drawing/2010/main" xmlns="" w="9525">
                   <a:solidFill>
                     <a:srgbClr val="000000"/>
                   </a:solidFill>
@@ -5722,7 +5722,7 @@
             </a:ln>
             <a:extLst>
               <a:ext uri="{91240B29-F687-4f45-9708-019B960494DF}">
-                <a14:hiddenLine xmlns="" xmlns:a14="http://schemas.microsoft.com/office/drawing/2010/main" w="9525">
+                <a14:hiddenLine xmlns:a14="http://schemas.microsoft.com/office/drawing/2010/main" xmlns="" w="9525">
                   <a:solidFill>
                     <a:srgbClr val="000000"/>
                   </a:solidFill>
@@ -5778,7 +5778,7 @@
             </a:ln>
             <a:extLst>
               <a:ext uri="{91240B29-F687-4f45-9708-019B960494DF}">
-                <a14:hiddenLine xmlns="" xmlns:a14="http://schemas.microsoft.com/office/drawing/2010/main" w="9525">
+                <a14:hiddenLine xmlns:a14="http://schemas.microsoft.com/office/drawing/2010/main" xmlns="" w="9525">
                   <a:solidFill>
                     <a:srgbClr val="000000"/>
                   </a:solidFill>
@@ -5868,7 +5868,7 @@
             </a:ln>
             <a:extLst>
               <a:ext uri="{91240B29-F687-4f45-9708-019B960494DF}">
-                <a14:hiddenLine xmlns="" xmlns:a14="http://schemas.microsoft.com/office/drawing/2010/main" w="9525">
+                <a14:hiddenLine xmlns:a14="http://schemas.microsoft.com/office/drawing/2010/main" xmlns="" w="9525">
                   <a:solidFill>
                     <a:srgbClr val="000000"/>
                   </a:solidFill>
@@ -5936,7 +5936,7 @@
             </a:ln>
             <a:extLst>
               <a:ext uri="{91240B29-F687-4f45-9708-019B960494DF}">
-                <a14:hiddenLine xmlns="" xmlns:a14="http://schemas.microsoft.com/office/drawing/2010/main" w="9525">
+                <a14:hiddenLine xmlns:a14="http://schemas.microsoft.com/office/drawing/2010/main" xmlns="" w="9525">
                   <a:solidFill>
                     <a:srgbClr val="000000"/>
                   </a:solidFill>
@@ -6026,7 +6026,7 @@
             </a:ln>
             <a:extLst>
               <a:ext uri="{91240B29-F687-4f45-9708-019B960494DF}">
-                <a14:hiddenLine xmlns="" xmlns:a14="http://schemas.microsoft.com/office/drawing/2010/main" w="9525">
+                <a14:hiddenLine xmlns:a14="http://schemas.microsoft.com/office/drawing/2010/main" xmlns="" w="9525">
                   <a:solidFill>
                     <a:srgbClr val="000000"/>
                   </a:solidFill>
@@ -6094,7 +6094,7 @@
             </a:ln>
             <a:extLst>
               <a:ext uri="{91240B29-F687-4f45-9708-019B960494DF}">
-                <a14:hiddenLine xmlns="" xmlns:a14="http://schemas.microsoft.com/office/drawing/2010/main" w="9525">
+                <a14:hiddenLine xmlns:a14="http://schemas.microsoft.com/office/drawing/2010/main" xmlns="" w="9525">
                   <a:solidFill>
                     <a:srgbClr val="000000"/>
                   </a:solidFill>
@@ -6184,7 +6184,7 @@
             </a:ln>
             <a:extLst>
               <a:ext uri="{91240B29-F687-4f45-9708-019B960494DF}">
-                <a14:hiddenLine xmlns="" xmlns:a14="http://schemas.microsoft.com/office/drawing/2010/main" w="9525">
+                <a14:hiddenLine xmlns:a14="http://schemas.microsoft.com/office/drawing/2010/main" xmlns="" w="9525">
                   <a:solidFill>
                     <a:srgbClr val="000000"/>
                   </a:solidFill>
@@ -6218,7 +6218,7 @@
             </a:ln>
             <a:extLst>
               <a:ext uri="{91240B29-F687-4f45-9708-019B960494DF}">
-                <a14:hiddenLine xmlns="" xmlns:a14="http://schemas.microsoft.com/office/drawing/2010/main" w="9525">
+                <a14:hiddenLine xmlns:a14="http://schemas.microsoft.com/office/drawing/2010/main" xmlns="" w="9525">
                   <a:solidFill>
                     <a:srgbClr val="000000"/>
                   </a:solidFill>
@@ -6308,7 +6308,7 @@
             </a:ln>
             <a:extLst>
               <a:ext uri="{91240B29-F687-4f45-9708-019B960494DF}">
-                <a14:hiddenLine xmlns="" xmlns:a14="http://schemas.microsoft.com/office/drawing/2010/main" w="9525">
+                <a14:hiddenLine xmlns:a14="http://schemas.microsoft.com/office/drawing/2010/main" xmlns="" w="9525">
                   <a:solidFill>
                     <a:srgbClr val="000000"/>
                   </a:solidFill>
@@ -6370,7 +6370,7 @@
             </a:ln>
             <a:extLst>
               <a:ext uri="{91240B29-F687-4f45-9708-019B960494DF}">
-                <a14:hiddenLine xmlns="" xmlns:a14="http://schemas.microsoft.com/office/drawing/2010/main" w="9525">
+                <a14:hiddenLine xmlns:a14="http://schemas.microsoft.com/office/drawing/2010/main" xmlns="" w="9525">
                   <a:solidFill>
                     <a:srgbClr val="000000"/>
                   </a:solidFill>
@@ -6432,7 +6432,7 @@
             </a:ln>
             <a:extLst>
               <a:ext uri="{91240B29-F687-4f45-9708-019B960494DF}">
-                <a14:hiddenLine xmlns="" xmlns:a14="http://schemas.microsoft.com/office/drawing/2010/main" w="9525">
+                <a14:hiddenLine xmlns:a14="http://schemas.microsoft.com/office/drawing/2010/main" xmlns="" w="9525">
                   <a:solidFill>
                     <a:srgbClr val="000000"/>
                   </a:solidFill>
@@ -6522,7 +6522,7 @@
             </a:ln>
             <a:extLst>
               <a:ext uri="{91240B29-F687-4f45-9708-019B960494DF}">
-                <a14:hiddenLine xmlns="" xmlns:a14="http://schemas.microsoft.com/office/drawing/2010/main" w="9525">
+                <a14:hiddenLine xmlns:a14="http://schemas.microsoft.com/office/drawing/2010/main" xmlns="" w="9525">
                   <a:solidFill>
                     <a:srgbClr val="000000"/>
                   </a:solidFill>
@@ -6590,7 +6590,7 @@
             </a:ln>
             <a:extLst>
               <a:ext uri="{91240B29-F687-4f45-9708-019B960494DF}">
-                <a14:hiddenLine xmlns="" xmlns:a14="http://schemas.microsoft.com/office/drawing/2010/main" w="9525">
+                <a14:hiddenLine xmlns:a14="http://schemas.microsoft.com/office/drawing/2010/main" xmlns="" w="9525">
                   <a:solidFill>
                     <a:srgbClr val="000000"/>
                   </a:solidFill>
@@ -6652,7 +6652,7 @@
             </a:ln>
             <a:extLst>
               <a:ext uri="{91240B29-F687-4f45-9708-019B960494DF}">
-                <a14:hiddenLine xmlns="" xmlns:a14="http://schemas.microsoft.com/office/drawing/2010/main" w="9525">
+                <a14:hiddenLine xmlns:a14="http://schemas.microsoft.com/office/drawing/2010/main" xmlns="" w="9525">
                   <a:solidFill>
                     <a:srgbClr val="000000"/>
                   </a:solidFill>
@@ -6742,7 +6742,7 @@
             </a:ln>
             <a:extLst>
               <a:ext uri="{91240B29-F687-4f45-9708-019B960494DF}">
-                <a14:hiddenLine xmlns="" xmlns:a14="http://schemas.microsoft.com/office/drawing/2010/main" w="9525">
+                <a14:hiddenLine xmlns:a14="http://schemas.microsoft.com/office/drawing/2010/main" xmlns="" w="9525">
                   <a:solidFill>
                     <a:srgbClr val="000000"/>
                   </a:solidFill>
@@ -6804,7 +6804,7 @@
             </a:ln>
             <a:extLst>
               <a:ext uri="{91240B29-F687-4f45-9708-019B960494DF}">
-                <a14:hiddenLine xmlns="" xmlns:a14="http://schemas.microsoft.com/office/drawing/2010/main" w="9525">
+                <a14:hiddenLine xmlns:a14="http://schemas.microsoft.com/office/drawing/2010/main" xmlns="" w="9525">
                   <a:solidFill>
                     <a:srgbClr val="000000"/>
                   </a:solidFill>
@@ -6894,7 +6894,7 @@
             </a:ln>
             <a:extLst>
               <a:ext uri="{91240B29-F687-4f45-9708-019B960494DF}">
-                <a14:hiddenLine xmlns="" xmlns:a14="http://schemas.microsoft.com/office/drawing/2010/main" w="9525">
+                <a14:hiddenLine xmlns:a14="http://schemas.microsoft.com/office/drawing/2010/main" xmlns="" w="9525">
                   <a:solidFill>
                     <a:srgbClr val="000000"/>
                   </a:solidFill>
@@ -6956,7 +6956,7 @@
             </a:ln>
             <a:extLst>
               <a:ext uri="{91240B29-F687-4f45-9708-019B960494DF}">
-                <a14:hiddenLine xmlns="" xmlns:a14="http://schemas.microsoft.com/office/drawing/2010/main" w="9525">
+                <a14:hiddenLine xmlns:a14="http://schemas.microsoft.com/office/drawing/2010/main" xmlns="" w="9525">
                   <a:solidFill>
                     <a:srgbClr val="000000"/>
                   </a:solidFill>
@@ -7046,7 +7046,7 @@
             </a:ln>
             <a:extLst>
               <a:ext uri="{91240B29-F687-4f45-9708-019B960494DF}">
-                <a14:hiddenLine xmlns="" xmlns:a14="http://schemas.microsoft.com/office/drawing/2010/main" w="9525">
+                <a14:hiddenLine xmlns:a14="http://schemas.microsoft.com/office/drawing/2010/main" xmlns="" w="9525">
                   <a:solidFill>
                     <a:srgbClr val="000000"/>
                   </a:solidFill>
@@ -7080,7 +7080,7 @@
             </a:ln>
             <a:extLst>
               <a:ext uri="{91240B29-F687-4f45-9708-019B960494DF}">
-                <a14:hiddenLine xmlns="" xmlns:a14="http://schemas.microsoft.com/office/drawing/2010/main" w="9525">
+                <a14:hiddenLine xmlns:a14="http://schemas.microsoft.com/office/drawing/2010/main" xmlns="" w="9525">
                   <a:solidFill>
                     <a:srgbClr val="000000"/>
                   </a:solidFill>
@@ -7145,7 +7145,7 @@
             </a:ln>
             <a:extLst>
               <a:ext uri="{91240B29-F687-4f45-9708-019B960494DF}">
-                <a14:hiddenLine xmlns="" xmlns:a14="http://schemas.microsoft.com/office/drawing/2010/main" w="9525">
+                <a14:hiddenLine xmlns:a14="http://schemas.microsoft.com/office/drawing/2010/main" xmlns="" w="9525">
                   <a:solidFill>
                     <a:srgbClr val="000000"/>
                   </a:solidFill>
@@ -7235,7 +7235,7 @@
             </a:ln>
             <a:extLst>
               <a:ext uri="{91240B29-F687-4f45-9708-019B960494DF}">
-                <a14:hiddenLine xmlns="" xmlns:a14="http://schemas.microsoft.com/office/drawing/2010/main" w="9525">
+                <a14:hiddenLine xmlns:a14="http://schemas.microsoft.com/office/drawing/2010/main" xmlns="" w="9525">
                   <a:solidFill>
                     <a:srgbClr val="000000"/>
                   </a:solidFill>
@@ -7297,7 +7297,7 @@
             </a:ln>
             <a:extLst>
               <a:ext uri="{91240B29-F687-4f45-9708-019B960494DF}">
-                <a14:hiddenLine xmlns="" xmlns:a14="http://schemas.microsoft.com/office/drawing/2010/main" w="9525">
+                <a14:hiddenLine xmlns:a14="http://schemas.microsoft.com/office/drawing/2010/main" xmlns="" w="9525">
                   <a:solidFill>
                     <a:srgbClr val="000000"/>
                   </a:solidFill>
@@ -7387,7 +7387,7 @@
             </a:ln>
             <a:extLst>
               <a:ext uri="{91240B29-F687-4f45-9708-019B960494DF}">
-                <a14:hiddenLine xmlns="" xmlns:a14="http://schemas.microsoft.com/office/drawing/2010/main" w="9525">
+                <a14:hiddenLine xmlns:a14="http://schemas.microsoft.com/office/drawing/2010/main" xmlns="" w="9525">
                   <a:solidFill>
                     <a:srgbClr val="000000"/>
                   </a:solidFill>
@@ -7477,7 +7477,7 @@
             </a:ln>
             <a:extLst>
               <a:ext uri="{91240B29-F687-4f45-9708-019B960494DF}">
-                <a14:hiddenLine xmlns="" xmlns:a14="http://schemas.microsoft.com/office/drawing/2010/main" w="9525">
+                <a14:hiddenLine xmlns:a14="http://schemas.microsoft.com/office/drawing/2010/main" xmlns="" w="9525">
                   <a:solidFill>
                     <a:srgbClr val="000000"/>
                   </a:solidFill>
@@ -7542,7 +7542,7 @@
             </a:ln>
             <a:extLst>
               <a:ext uri="{91240B29-F687-4f45-9708-019B960494DF}">
-                <a14:hiddenLine xmlns="" xmlns:a14="http://schemas.microsoft.com/office/drawing/2010/main" w="9525">
+                <a14:hiddenLine xmlns:a14="http://schemas.microsoft.com/office/drawing/2010/main" xmlns="" w="9525">
                   <a:solidFill>
                     <a:srgbClr val="000000"/>
                   </a:solidFill>
@@ -7604,7 +7604,7 @@
             </a:ln>
             <a:extLst>
               <a:ext uri="{91240B29-F687-4f45-9708-019B960494DF}">
-                <a14:hiddenLine xmlns="" xmlns:a14="http://schemas.microsoft.com/office/drawing/2010/main" w="9525">
+                <a14:hiddenLine xmlns:a14="http://schemas.microsoft.com/office/drawing/2010/main" xmlns="" w="9525">
                   <a:solidFill>
                     <a:srgbClr val="000000"/>
                   </a:solidFill>
@@ -7694,7 +7694,7 @@
             </a:ln>
             <a:extLst>
               <a:ext uri="{91240B29-F687-4f45-9708-019B960494DF}">
-                <a14:hiddenLine xmlns="" xmlns:a14="http://schemas.microsoft.com/office/drawing/2010/main" w="9525">
+                <a14:hiddenLine xmlns:a14="http://schemas.microsoft.com/office/drawing/2010/main" xmlns="" w="9525">
                   <a:solidFill>
                     <a:srgbClr val="000000"/>
                   </a:solidFill>
@@ -7784,7 +7784,7 @@
             </a:ln>
             <a:extLst>
               <a:ext uri="{91240B29-F687-4f45-9708-019B960494DF}">
-                <a14:hiddenLine xmlns="" xmlns:a14="http://schemas.microsoft.com/office/drawing/2010/main" w="9525">
+                <a14:hiddenLine xmlns:a14="http://schemas.microsoft.com/office/drawing/2010/main" xmlns="" w="9525">
                   <a:solidFill>
                     <a:srgbClr val="000000"/>
                   </a:solidFill>
@@ -7846,7 +7846,7 @@
             </a:ln>
             <a:extLst>
               <a:ext uri="{91240B29-F687-4f45-9708-019B960494DF}">
-                <a14:hiddenLine xmlns="" xmlns:a14="http://schemas.microsoft.com/office/drawing/2010/main" w="9525">
+                <a14:hiddenLine xmlns:a14="http://schemas.microsoft.com/office/drawing/2010/main" xmlns="" w="9525">
                   <a:solidFill>
                     <a:srgbClr val="000000"/>
                   </a:solidFill>
@@ -7966,7 +7966,7 @@
             </a:ln>
             <a:extLst>
               <a:ext uri="{91240B29-F687-4f45-9708-019B960494DF}">
-                <a14:hiddenLine xmlns="" xmlns:a14="http://schemas.microsoft.com/office/drawing/2010/main" w="9525">
+                <a14:hiddenLine xmlns:a14="http://schemas.microsoft.com/office/drawing/2010/main" xmlns="" w="9525">
                   <a:solidFill>
                     <a:srgbClr val="000000"/>
                   </a:solidFill>
@@ -8034,7 +8034,7 @@
             </a:ln>
             <a:extLst>
               <a:ext uri="{91240B29-F687-4f45-9708-019B960494DF}">
-                <a14:hiddenLine xmlns="" xmlns:a14="http://schemas.microsoft.com/office/drawing/2010/main" w="9525">
+                <a14:hiddenLine xmlns:a14="http://schemas.microsoft.com/office/drawing/2010/main" xmlns="" w="9525">
                   <a:solidFill>
                     <a:srgbClr val="000000"/>
                   </a:solidFill>
@@ -8124,7 +8124,7 @@
             </a:ln>
             <a:extLst>
               <a:ext uri="{91240B29-F687-4f45-9708-019B960494DF}">
-                <a14:hiddenLine xmlns="" xmlns:a14="http://schemas.microsoft.com/office/drawing/2010/main" w="9525">
+                <a14:hiddenLine xmlns:a14="http://schemas.microsoft.com/office/drawing/2010/main" xmlns="" w="9525">
                   <a:solidFill>
                     <a:srgbClr val="000000"/>
                   </a:solidFill>
@@ -15935,7 +15935,7 @@
           <a:noFill/>
           <a:extLst>
             <a:ext uri="{909E8E84-426E-40dd-AFC4-6F175D3DCCD1}">
-              <a14:hiddenFill xmlns="" xmlns:a14="http://schemas.microsoft.com/office/drawing/2010/main">
+              <a14:hiddenFill xmlns:a14="http://schemas.microsoft.com/office/drawing/2010/main" xmlns="">
                 <a:solidFill>
                   <a:srgbClr val="FFFFFF"/>
                 </a:solidFill>
@@ -16009,7 +16009,7 @@
               </a:ln>
               <a:extLst>
                 <a:ext uri="{91240B29-F687-4f45-9708-019B960494DF}">
-                  <a14:hiddenLine xmlns="" xmlns:a14="http://schemas.microsoft.com/office/drawing/2010/main" w="9525">
+                  <a14:hiddenLine xmlns:a14="http://schemas.microsoft.com/office/drawing/2010/main" xmlns="" w="9525">
                     <a:solidFill>
                       <a:srgbClr val="000000"/>
                     </a:solidFill>
@@ -16099,7 +16099,7 @@
               </a:ln>
               <a:extLst>
                 <a:ext uri="{91240B29-F687-4f45-9708-019B960494DF}">
-                  <a14:hiddenLine xmlns="" xmlns:a14="http://schemas.microsoft.com/office/drawing/2010/main" w="9525">
+                  <a14:hiddenLine xmlns:a14="http://schemas.microsoft.com/office/drawing/2010/main" xmlns="" w="9525">
                     <a:solidFill>
                       <a:srgbClr val="000000"/>
                     </a:solidFill>
@@ -16189,7 +16189,7 @@
               </a:ln>
               <a:extLst>
                 <a:ext uri="{91240B29-F687-4f45-9708-019B960494DF}">
-                  <a14:hiddenLine xmlns="" xmlns:a14="http://schemas.microsoft.com/office/drawing/2010/main" w="9525">
+                  <a14:hiddenLine xmlns:a14="http://schemas.microsoft.com/office/drawing/2010/main" xmlns="" w="9525">
                     <a:solidFill>
                       <a:srgbClr val="000000"/>
                     </a:solidFill>
@@ -16251,7 +16251,7 @@
               </a:ln>
               <a:extLst>
                 <a:ext uri="{91240B29-F687-4f45-9708-019B960494DF}">
-                  <a14:hiddenLine xmlns="" xmlns:a14="http://schemas.microsoft.com/office/drawing/2010/main" w="9525">
+                  <a14:hiddenLine xmlns:a14="http://schemas.microsoft.com/office/drawing/2010/main" xmlns="" w="9525">
                     <a:solidFill>
                       <a:srgbClr val="000000"/>
                     </a:solidFill>
@@ -16341,7 +16341,7 @@
               </a:ln>
               <a:extLst>
                 <a:ext uri="{91240B29-F687-4f45-9708-019B960494DF}">
-                  <a14:hiddenLine xmlns="" xmlns:a14="http://schemas.microsoft.com/office/drawing/2010/main" w="9525">
+                  <a14:hiddenLine xmlns:a14="http://schemas.microsoft.com/office/drawing/2010/main" xmlns="" w="9525">
                     <a:solidFill>
                       <a:srgbClr val="000000"/>
                     </a:solidFill>
@@ -16403,7 +16403,7 @@
               </a:ln>
               <a:extLst>
                 <a:ext uri="{91240B29-F687-4f45-9708-019B960494DF}">
-                  <a14:hiddenLine xmlns="" xmlns:a14="http://schemas.microsoft.com/office/drawing/2010/main" w="9525">
+                  <a14:hiddenLine xmlns:a14="http://schemas.microsoft.com/office/drawing/2010/main" xmlns="" w="9525">
                     <a:solidFill>
                       <a:srgbClr val="000000"/>
                     </a:solidFill>
@@ -16465,7 +16465,7 @@
               </a:ln>
               <a:extLst>
                 <a:ext uri="{91240B29-F687-4f45-9708-019B960494DF}">
-                  <a14:hiddenLine xmlns="" xmlns:a14="http://schemas.microsoft.com/office/drawing/2010/main" w="9525">
+                  <a14:hiddenLine xmlns:a14="http://schemas.microsoft.com/office/drawing/2010/main" xmlns="" w="9525">
                     <a:solidFill>
                       <a:srgbClr val="000000"/>
                     </a:solidFill>
@@ -16555,7 +16555,7 @@
               </a:ln>
               <a:extLst>
                 <a:ext uri="{91240B29-F687-4f45-9708-019B960494DF}">
-                  <a14:hiddenLine xmlns="" xmlns:a14="http://schemas.microsoft.com/office/drawing/2010/main" w="9525">
+                  <a14:hiddenLine xmlns:a14="http://schemas.microsoft.com/office/drawing/2010/main" xmlns="" w="9525">
                     <a:solidFill>
                       <a:srgbClr val="000000"/>
                     </a:solidFill>
@@ -16645,7 +16645,7 @@
               </a:ln>
               <a:extLst>
                 <a:ext uri="{91240B29-F687-4f45-9708-019B960494DF}">
-                  <a14:hiddenLine xmlns="" xmlns:a14="http://schemas.microsoft.com/office/drawing/2010/main" w="9525">
+                  <a14:hiddenLine xmlns:a14="http://schemas.microsoft.com/office/drawing/2010/main" xmlns="" w="9525">
                     <a:solidFill>
                       <a:srgbClr val="000000"/>
                     </a:solidFill>
@@ -16707,7 +16707,7 @@
               </a:ln>
               <a:extLst>
                 <a:ext uri="{91240B29-F687-4f45-9708-019B960494DF}">
-                  <a14:hiddenLine xmlns="" xmlns:a14="http://schemas.microsoft.com/office/drawing/2010/main" w="9525">
+                  <a14:hiddenLine xmlns:a14="http://schemas.microsoft.com/office/drawing/2010/main" xmlns="" w="9525">
                     <a:solidFill>
                       <a:srgbClr val="000000"/>
                     </a:solidFill>
@@ -16817,7 +16817,7 @@
               </a:ln>
               <a:extLst>
                 <a:ext uri="{91240B29-F687-4f45-9708-019B960494DF}">
-                  <a14:hiddenLine xmlns="" xmlns:a14="http://schemas.microsoft.com/office/drawing/2010/main" w="9525">
+                  <a14:hiddenLine xmlns:a14="http://schemas.microsoft.com/office/drawing/2010/main" xmlns="" w="9525">
                     <a:solidFill>
                       <a:srgbClr val="000000"/>
                     </a:solidFill>
@@ -16901,7 +16901,7 @@
               </a:ln>
               <a:extLst>
                 <a:ext uri="{91240B29-F687-4f45-9708-019B960494DF}">
-                  <a14:hiddenLine xmlns="" xmlns:a14="http://schemas.microsoft.com/office/drawing/2010/main" w="9525">
+                  <a14:hiddenLine xmlns:a14="http://schemas.microsoft.com/office/drawing/2010/main" xmlns="" w="9525">
                     <a:solidFill>
                       <a:srgbClr val="000000"/>
                     </a:solidFill>
@@ -16963,7 +16963,7 @@
               </a:ln>
               <a:extLst>
                 <a:ext uri="{91240B29-F687-4f45-9708-019B960494DF}">
-                  <a14:hiddenLine xmlns="" xmlns:a14="http://schemas.microsoft.com/office/drawing/2010/main" w="9525">
+                  <a14:hiddenLine xmlns:a14="http://schemas.microsoft.com/office/drawing/2010/main" xmlns="" w="9525">
                     <a:solidFill>
                       <a:srgbClr val="000000"/>
                     </a:solidFill>
@@ -17025,7 +17025,7 @@
               </a:ln>
               <a:extLst>
                 <a:ext uri="{91240B29-F687-4f45-9708-019B960494DF}">
-                  <a14:hiddenLine xmlns="" xmlns:a14="http://schemas.microsoft.com/office/drawing/2010/main" w="9525">
+                  <a14:hiddenLine xmlns:a14="http://schemas.microsoft.com/office/drawing/2010/main" xmlns="" w="9525">
                     <a:solidFill>
                       <a:srgbClr val="000000"/>
                     </a:solidFill>
@@ -17115,7 +17115,7 @@
               </a:ln>
               <a:extLst>
                 <a:ext uri="{91240B29-F687-4f45-9708-019B960494DF}">
-                  <a14:hiddenLine xmlns="" xmlns:a14="http://schemas.microsoft.com/office/drawing/2010/main" w="9525">
+                  <a14:hiddenLine xmlns:a14="http://schemas.microsoft.com/office/drawing/2010/main" xmlns="" w="9525">
                     <a:solidFill>
                       <a:srgbClr val="000000"/>
                     </a:solidFill>
@@ -17149,7 +17149,7 @@
               </a:ln>
               <a:extLst>
                 <a:ext uri="{91240B29-F687-4f45-9708-019B960494DF}">
-                  <a14:hiddenLine xmlns="" xmlns:a14="http://schemas.microsoft.com/office/drawing/2010/main" w="9525">
+                  <a14:hiddenLine xmlns:a14="http://schemas.microsoft.com/office/drawing/2010/main" xmlns="" w="9525">
                     <a:solidFill>
                       <a:srgbClr val="000000"/>
                     </a:solidFill>
@@ -17214,7 +17214,7 @@
               </a:ln>
               <a:extLst>
                 <a:ext uri="{91240B29-F687-4f45-9708-019B960494DF}">
-                  <a14:hiddenLine xmlns="" xmlns:a14="http://schemas.microsoft.com/office/drawing/2010/main" w="9525">
+                  <a14:hiddenLine xmlns:a14="http://schemas.microsoft.com/office/drawing/2010/main" xmlns="" w="9525">
                     <a:solidFill>
                       <a:srgbClr val="000000"/>
                     </a:solidFill>
@@ -17304,7 +17304,7 @@
               </a:ln>
               <a:extLst>
                 <a:ext uri="{91240B29-F687-4f45-9708-019B960494DF}">
-                  <a14:hiddenLine xmlns="" xmlns:a14="http://schemas.microsoft.com/office/drawing/2010/main" w="9525">
+                  <a14:hiddenLine xmlns:a14="http://schemas.microsoft.com/office/drawing/2010/main" xmlns="" w="9525">
                     <a:solidFill>
                       <a:srgbClr val="000000"/>
                     </a:solidFill>
@@ -17366,7 +17366,7 @@
               </a:ln>
               <a:extLst>
                 <a:ext uri="{91240B29-F687-4f45-9708-019B960494DF}">
-                  <a14:hiddenLine xmlns="" xmlns:a14="http://schemas.microsoft.com/office/drawing/2010/main" w="9525">
+                  <a14:hiddenLine xmlns:a14="http://schemas.microsoft.com/office/drawing/2010/main" xmlns="" w="9525">
                     <a:solidFill>
                       <a:srgbClr val="000000"/>
                     </a:solidFill>
@@ -17456,7 +17456,7 @@
               </a:ln>
               <a:extLst>
                 <a:ext uri="{91240B29-F687-4f45-9708-019B960494DF}">
-                  <a14:hiddenLine xmlns="" xmlns:a14="http://schemas.microsoft.com/office/drawing/2010/main" w="9525">
+                  <a14:hiddenLine xmlns:a14="http://schemas.microsoft.com/office/drawing/2010/main" xmlns="" w="9525">
                     <a:solidFill>
                       <a:srgbClr val="000000"/>
                     </a:solidFill>
@@ -17521,7 +17521,7 @@
               </a:ln>
               <a:extLst>
                 <a:ext uri="{91240B29-F687-4f45-9708-019B960494DF}">
-                  <a14:hiddenLine xmlns="" xmlns:a14="http://schemas.microsoft.com/office/drawing/2010/main" w="9525">
+                  <a14:hiddenLine xmlns:a14="http://schemas.microsoft.com/office/drawing/2010/main" xmlns="" w="9525">
                     <a:solidFill>
                       <a:srgbClr val="000000"/>
                     </a:solidFill>
@@ -17583,7 +17583,7 @@
               </a:ln>
               <a:extLst>
                 <a:ext uri="{91240B29-F687-4f45-9708-019B960494DF}">
-                  <a14:hiddenLine xmlns="" xmlns:a14="http://schemas.microsoft.com/office/drawing/2010/main" w="9525">
+                  <a14:hiddenLine xmlns:a14="http://schemas.microsoft.com/office/drawing/2010/main" xmlns="" w="9525">
                     <a:solidFill>
                       <a:srgbClr val="000000"/>
                     </a:solidFill>
@@ -17673,7 +17673,7 @@
               </a:ln>
               <a:extLst>
                 <a:ext uri="{91240B29-F687-4f45-9708-019B960494DF}">
-                  <a14:hiddenLine xmlns="" xmlns:a14="http://schemas.microsoft.com/office/drawing/2010/main" w="9525">
+                  <a14:hiddenLine xmlns:a14="http://schemas.microsoft.com/office/drawing/2010/main" xmlns="" w="9525">
                     <a:solidFill>
                       <a:srgbClr val="000000"/>
                     </a:solidFill>
@@ -17763,7 +17763,7 @@
               </a:ln>
               <a:extLst>
                 <a:ext uri="{91240B29-F687-4f45-9708-019B960494DF}">
-                  <a14:hiddenLine xmlns="" xmlns:a14="http://schemas.microsoft.com/office/drawing/2010/main" w="9525">
+                  <a14:hiddenLine xmlns:a14="http://schemas.microsoft.com/office/drawing/2010/main" xmlns="" w="9525">
                     <a:solidFill>
                       <a:srgbClr val="000000"/>
                     </a:solidFill>
@@ -17828,7 +17828,7 @@
               </a:ln>
               <a:extLst>
                 <a:ext uri="{91240B29-F687-4f45-9708-019B960494DF}">
-                  <a14:hiddenLine xmlns="" xmlns:a14="http://schemas.microsoft.com/office/drawing/2010/main" w="9525">
+                  <a14:hiddenLine xmlns:a14="http://schemas.microsoft.com/office/drawing/2010/main" xmlns="" w="9525">
                     <a:solidFill>
                       <a:srgbClr val="000000"/>
                     </a:solidFill>
@@ -17948,7 +17948,7 @@
               </a:ln>
               <a:extLst>
                 <a:ext uri="{91240B29-F687-4f45-9708-019B960494DF}">
-                  <a14:hiddenLine xmlns="" xmlns:a14="http://schemas.microsoft.com/office/drawing/2010/main" w="9525">
+                  <a14:hiddenLine xmlns:a14="http://schemas.microsoft.com/office/drawing/2010/main" xmlns="" w="9525">
                     <a:solidFill>
                       <a:srgbClr val="000000"/>
                     </a:solidFill>
@@ -18046,7 +18046,7 @@
               </a:ln>
               <a:extLst>
                 <a:ext uri="{91240B29-F687-4f45-9708-019B960494DF}">
-                  <a14:hiddenLine xmlns="" xmlns:a14="http://schemas.microsoft.com/office/drawing/2010/main" w="9525">
+                  <a14:hiddenLine xmlns:a14="http://schemas.microsoft.com/office/drawing/2010/main" xmlns="" w="9525">
                     <a:solidFill>
                       <a:srgbClr val="000000"/>
                     </a:solidFill>
@@ -18161,7 +18161,7 @@
               </a:ln>
               <a:extLst>
                 <a:ext uri="{91240B29-F687-4f45-9708-019B960494DF}">
-                  <a14:hiddenLine xmlns="" xmlns:a14="http://schemas.microsoft.com/office/drawing/2010/main" w="9525">
+                  <a14:hiddenLine xmlns:a14="http://schemas.microsoft.com/office/drawing/2010/main" xmlns="" w="9525">
                     <a:solidFill>
                       <a:srgbClr val="000000"/>
                     </a:solidFill>
@@ -18251,7 +18251,7 @@
               </a:ln>
               <a:extLst>
                 <a:ext uri="{91240B29-F687-4f45-9708-019B960494DF}">
-                  <a14:hiddenLine xmlns="" xmlns:a14="http://schemas.microsoft.com/office/drawing/2010/main" w="9525">
+                  <a14:hiddenLine xmlns:a14="http://schemas.microsoft.com/office/drawing/2010/main" xmlns="" w="9525">
                     <a:solidFill>
                       <a:srgbClr val="000000"/>
                     </a:solidFill>
@@ -18316,7 +18316,7 @@
               </a:ln>
               <a:extLst>
                 <a:ext uri="{91240B29-F687-4f45-9708-019B960494DF}">
-                  <a14:hiddenLine xmlns="" xmlns:a14="http://schemas.microsoft.com/office/drawing/2010/main" w="9525">
+                  <a14:hiddenLine xmlns:a14="http://schemas.microsoft.com/office/drawing/2010/main" xmlns="" w="9525">
                     <a:solidFill>
                       <a:srgbClr val="000000"/>
                     </a:solidFill>
@@ -18406,7 +18406,7 @@
               </a:ln>
               <a:extLst>
                 <a:ext uri="{91240B29-F687-4f45-9708-019B960494DF}">
-                  <a14:hiddenLine xmlns="" xmlns:a14="http://schemas.microsoft.com/office/drawing/2010/main" w="9525">
+                  <a14:hiddenLine xmlns:a14="http://schemas.microsoft.com/office/drawing/2010/main" xmlns="" w="9525">
                     <a:solidFill>
                       <a:srgbClr val="000000"/>
                     </a:solidFill>
@@ -18474,7 +18474,7 @@
               </a:ln>
               <a:extLst>
                 <a:ext uri="{91240B29-F687-4f45-9708-019B960494DF}">
-                  <a14:hiddenLine xmlns="" xmlns:a14="http://schemas.microsoft.com/office/drawing/2010/main" w="9525">
+                  <a14:hiddenLine xmlns:a14="http://schemas.microsoft.com/office/drawing/2010/main" xmlns="" w="9525">
                     <a:solidFill>
                       <a:srgbClr val="000000"/>
                     </a:solidFill>
@@ -18564,7 +18564,7 @@
               </a:ln>
               <a:extLst>
                 <a:ext uri="{91240B29-F687-4f45-9708-019B960494DF}">
-                  <a14:hiddenLine xmlns="" xmlns:a14="http://schemas.microsoft.com/office/drawing/2010/main" w="9525">
+                  <a14:hiddenLine xmlns:a14="http://schemas.microsoft.com/office/drawing/2010/main" xmlns="" w="9525">
                     <a:solidFill>
                       <a:srgbClr val="000000"/>
                     </a:solidFill>
@@ -18632,7 +18632,7 @@
               </a:ln>
               <a:extLst>
                 <a:ext uri="{91240B29-F687-4f45-9708-019B960494DF}">
-                  <a14:hiddenLine xmlns="" xmlns:a14="http://schemas.microsoft.com/office/drawing/2010/main" w="9525">
+                  <a14:hiddenLine xmlns:a14="http://schemas.microsoft.com/office/drawing/2010/main" xmlns="" w="9525">
                     <a:solidFill>
                       <a:srgbClr val="000000"/>
                     </a:solidFill>
@@ -18722,7 +18722,7 @@
               </a:ln>
               <a:extLst>
                 <a:ext uri="{91240B29-F687-4f45-9708-019B960494DF}">
-                  <a14:hiddenLine xmlns="" xmlns:a14="http://schemas.microsoft.com/office/drawing/2010/main" w="9525">
+                  <a14:hiddenLine xmlns:a14="http://schemas.microsoft.com/office/drawing/2010/main" xmlns="" w="9525">
                     <a:solidFill>
                       <a:srgbClr val="000000"/>
                     </a:solidFill>
@@ -18756,7 +18756,7 @@
               </a:ln>
               <a:extLst>
                 <a:ext uri="{91240B29-F687-4f45-9708-019B960494DF}">
-                  <a14:hiddenLine xmlns="" xmlns:a14="http://schemas.microsoft.com/office/drawing/2010/main" w="9525">
+                  <a14:hiddenLine xmlns:a14="http://schemas.microsoft.com/office/drawing/2010/main" xmlns="" w="9525">
                     <a:solidFill>
                       <a:srgbClr val="000000"/>
                     </a:solidFill>
@@ -20227,14 +20227,14 @@
             <a:pPr rtl="0"/>
             <a:r>
               <a:rPr lang="en-GB" sz="1800" dirty="0"/>
-              <a:t> They manufacture different types of mosquito nets.</a:t>
+              <a:t>They manufacture different types of mosquito nets.</a:t>
             </a:r>
           </a:p>
           <a:p>
             <a:pPr rtl="0"/>
             <a:r>
               <a:rPr lang="en-GB" sz="1800" dirty="0"/>
-              <a:t> The factory is located in </a:t>
+              <a:t> The factory is located in </a:t>
             </a:r>
             <a:r>
               <a:rPr lang="en-GB" sz="1800" dirty="0" err="1"/>
@@ -20249,14 +20249,14 @@
             <a:pPr rtl="0"/>
             <a:r>
               <a:rPr lang="en-GB" sz="1800" dirty="0"/>
-              <a:t> The company manufactures products daily.</a:t>
+              <a:t> The company manufactures products daily.</a:t>
             </a:r>
           </a:p>
           <a:p>
             <a:pPr rtl="0"/>
             <a:r>
               <a:rPr lang="en-GB" sz="1800" dirty="0"/>
-              <a:t> They distributes them to their island-wide customer shops</a:t>
+              <a:t>They distributes them to their island-wide customer shops</a:t>
             </a:r>
           </a:p>
         </p:txBody>
@@ -20846,7 +20846,7 @@
         <p:spPr>
           <a:xfrm>
             <a:off x="1510815" y="0"/>
-            <a:ext cx="10018713" cy="1752599"/>
+            <a:ext cx="3670785" cy="1752599"/>
           </a:xfrm>
         </p:spPr>
         <p:txBody>
@@ -20855,7 +20855,19 @@
           <a:p>
             <a:pPr algn="l"/>
             <a:r>
-              <a:rPr lang="en-GB" b="1" dirty="0"/>
+              <a:rPr lang="en-GB" dirty="0">
+                <a:ln w="0"/>
+                <a:solidFill>
+                  <a:schemeClr val="accent1"/>
+                </a:solidFill>
+                <a:effectLst>
+                  <a:outerShdw blurRad="38100" dist="25400" dir="5400000" algn="ctr" rotWithShape="0">
+                    <a:srgbClr val="6E747A">
+                      <a:alpha val="43000"/>
+                    </a:srgbClr>
+                  </a:outerShdw>
+                </a:effectLst>
+              </a:rPr>
               <a:t>Main Functions</a:t>
             </a:r>
           </a:p>
@@ -20879,285 +20891,49 @@
         </p:nvSpPr>
         <p:spPr>
           <a:xfrm>
-            <a:off x="1921631" y="1323560"/>
-            <a:ext cx="7633186" cy="5249518"/>
+            <a:off x="2000231" y="2055080"/>
+            <a:ext cx="4095769" cy="2856223"/>
           </a:xfrm>
         </p:spPr>
         <p:txBody>
           <a:bodyPr>
-            <a:normAutofit fontScale="62500" lnSpcReduction="20000"/>
+            <a:normAutofit/>
           </a:bodyPr>
           <a:lstStyle/>
           <a:p>
             <a:r>
-              <a:rPr lang="en-GB" dirty="0"/>
-              <a:t>Manager</a:t>
-            </a:r>
-          </a:p>
-          <a:p>
-            <a:r>
-              <a:rPr lang="en-GB" dirty="0"/>
-              <a:t> Manage Employees and Salaries</a:t>
-            </a:r>
-          </a:p>
-          <a:p>
-            <a:r>
-              <a:rPr lang="en-GB" dirty="0"/>
-              <a:t> Manage Products</a:t>
-            </a:r>
-          </a:p>
-          <a:p>
-            <a:r>
-              <a:rPr lang="en-GB" dirty="0"/>
-              <a:t> Manage Transactions (Incomes /</a:t>
-            </a:r>
-          </a:p>
-          <a:p>
-            <a:r>
-              <a:rPr lang="en-GB" dirty="0"/>
-              <a:t>Expenses)</a:t>
-            </a:r>
-          </a:p>
-          <a:p>
-            <a:r>
-              <a:rPr lang="en-GB" dirty="0"/>
-              <a:t> Generate Reports</a:t>
-            </a:r>
-          </a:p>
-          <a:p>
-            <a:r>
-              <a:rPr lang="en-GB" dirty="0"/>
-              <a:t> Manage </a:t>
-            </a:r>
-            <a:r>
-              <a:rPr lang="en-GB" dirty="0" err="1"/>
-              <a:t>Equipments</a:t>
-            </a:r>
-            <a:endParaRPr lang="en-GB" dirty="0"/>
-          </a:p>
-          <a:p>
-            <a:r>
-              <a:rPr lang="en-GB" dirty="0"/>
-              <a:t> Manage Vehicles</a:t>
-            </a:r>
-          </a:p>
-          <a:p>
-            <a:r>
-              <a:rPr lang="en-GB" dirty="0"/>
-              <a:t>Supervisor</a:t>
-            </a:r>
-          </a:p>
-          <a:p>
-            <a:r>
-              <a:rPr lang="en-GB" dirty="0"/>
-              <a:t> Manage Attendance</a:t>
-            </a:r>
-          </a:p>
-          <a:p>
-            <a:r>
-              <a:rPr lang="en-GB" dirty="0"/>
-              <a:t> Manage Production</a:t>
-            </a:r>
-          </a:p>
-          <a:p>
-            <a:r>
-              <a:rPr lang="en-GB" dirty="0"/>
-              <a:t> Manage Distribution Trips</a:t>
-            </a:r>
-          </a:p>
-          <a:p>
-            <a:r>
-              <a:rPr lang="en-GB" dirty="0"/>
-              <a:t> Manage Materials</a:t>
-            </a:r>
-          </a:p>
-          <a:p>
-            <a:r>
-              <a:rPr lang="en-GB" dirty="0"/>
-              <a:t>Sales Rep</a:t>
-            </a:r>
-          </a:p>
-          <a:p>
-            <a:r>
-              <a:rPr lang="en-GB" dirty="0"/>
-              <a:t> Manage Distribution</a:t>
-            </a:r>
-          </a:p>
-          <a:p>
-            <a:r>
-              <a:rPr lang="en-GB" dirty="0"/>
-              <a:t> Manage Returns</a:t>
-            </a:r>
-          </a:p>
-        </p:txBody>
-      </p:sp>
-    </p:spTree>
-    <p:extLst>
-      <p:ext uri="{BB962C8B-B14F-4D97-AF65-F5344CB8AC3E}">
-        <p14:creationId xmlns:p14="http://schemas.microsoft.com/office/powerpoint/2010/main" val="1131453097"/>
-      </p:ext>
-    </p:extLst>
-  </p:cSld>
-  <p:clrMapOvr>
-    <a:masterClrMapping/>
-  </p:clrMapOvr>
-</p:sld>
-</file>
-
-<file path=ppt/slides/slide6.xml><?xml version="1.0" encoding="utf-8"?>
-<p:sld xmlns:a="http://schemas.openxmlformats.org/drawingml/2006/main" xmlns:r="http://schemas.openxmlformats.org/officeDocument/2006/relationships" xmlns:p="http://schemas.openxmlformats.org/presentationml/2006/main">
-  <p:cSld>
-    <p:spTree>
-      <p:nvGrpSpPr>
-        <p:cNvPr id="1" name=""/>
-        <p:cNvGrpSpPr/>
-        <p:nvPr/>
-      </p:nvGrpSpPr>
-      <p:grpSpPr>
-        <a:xfrm>
-          <a:off x="0" y="0"/>
-          <a:ext cx="0" cy="0"/>
-          <a:chOff x="0" y="0"/>
-          <a:chExt cx="0" cy="0"/>
-        </a:xfrm>
-      </p:grpSpPr>
-      <p:sp>
-        <p:nvSpPr>
-          <p:cNvPr id="2" name="Title 1">
-            <a:extLst>
-              <a:ext uri="{FF2B5EF4-FFF2-40B4-BE49-F238E27FC236}">
-                <a16:creationId xmlns:a16="http://schemas.microsoft.com/office/drawing/2014/main" id="{E03D895B-F4A1-7E04-9CAB-F594B4D4C153}"/>
-              </a:ext>
-            </a:extLst>
-          </p:cNvPr>
-          <p:cNvSpPr>
-            <a:spLocks noGrp="1"/>
-          </p:cNvSpPr>
-          <p:nvPr>
-            <p:ph type="title"/>
-          </p:nvPr>
-        </p:nvSpPr>
-        <p:spPr>
-          <a:xfrm>
-            <a:off x="1577076" y="0"/>
-            <a:ext cx="10018713" cy="1752599"/>
-          </a:xfrm>
-        </p:spPr>
-        <p:txBody>
-          <a:bodyPr/>
-          <a:lstStyle/>
-          <a:p>
-            <a:pPr algn="l"/>
-            <a:r>
-              <a:rPr lang="en-GB" b="1" dirty="0"/>
-              <a:t>Technical Details</a:t>
-            </a:r>
-          </a:p>
-        </p:txBody>
-      </p:sp>
-      <p:sp>
-        <p:nvSpPr>
-          <p:cNvPr id="3" name="Content Placeholder 2">
-            <a:extLst>
-              <a:ext uri="{FF2B5EF4-FFF2-40B4-BE49-F238E27FC236}">
-                <a16:creationId xmlns:a16="http://schemas.microsoft.com/office/drawing/2014/main" id="{88AB686B-F6E8-D97A-7FD9-4362B69EB914}"/>
-              </a:ext>
-            </a:extLst>
-          </p:cNvPr>
-          <p:cNvSpPr>
-            <a:spLocks noGrp="1"/>
-          </p:cNvSpPr>
-          <p:nvPr>
-            <p:ph idx="1"/>
-          </p:nvPr>
-        </p:nvSpPr>
-        <p:spPr>
-          <a:xfrm>
-            <a:off x="2902293" y="1249017"/>
-            <a:ext cx="7407898" cy="5509592"/>
-          </a:xfrm>
-        </p:spPr>
-        <p:txBody>
-          <a:bodyPr>
-            <a:normAutofit fontScale="92500" lnSpcReduction="20000"/>
-          </a:bodyPr>
-          <a:lstStyle/>
-          <a:p>
-            <a:r>
-              <a:rPr lang="en-GB" dirty="0"/>
-              <a:t>Platform</a:t>
-            </a:r>
-          </a:p>
-          <a:p>
-            <a:r>
-              <a:rPr lang="en-GB" dirty="0"/>
-              <a:t>Web Application</a:t>
-            </a:r>
-          </a:p>
-          <a:p>
-            <a:r>
-              <a:rPr lang="en-GB" dirty="0"/>
-              <a:t>Programming Languages</a:t>
-            </a:r>
-          </a:p>
-          <a:p>
-            <a:r>
-              <a:rPr lang="en-GB" dirty="0"/>
-              <a:t>PHP</a:t>
-            </a:r>
-          </a:p>
-          <a:p>
-            <a:r>
-              <a:rPr lang="en-GB" dirty="0"/>
-              <a:t>HTML</a:t>
-            </a:r>
-          </a:p>
-          <a:p>
-            <a:r>
-              <a:rPr lang="en-GB" dirty="0"/>
-              <a:t>JavaScript</a:t>
-            </a:r>
-          </a:p>
-          <a:p>
-            <a:r>
-              <a:rPr lang="en-GB" dirty="0"/>
-              <a:t>Visual Studio Code</a:t>
-            </a:r>
-          </a:p>
-          <a:p>
-            <a:r>
-              <a:rPr lang="en-GB" dirty="0"/>
-              <a:t>UI Framework</a:t>
-            </a:r>
-          </a:p>
-          <a:p>
-            <a:r>
-              <a:rPr lang="en-GB" dirty="0"/>
-              <a:t>Bootstrap</a:t>
-            </a:r>
-          </a:p>
-          <a:p>
-            <a:r>
-              <a:rPr lang="en-GB" dirty="0"/>
-              <a:t>Database</a:t>
-            </a:r>
-          </a:p>
-          <a:p>
-            <a:r>
-              <a:rPr lang="en-GB" dirty="0"/>
-              <a:t>MySQL</a:t>
-            </a:r>
-          </a:p>
-          <a:p>
-            <a:r>
-              <a:rPr lang="en-GB" dirty="0"/>
-              <a:t>Web Server Solution</a:t>
-            </a:r>
-          </a:p>
-          <a:p>
-            <a:r>
-              <a:rPr lang="en-GB" dirty="0"/>
-              <a:t>WAMPP</a:t>
+              <a:rPr lang="en-GB" sz="2000" dirty="0"/>
+              <a:t>Manage Employees</a:t>
+            </a:r>
+          </a:p>
+          <a:p>
+            <a:r>
+              <a:rPr lang="en-GB" sz="2000" dirty="0"/>
+              <a:t>Manage Items</a:t>
+            </a:r>
+          </a:p>
+          <a:p>
+            <a:r>
+              <a:rPr lang="en-GB" sz="2000" dirty="0"/>
+              <a:t>Manage Purchases</a:t>
+            </a:r>
+          </a:p>
+          <a:p>
+            <a:r>
+              <a:rPr lang="en-GB" sz="2000" dirty="0"/>
+              <a:t>Generate Reports</a:t>
+            </a:r>
+          </a:p>
+          <a:p>
+            <a:r>
+              <a:rPr lang="en-GB" sz="2000" dirty="0"/>
+              <a:t>Manage Sales</a:t>
+            </a:r>
+          </a:p>
+          <a:p>
+            <a:r>
+              <a:rPr lang="en-GB" sz="2000" dirty="0"/>
+              <a:t>Manage Supplier</a:t>
             </a:r>
           </a:p>
         </p:txBody>
@@ -21167,7 +20943,7 @@
           <p:cNvPr id="4" name="TextBox 3">
             <a:extLst>
               <a:ext uri="{FF2B5EF4-FFF2-40B4-BE49-F238E27FC236}">
-                <a16:creationId xmlns:a16="http://schemas.microsoft.com/office/drawing/2014/main" id="{19F2F744-B3E0-D60E-DFCB-B5C8E6ECF287}"/>
+                <a16:creationId xmlns:a16="http://schemas.microsoft.com/office/drawing/2014/main" id="{501034C2-98F0-6813-67F1-9926ED180480}"/>
               </a:ext>
             </a:extLst>
           </p:cNvPr>
@@ -21176,8 +20952,8 @@
         </p:nvSpPr>
         <p:spPr>
           <a:xfrm>
-            <a:off x="1577076" y="4220308"/>
-            <a:ext cx="522900" cy="369332"/>
+            <a:off x="7892812" y="4219748"/>
+            <a:ext cx="1815305" cy="461665"/>
           </a:xfrm>
           <a:prstGeom prst="rect">
             <a:avLst/>
@@ -21191,18 +20967,92 @@
           <a:lstStyle/>
           <a:p>
             <a:r>
-              <a:rPr lang="en-GB" dirty="0"/>
-              <a:t>IDE</a:t>
-            </a:r>
-          </a:p>
-        </p:txBody>
-      </p:sp>
-      <p:sp>
-        <p:nvSpPr>
-          <p:cNvPr id="5" name="Content Placeholder 2">
+              <a:rPr lang="en-GB" sz="2400" b="1" dirty="0"/>
+              <a:t>Storekeeper</a:t>
+            </a:r>
+          </a:p>
+        </p:txBody>
+      </p:sp>
+      <p:sp>
+        <p:nvSpPr>
+          <p:cNvPr id="5" name="TextBox 4">
             <a:extLst>
               <a:ext uri="{FF2B5EF4-FFF2-40B4-BE49-F238E27FC236}">
-                <a16:creationId xmlns:a16="http://schemas.microsoft.com/office/drawing/2014/main" id="{8A12F7A5-40F2-A68C-F4F8-430A1A5F04A0}"/>
+                <a16:creationId xmlns:a16="http://schemas.microsoft.com/office/drawing/2014/main" id="{9F3459AB-8060-9698-8AF3-EE10214700DF}"/>
+              </a:ext>
+            </a:extLst>
+          </p:cNvPr>
+          <p:cNvSpPr txBox="1"/>
+          <p:nvPr/>
+        </p:nvSpPr>
+        <p:spPr>
+          <a:xfrm>
+            <a:off x="2000231" y="1577366"/>
+            <a:ext cx="2190023" cy="461665"/>
+          </a:xfrm>
+          <a:prstGeom prst="rect">
+            <a:avLst/>
+          </a:prstGeom>
+          <a:noFill/>
+        </p:spPr>
+        <p:txBody>
+          <a:bodyPr wrap="square" rtlCol="0">
+            <a:spAutoFit/>
+          </a:bodyPr>
+          <a:lstStyle/>
+          <a:p>
+            <a:r>
+              <a:rPr lang="en-GB" sz="2400" b="1" dirty="0"/>
+              <a:t>Owner (Admin</a:t>
+            </a:r>
+            <a:r>
+              <a:rPr lang="en-GB" sz="2000" dirty="0"/>
+              <a:t>)</a:t>
+            </a:r>
+          </a:p>
+        </p:txBody>
+      </p:sp>
+      <p:sp>
+        <p:nvSpPr>
+          <p:cNvPr id="6" name="TextBox 5">
+            <a:extLst>
+              <a:ext uri="{FF2B5EF4-FFF2-40B4-BE49-F238E27FC236}">
+                <a16:creationId xmlns:a16="http://schemas.microsoft.com/office/drawing/2014/main" id="{F4021386-A0D9-EEB0-D88E-1F47766E4384}"/>
+              </a:ext>
+            </a:extLst>
+          </p:cNvPr>
+          <p:cNvSpPr txBox="1"/>
+          <p:nvPr/>
+        </p:nvSpPr>
+        <p:spPr>
+          <a:xfrm>
+            <a:off x="7892813" y="1535667"/>
+            <a:ext cx="1165704" cy="461665"/>
+          </a:xfrm>
+          <a:prstGeom prst="rect">
+            <a:avLst/>
+          </a:prstGeom>
+          <a:noFill/>
+        </p:spPr>
+        <p:txBody>
+          <a:bodyPr wrap="none" rtlCol="0">
+            <a:spAutoFit/>
+          </a:bodyPr>
+          <a:lstStyle/>
+          <a:p>
+            <a:r>
+              <a:rPr lang="en-GB" sz="2400" b="1" dirty="0"/>
+              <a:t>Cashier</a:t>
+            </a:r>
+          </a:p>
+        </p:txBody>
+      </p:sp>
+      <p:sp>
+        <p:nvSpPr>
+          <p:cNvPr id="7" name="Content Placeholder 2">
+            <a:extLst>
+              <a:ext uri="{FF2B5EF4-FFF2-40B4-BE49-F238E27FC236}">
+                <a16:creationId xmlns:a16="http://schemas.microsoft.com/office/drawing/2014/main" id="{5B4EC348-E860-7285-E0D7-786F88979343}"/>
               </a:ext>
             </a:extLst>
           </p:cNvPr>
@@ -21213,8 +21063,8 @@
         </p:nvSpPr>
         <p:spPr>
           <a:xfrm>
-            <a:off x="1577076" y="4600700"/>
-            <a:ext cx="2900664" cy="503582"/>
+            <a:off x="8001748" y="1997333"/>
+            <a:ext cx="3767982" cy="2453248"/>
           </a:xfrm>
           <a:prstGeom prst="rect">
             <a:avLst/>
@@ -21454,7 +21304,1924 @@
           <a:p>
             <a:r>
               <a:rPr lang="en-GB" dirty="0"/>
+              <a:t>Manage Employees and Salaries</a:t>
+            </a:r>
+          </a:p>
+          <a:p>
+            <a:r>
+              <a:rPr lang="en-GB" dirty="0"/>
+              <a:t>Manage Products</a:t>
+            </a:r>
+          </a:p>
+          <a:p>
+            <a:r>
+              <a:rPr lang="en-GB" dirty="0"/>
+              <a:t>Manage Transactions (Incomes / Expenses)</a:t>
+            </a:r>
+          </a:p>
+        </p:txBody>
+      </p:sp>
+      <p:sp>
+        <p:nvSpPr>
+          <p:cNvPr id="8" name="TextBox 7">
+            <a:extLst>
+              <a:ext uri="{FF2B5EF4-FFF2-40B4-BE49-F238E27FC236}">
+                <a16:creationId xmlns:a16="http://schemas.microsoft.com/office/drawing/2014/main" id="{564D653B-9DE4-8FE9-0EA2-72A3208554B8}"/>
+              </a:ext>
+            </a:extLst>
+          </p:cNvPr>
+          <p:cNvSpPr txBox="1"/>
+          <p:nvPr/>
+        </p:nvSpPr>
+        <p:spPr>
+          <a:xfrm>
+            <a:off x="7892812" y="5322333"/>
+            <a:ext cx="1598194" cy="461665"/>
+          </a:xfrm>
+          <a:prstGeom prst="rect">
+            <a:avLst/>
+          </a:prstGeom>
+          <a:noFill/>
+        </p:spPr>
+        <p:txBody>
+          <a:bodyPr wrap="none" rtlCol="0">
+            <a:spAutoFit/>
+          </a:bodyPr>
+          <a:lstStyle/>
+          <a:p>
+            <a:r>
+              <a:rPr lang="en-GB" sz="2400" b="1" dirty="0"/>
+              <a:t>Technician</a:t>
+            </a:r>
+          </a:p>
+        </p:txBody>
+      </p:sp>
+      <p:sp>
+        <p:nvSpPr>
+          <p:cNvPr id="9" name="Content Placeholder 2">
+            <a:extLst>
+              <a:ext uri="{FF2B5EF4-FFF2-40B4-BE49-F238E27FC236}">
+                <a16:creationId xmlns:a16="http://schemas.microsoft.com/office/drawing/2014/main" id="{408091CF-3C58-BCAF-BDC5-6B8329635DE8}"/>
+              </a:ext>
+            </a:extLst>
+          </p:cNvPr>
+          <p:cNvSpPr txBox="1">
+            <a:spLocks/>
+          </p:cNvSpPr>
+          <p:nvPr/>
+        </p:nvSpPr>
+        <p:spPr>
+          <a:xfrm>
+            <a:off x="7944396" y="4492087"/>
+            <a:ext cx="3767983" cy="995791"/>
+          </a:xfrm>
+          <a:prstGeom prst="rect">
+            <a:avLst/>
+          </a:prstGeom>
+        </p:spPr>
+        <p:txBody>
+          <a:bodyPr vert="horz" lIns="91440" tIns="45720" rIns="91440" bIns="45720" rtlCol="0" anchor="ctr">
+            <a:normAutofit/>
+          </a:bodyPr>
+          <a:lstStyle>
+            <a:lvl1pPr marL="285750" indent="-285750" algn="l" defTabSz="457200" rtl="0" eaLnBrk="1" latinLnBrk="0" hangingPunct="1">
+              <a:spcBef>
+                <a:spcPct val="20000"/>
+              </a:spcBef>
+              <a:spcAft>
+                <a:spcPts val="600"/>
+              </a:spcAft>
+              <a:buClr>
+                <a:schemeClr val="accent1">
+                  <a:lumMod val="75000"/>
+                </a:schemeClr>
+              </a:buClr>
+              <a:buSzPct val="145000"/>
+              <a:buFont typeface="Arial"/>
+              <a:buChar char="•"/>
+              <a:defRPr sz="2400" kern="1200" cap="none">
+                <a:solidFill>
+                  <a:schemeClr val="tx1"/>
+                </a:solidFill>
+                <a:effectLst/>
+                <a:latin typeface="+mn-lt"/>
+                <a:ea typeface="+mn-ea"/>
+                <a:cs typeface="+mn-cs"/>
+              </a:defRPr>
+            </a:lvl1pPr>
+            <a:lvl2pPr marL="742950" indent="-285750" algn="l" defTabSz="457200" rtl="0" eaLnBrk="1" latinLnBrk="0" hangingPunct="1">
+              <a:spcBef>
+                <a:spcPct val="20000"/>
+              </a:spcBef>
+              <a:spcAft>
+                <a:spcPts val="600"/>
+              </a:spcAft>
+              <a:buClr>
+                <a:schemeClr val="accent1">
+                  <a:lumMod val="75000"/>
+                </a:schemeClr>
+              </a:buClr>
+              <a:buSzPct val="145000"/>
+              <a:buFont typeface="Arial"/>
+              <a:buChar char="•"/>
+              <a:defRPr sz="2000" kern="1200" cap="none">
+                <a:solidFill>
+                  <a:schemeClr val="tx1"/>
+                </a:solidFill>
+                <a:effectLst/>
+                <a:latin typeface="+mn-lt"/>
+                <a:ea typeface="+mn-ea"/>
+                <a:cs typeface="+mn-cs"/>
+              </a:defRPr>
+            </a:lvl2pPr>
+            <a:lvl3pPr marL="1200150" indent="-285750" algn="l" defTabSz="457200" rtl="0" eaLnBrk="1" latinLnBrk="0" hangingPunct="1">
+              <a:spcBef>
+                <a:spcPct val="20000"/>
+              </a:spcBef>
+              <a:spcAft>
+                <a:spcPts val="600"/>
+              </a:spcAft>
+              <a:buClr>
+                <a:schemeClr val="accent1">
+                  <a:lumMod val="75000"/>
+                </a:schemeClr>
+              </a:buClr>
+              <a:buSzPct val="145000"/>
+              <a:buFont typeface="Arial"/>
+              <a:buChar char="•"/>
+              <a:defRPr sz="1800" kern="1200" cap="none">
+                <a:solidFill>
+                  <a:schemeClr val="tx1"/>
+                </a:solidFill>
+                <a:effectLst/>
+                <a:latin typeface="+mn-lt"/>
+                <a:ea typeface="+mn-ea"/>
+                <a:cs typeface="+mn-cs"/>
+              </a:defRPr>
+            </a:lvl3pPr>
+            <a:lvl4pPr marL="1543050" indent="-171450" algn="l" defTabSz="457200" rtl="0" eaLnBrk="1" latinLnBrk="0" hangingPunct="1">
+              <a:spcBef>
+                <a:spcPct val="20000"/>
+              </a:spcBef>
+              <a:spcAft>
+                <a:spcPts val="600"/>
+              </a:spcAft>
+              <a:buClr>
+                <a:schemeClr val="accent1">
+                  <a:lumMod val="75000"/>
+                </a:schemeClr>
+              </a:buClr>
+              <a:buSzPct val="145000"/>
+              <a:buFont typeface="Arial"/>
+              <a:buChar char="•"/>
+              <a:defRPr sz="1600" kern="1200" cap="none">
+                <a:solidFill>
+                  <a:schemeClr val="tx1"/>
+                </a:solidFill>
+                <a:effectLst/>
+                <a:latin typeface="+mn-lt"/>
+                <a:ea typeface="+mn-ea"/>
+                <a:cs typeface="+mn-cs"/>
+              </a:defRPr>
+            </a:lvl4pPr>
+            <a:lvl5pPr marL="2000250" indent="-171450" algn="l" defTabSz="457200" rtl="0" eaLnBrk="1" latinLnBrk="0" hangingPunct="1">
+              <a:spcBef>
+                <a:spcPct val="20000"/>
+              </a:spcBef>
+              <a:spcAft>
+                <a:spcPts val="600"/>
+              </a:spcAft>
+              <a:buClr>
+                <a:schemeClr val="accent1">
+                  <a:lumMod val="75000"/>
+                </a:schemeClr>
+              </a:buClr>
+              <a:buSzPct val="145000"/>
+              <a:buFont typeface="Arial"/>
+              <a:buChar char="•"/>
+              <a:defRPr sz="1400" kern="1200" cap="none">
+                <a:solidFill>
+                  <a:schemeClr val="tx1"/>
+                </a:solidFill>
+                <a:effectLst/>
+                <a:latin typeface="+mn-lt"/>
+                <a:ea typeface="+mn-ea"/>
+                <a:cs typeface="+mn-cs"/>
+              </a:defRPr>
+            </a:lvl5pPr>
+            <a:lvl6pPr marL="2514600" indent="-228600" algn="l" defTabSz="457200" rtl="0" eaLnBrk="1" latinLnBrk="0" hangingPunct="1">
+              <a:spcBef>
+                <a:spcPct val="20000"/>
+              </a:spcBef>
+              <a:spcAft>
+                <a:spcPts val="600"/>
+              </a:spcAft>
+              <a:buClr>
+                <a:schemeClr val="accent1">
+                  <a:lumMod val="75000"/>
+                </a:schemeClr>
+              </a:buClr>
+              <a:buSzPct val="145000"/>
+              <a:buFont typeface="Arial"/>
+              <a:buChar char="•"/>
+              <a:defRPr sz="1400" kern="1200" cap="none">
+                <a:solidFill>
+                  <a:schemeClr val="tx1"/>
+                </a:solidFill>
+                <a:effectLst/>
+                <a:latin typeface="+mn-lt"/>
+                <a:ea typeface="+mn-ea"/>
+                <a:cs typeface="+mn-cs"/>
+              </a:defRPr>
+            </a:lvl6pPr>
+            <a:lvl7pPr marL="2971800" indent="-228600" algn="l" defTabSz="457200" rtl="0" eaLnBrk="1" latinLnBrk="0" hangingPunct="1">
+              <a:spcBef>
+                <a:spcPct val="20000"/>
+              </a:spcBef>
+              <a:spcAft>
+                <a:spcPts val="600"/>
+              </a:spcAft>
+              <a:buClr>
+                <a:schemeClr val="accent1">
+                  <a:lumMod val="75000"/>
+                </a:schemeClr>
+              </a:buClr>
+              <a:buSzPct val="145000"/>
+              <a:buFont typeface="Arial"/>
+              <a:buChar char="•"/>
+              <a:defRPr sz="1400" kern="1200" cap="none">
+                <a:solidFill>
+                  <a:schemeClr val="tx1"/>
+                </a:solidFill>
+                <a:effectLst/>
+                <a:latin typeface="+mn-lt"/>
+                <a:ea typeface="+mn-ea"/>
+                <a:cs typeface="+mn-cs"/>
+              </a:defRPr>
+            </a:lvl7pPr>
+            <a:lvl8pPr marL="3429000" indent="-228600" algn="l" defTabSz="457200" rtl="0" eaLnBrk="1" latinLnBrk="0" hangingPunct="1">
+              <a:spcBef>
+                <a:spcPct val="20000"/>
+              </a:spcBef>
+              <a:spcAft>
+                <a:spcPts val="600"/>
+              </a:spcAft>
+              <a:buClr>
+                <a:schemeClr val="accent1">
+                  <a:lumMod val="75000"/>
+                </a:schemeClr>
+              </a:buClr>
+              <a:buSzPct val="145000"/>
+              <a:buFont typeface="Arial"/>
+              <a:buChar char="•"/>
+              <a:defRPr sz="1400" kern="1200" cap="none">
+                <a:solidFill>
+                  <a:schemeClr val="tx1"/>
+                </a:solidFill>
+                <a:effectLst/>
+                <a:latin typeface="+mn-lt"/>
+                <a:ea typeface="+mn-ea"/>
+                <a:cs typeface="+mn-cs"/>
+              </a:defRPr>
+            </a:lvl8pPr>
+            <a:lvl9pPr marL="3886200" indent="-228600" algn="l" defTabSz="457200" rtl="0" eaLnBrk="1" latinLnBrk="0" hangingPunct="1">
+              <a:spcBef>
+                <a:spcPct val="20000"/>
+              </a:spcBef>
+              <a:spcAft>
+                <a:spcPts val="600"/>
+              </a:spcAft>
+              <a:buClr>
+                <a:schemeClr val="accent1">
+                  <a:lumMod val="75000"/>
+                </a:schemeClr>
+              </a:buClr>
+              <a:buSzPct val="145000"/>
+              <a:buFont typeface="Arial"/>
+              <a:buChar char="•"/>
+              <a:defRPr sz="1400" kern="1200" cap="none">
+                <a:solidFill>
+                  <a:schemeClr val="tx1"/>
+                </a:solidFill>
+                <a:effectLst/>
+                <a:latin typeface="+mn-lt"/>
+                <a:ea typeface="+mn-ea"/>
+                <a:cs typeface="+mn-cs"/>
+              </a:defRPr>
+            </a:lvl9pPr>
+          </a:lstStyle>
+          <a:p>
+            <a:r>
+              <a:rPr lang="en-GB" dirty="0"/>
+              <a:t>Manage Employees and Salaries</a:t>
+            </a:r>
+          </a:p>
+        </p:txBody>
+      </p:sp>
+      <p:sp>
+        <p:nvSpPr>
+          <p:cNvPr id="11" name="Content Placeholder 2">
+            <a:extLst>
+              <a:ext uri="{FF2B5EF4-FFF2-40B4-BE49-F238E27FC236}">
+                <a16:creationId xmlns:a16="http://schemas.microsoft.com/office/drawing/2014/main" id="{A9C8C88B-C794-92CB-ABFE-34B32DA3EC9F}"/>
+              </a:ext>
+            </a:extLst>
+          </p:cNvPr>
+          <p:cNvSpPr txBox="1">
+            <a:spLocks/>
+          </p:cNvSpPr>
+          <p:nvPr/>
+        </p:nvSpPr>
+        <p:spPr>
+          <a:xfrm>
+            <a:off x="7892812" y="5760217"/>
+            <a:ext cx="3767983" cy="995791"/>
+          </a:xfrm>
+          <a:prstGeom prst="rect">
+            <a:avLst/>
+          </a:prstGeom>
+        </p:spPr>
+        <p:txBody>
+          <a:bodyPr vert="horz" lIns="91440" tIns="45720" rIns="91440" bIns="45720" rtlCol="0" anchor="ctr">
+            <a:normAutofit/>
+          </a:bodyPr>
+          <a:lstStyle>
+            <a:lvl1pPr marL="285750" indent="-285750" algn="l" defTabSz="457200" rtl="0" eaLnBrk="1" latinLnBrk="0" hangingPunct="1">
+              <a:spcBef>
+                <a:spcPct val="20000"/>
+              </a:spcBef>
+              <a:spcAft>
+                <a:spcPts val="600"/>
+              </a:spcAft>
+              <a:buClr>
+                <a:schemeClr val="accent1">
+                  <a:lumMod val="75000"/>
+                </a:schemeClr>
+              </a:buClr>
+              <a:buSzPct val="145000"/>
+              <a:buFont typeface="Arial"/>
+              <a:buChar char="•"/>
+              <a:defRPr sz="2400" kern="1200" cap="none">
+                <a:solidFill>
+                  <a:schemeClr val="tx1"/>
+                </a:solidFill>
+                <a:effectLst/>
+                <a:latin typeface="+mn-lt"/>
+                <a:ea typeface="+mn-ea"/>
+                <a:cs typeface="+mn-cs"/>
+              </a:defRPr>
+            </a:lvl1pPr>
+            <a:lvl2pPr marL="742950" indent="-285750" algn="l" defTabSz="457200" rtl="0" eaLnBrk="1" latinLnBrk="0" hangingPunct="1">
+              <a:spcBef>
+                <a:spcPct val="20000"/>
+              </a:spcBef>
+              <a:spcAft>
+                <a:spcPts val="600"/>
+              </a:spcAft>
+              <a:buClr>
+                <a:schemeClr val="accent1">
+                  <a:lumMod val="75000"/>
+                </a:schemeClr>
+              </a:buClr>
+              <a:buSzPct val="145000"/>
+              <a:buFont typeface="Arial"/>
+              <a:buChar char="•"/>
+              <a:defRPr sz="2000" kern="1200" cap="none">
+                <a:solidFill>
+                  <a:schemeClr val="tx1"/>
+                </a:solidFill>
+                <a:effectLst/>
+                <a:latin typeface="+mn-lt"/>
+                <a:ea typeface="+mn-ea"/>
+                <a:cs typeface="+mn-cs"/>
+              </a:defRPr>
+            </a:lvl2pPr>
+            <a:lvl3pPr marL="1200150" indent="-285750" algn="l" defTabSz="457200" rtl="0" eaLnBrk="1" latinLnBrk="0" hangingPunct="1">
+              <a:spcBef>
+                <a:spcPct val="20000"/>
+              </a:spcBef>
+              <a:spcAft>
+                <a:spcPts val="600"/>
+              </a:spcAft>
+              <a:buClr>
+                <a:schemeClr val="accent1">
+                  <a:lumMod val="75000"/>
+                </a:schemeClr>
+              </a:buClr>
+              <a:buSzPct val="145000"/>
+              <a:buFont typeface="Arial"/>
+              <a:buChar char="•"/>
+              <a:defRPr sz="1800" kern="1200" cap="none">
+                <a:solidFill>
+                  <a:schemeClr val="tx1"/>
+                </a:solidFill>
+                <a:effectLst/>
+                <a:latin typeface="+mn-lt"/>
+                <a:ea typeface="+mn-ea"/>
+                <a:cs typeface="+mn-cs"/>
+              </a:defRPr>
+            </a:lvl3pPr>
+            <a:lvl4pPr marL="1543050" indent="-171450" algn="l" defTabSz="457200" rtl="0" eaLnBrk="1" latinLnBrk="0" hangingPunct="1">
+              <a:spcBef>
+                <a:spcPct val="20000"/>
+              </a:spcBef>
+              <a:spcAft>
+                <a:spcPts val="600"/>
+              </a:spcAft>
+              <a:buClr>
+                <a:schemeClr val="accent1">
+                  <a:lumMod val="75000"/>
+                </a:schemeClr>
+              </a:buClr>
+              <a:buSzPct val="145000"/>
+              <a:buFont typeface="Arial"/>
+              <a:buChar char="•"/>
+              <a:defRPr sz="1600" kern="1200" cap="none">
+                <a:solidFill>
+                  <a:schemeClr val="tx1"/>
+                </a:solidFill>
+                <a:effectLst/>
+                <a:latin typeface="+mn-lt"/>
+                <a:ea typeface="+mn-ea"/>
+                <a:cs typeface="+mn-cs"/>
+              </a:defRPr>
+            </a:lvl4pPr>
+            <a:lvl5pPr marL="2000250" indent="-171450" algn="l" defTabSz="457200" rtl="0" eaLnBrk="1" latinLnBrk="0" hangingPunct="1">
+              <a:spcBef>
+                <a:spcPct val="20000"/>
+              </a:spcBef>
+              <a:spcAft>
+                <a:spcPts val="600"/>
+              </a:spcAft>
+              <a:buClr>
+                <a:schemeClr val="accent1">
+                  <a:lumMod val="75000"/>
+                </a:schemeClr>
+              </a:buClr>
+              <a:buSzPct val="145000"/>
+              <a:buFont typeface="Arial"/>
+              <a:buChar char="•"/>
+              <a:defRPr sz="1400" kern="1200" cap="none">
+                <a:solidFill>
+                  <a:schemeClr val="tx1"/>
+                </a:solidFill>
+                <a:effectLst/>
+                <a:latin typeface="+mn-lt"/>
+                <a:ea typeface="+mn-ea"/>
+                <a:cs typeface="+mn-cs"/>
+              </a:defRPr>
+            </a:lvl5pPr>
+            <a:lvl6pPr marL="2514600" indent="-228600" algn="l" defTabSz="457200" rtl="0" eaLnBrk="1" latinLnBrk="0" hangingPunct="1">
+              <a:spcBef>
+                <a:spcPct val="20000"/>
+              </a:spcBef>
+              <a:spcAft>
+                <a:spcPts val="600"/>
+              </a:spcAft>
+              <a:buClr>
+                <a:schemeClr val="accent1">
+                  <a:lumMod val="75000"/>
+                </a:schemeClr>
+              </a:buClr>
+              <a:buSzPct val="145000"/>
+              <a:buFont typeface="Arial"/>
+              <a:buChar char="•"/>
+              <a:defRPr sz="1400" kern="1200" cap="none">
+                <a:solidFill>
+                  <a:schemeClr val="tx1"/>
+                </a:solidFill>
+                <a:effectLst/>
+                <a:latin typeface="+mn-lt"/>
+                <a:ea typeface="+mn-ea"/>
+                <a:cs typeface="+mn-cs"/>
+              </a:defRPr>
+            </a:lvl6pPr>
+            <a:lvl7pPr marL="2971800" indent="-228600" algn="l" defTabSz="457200" rtl="0" eaLnBrk="1" latinLnBrk="0" hangingPunct="1">
+              <a:spcBef>
+                <a:spcPct val="20000"/>
+              </a:spcBef>
+              <a:spcAft>
+                <a:spcPts val="600"/>
+              </a:spcAft>
+              <a:buClr>
+                <a:schemeClr val="accent1">
+                  <a:lumMod val="75000"/>
+                </a:schemeClr>
+              </a:buClr>
+              <a:buSzPct val="145000"/>
+              <a:buFont typeface="Arial"/>
+              <a:buChar char="•"/>
+              <a:defRPr sz="1400" kern="1200" cap="none">
+                <a:solidFill>
+                  <a:schemeClr val="tx1"/>
+                </a:solidFill>
+                <a:effectLst/>
+                <a:latin typeface="+mn-lt"/>
+                <a:ea typeface="+mn-ea"/>
+                <a:cs typeface="+mn-cs"/>
+              </a:defRPr>
+            </a:lvl7pPr>
+            <a:lvl8pPr marL="3429000" indent="-228600" algn="l" defTabSz="457200" rtl="0" eaLnBrk="1" latinLnBrk="0" hangingPunct="1">
+              <a:spcBef>
+                <a:spcPct val="20000"/>
+              </a:spcBef>
+              <a:spcAft>
+                <a:spcPts val="600"/>
+              </a:spcAft>
+              <a:buClr>
+                <a:schemeClr val="accent1">
+                  <a:lumMod val="75000"/>
+                </a:schemeClr>
+              </a:buClr>
+              <a:buSzPct val="145000"/>
+              <a:buFont typeface="Arial"/>
+              <a:buChar char="•"/>
+              <a:defRPr sz="1400" kern="1200" cap="none">
+                <a:solidFill>
+                  <a:schemeClr val="tx1"/>
+                </a:solidFill>
+                <a:effectLst/>
+                <a:latin typeface="+mn-lt"/>
+                <a:ea typeface="+mn-ea"/>
+                <a:cs typeface="+mn-cs"/>
+              </a:defRPr>
+            </a:lvl8pPr>
+            <a:lvl9pPr marL="3886200" indent="-228600" algn="l" defTabSz="457200" rtl="0" eaLnBrk="1" latinLnBrk="0" hangingPunct="1">
+              <a:spcBef>
+                <a:spcPct val="20000"/>
+              </a:spcBef>
+              <a:spcAft>
+                <a:spcPts val="600"/>
+              </a:spcAft>
+              <a:buClr>
+                <a:schemeClr val="accent1">
+                  <a:lumMod val="75000"/>
+                </a:schemeClr>
+              </a:buClr>
+              <a:buSzPct val="145000"/>
+              <a:buFont typeface="Arial"/>
+              <a:buChar char="•"/>
+              <a:defRPr sz="1400" kern="1200" cap="none">
+                <a:solidFill>
+                  <a:schemeClr val="tx1"/>
+                </a:solidFill>
+                <a:effectLst/>
+                <a:latin typeface="+mn-lt"/>
+                <a:ea typeface="+mn-ea"/>
+                <a:cs typeface="+mn-cs"/>
+              </a:defRPr>
+            </a:lvl9pPr>
+          </a:lstStyle>
+          <a:p>
+            <a:r>
+              <a:rPr lang="en-GB" dirty="0"/>
+              <a:t>Manage Employees and Salaries</a:t>
+            </a:r>
+          </a:p>
+        </p:txBody>
+      </p:sp>
+    </p:spTree>
+    <p:extLst>
+      <p:ext uri="{BB962C8B-B14F-4D97-AF65-F5344CB8AC3E}">
+        <p14:creationId xmlns:p14="http://schemas.microsoft.com/office/powerpoint/2010/main" val="1131453097"/>
+      </p:ext>
+    </p:extLst>
+  </p:cSld>
+  <p:clrMapOvr>
+    <a:masterClrMapping/>
+  </p:clrMapOvr>
+</p:sld>
+</file>
+
+<file path=ppt/slides/slide6.xml><?xml version="1.0" encoding="utf-8"?>
+<p:sld xmlns:a="http://schemas.openxmlformats.org/drawingml/2006/main" xmlns:r="http://schemas.openxmlformats.org/officeDocument/2006/relationships" xmlns:p="http://schemas.openxmlformats.org/presentationml/2006/main">
+  <p:cSld>
+    <p:spTree>
+      <p:nvGrpSpPr>
+        <p:cNvPr id="1" name=""/>
+        <p:cNvGrpSpPr/>
+        <p:nvPr/>
+      </p:nvGrpSpPr>
+      <p:grpSpPr>
+        <a:xfrm>
+          <a:off x="0" y="0"/>
+          <a:ext cx="0" cy="0"/>
+          <a:chOff x="0" y="0"/>
+          <a:chExt cx="0" cy="0"/>
+        </a:xfrm>
+      </p:grpSpPr>
+      <p:sp>
+        <p:nvSpPr>
+          <p:cNvPr id="2" name="Title 1">
+            <a:extLst>
+              <a:ext uri="{FF2B5EF4-FFF2-40B4-BE49-F238E27FC236}">
+                <a16:creationId xmlns:a16="http://schemas.microsoft.com/office/drawing/2014/main" id="{E03D895B-F4A1-7E04-9CAB-F594B4D4C153}"/>
+              </a:ext>
+            </a:extLst>
+          </p:cNvPr>
+          <p:cNvSpPr>
+            <a:spLocks noGrp="1"/>
+          </p:cNvSpPr>
+          <p:nvPr>
+            <p:ph type="title"/>
+          </p:nvPr>
+        </p:nvSpPr>
+        <p:spPr>
+          <a:xfrm>
+            <a:off x="1577076" y="0"/>
+            <a:ext cx="3951527" cy="1752599"/>
+          </a:xfrm>
+        </p:spPr>
+        <p:txBody>
+          <a:bodyPr/>
+          <a:lstStyle/>
+          <a:p>
+            <a:pPr algn="l"/>
+            <a:r>
+              <a:rPr lang="en-GB" b="1" dirty="0"/>
+              <a:t>Technical Details</a:t>
+            </a:r>
+          </a:p>
+        </p:txBody>
+      </p:sp>
+      <p:sp>
+        <p:nvSpPr>
+          <p:cNvPr id="3" name="Content Placeholder 2">
+            <a:extLst>
+              <a:ext uri="{FF2B5EF4-FFF2-40B4-BE49-F238E27FC236}">
+                <a16:creationId xmlns:a16="http://schemas.microsoft.com/office/drawing/2014/main" id="{88AB686B-F6E8-D97A-7FD9-4362B69EB914}"/>
+              </a:ext>
+            </a:extLst>
+          </p:cNvPr>
+          <p:cNvSpPr>
+            <a:spLocks noGrp="1"/>
+          </p:cNvSpPr>
+          <p:nvPr>
+            <p:ph idx="1"/>
+          </p:nvPr>
+        </p:nvSpPr>
+        <p:spPr>
+          <a:xfrm>
+            <a:off x="1964531" y="3342691"/>
+            <a:ext cx="2120581" cy="2408157"/>
+          </a:xfrm>
+        </p:spPr>
+        <p:txBody>
+          <a:bodyPr>
+            <a:normAutofit/>
+          </a:bodyPr>
+          <a:lstStyle/>
+          <a:p>
+            <a:r>
+              <a:rPr lang="en-GB" sz="2000" dirty="0"/>
+              <a:t>PHP</a:t>
+            </a:r>
+          </a:p>
+          <a:p>
+            <a:r>
+              <a:rPr lang="en-GB" sz="2000" dirty="0"/>
+              <a:t>HTML</a:t>
+            </a:r>
+          </a:p>
+          <a:p>
+            <a:r>
+              <a:rPr lang="en-GB" sz="2000" dirty="0"/>
+              <a:t>JavaScript</a:t>
+            </a:r>
+          </a:p>
+          <a:p>
+            <a:r>
+              <a:rPr lang="en-GB" sz="2000" dirty="0"/>
+              <a:t>UI Framework</a:t>
+            </a:r>
+          </a:p>
+          <a:p>
+            <a:r>
+              <a:rPr lang="en-GB" sz="2000" dirty="0"/>
+              <a:t>Bootstrap</a:t>
+            </a:r>
+          </a:p>
+        </p:txBody>
+      </p:sp>
+      <p:sp>
+        <p:nvSpPr>
+          <p:cNvPr id="4" name="TextBox 3">
+            <a:extLst>
+              <a:ext uri="{FF2B5EF4-FFF2-40B4-BE49-F238E27FC236}">
+                <a16:creationId xmlns:a16="http://schemas.microsoft.com/office/drawing/2014/main" id="{19F2F744-B3E0-D60E-DFCB-B5C8E6ECF287}"/>
+              </a:ext>
+            </a:extLst>
+          </p:cNvPr>
+          <p:cNvSpPr txBox="1"/>
+          <p:nvPr/>
+        </p:nvSpPr>
+        <p:spPr>
+          <a:xfrm>
+            <a:off x="7203303" y="2966822"/>
+            <a:ext cx="655949" cy="461665"/>
+          </a:xfrm>
+          <a:prstGeom prst="rect">
+            <a:avLst/>
+          </a:prstGeom>
+          <a:noFill/>
+        </p:spPr>
+        <p:txBody>
+          <a:bodyPr wrap="none" rtlCol="0">
+            <a:spAutoFit/>
+          </a:bodyPr>
+          <a:lstStyle/>
+          <a:p>
+            <a:r>
+              <a:rPr lang="en-GB" sz="2400" b="1" dirty="0"/>
+              <a:t>IDE</a:t>
+            </a:r>
+          </a:p>
+        </p:txBody>
+      </p:sp>
+      <p:sp>
+        <p:nvSpPr>
+          <p:cNvPr id="5" name="Content Placeholder 2">
+            <a:extLst>
+              <a:ext uri="{FF2B5EF4-FFF2-40B4-BE49-F238E27FC236}">
+                <a16:creationId xmlns:a16="http://schemas.microsoft.com/office/drawing/2014/main" id="{8A12F7A5-40F2-A68C-F4F8-430A1A5F04A0}"/>
+              </a:ext>
+            </a:extLst>
+          </p:cNvPr>
+          <p:cNvSpPr txBox="1">
+            <a:spLocks/>
+          </p:cNvSpPr>
+          <p:nvPr/>
+        </p:nvSpPr>
+        <p:spPr>
+          <a:xfrm>
+            <a:off x="7336285" y="3523805"/>
+            <a:ext cx="2900664" cy="503582"/>
+          </a:xfrm>
+          <a:prstGeom prst="rect">
+            <a:avLst/>
+          </a:prstGeom>
+        </p:spPr>
+        <p:txBody>
+          <a:bodyPr vert="horz" lIns="91440" tIns="45720" rIns="91440" bIns="45720" rtlCol="0" anchor="ctr">
+            <a:normAutofit/>
+          </a:bodyPr>
+          <a:lstStyle>
+            <a:lvl1pPr marL="285750" indent="-285750" algn="l" defTabSz="457200" rtl="0" eaLnBrk="1" latinLnBrk="0" hangingPunct="1">
+              <a:spcBef>
+                <a:spcPct val="20000"/>
+              </a:spcBef>
+              <a:spcAft>
+                <a:spcPts val="600"/>
+              </a:spcAft>
+              <a:buClr>
+                <a:schemeClr val="accent1">
+                  <a:lumMod val="75000"/>
+                </a:schemeClr>
+              </a:buClr>
+              <a:buSzPct val="145000"/>
+              <a:buFont typeface="Arial"/>
+              <a:buChar char="•"/>
+              <a:defRPr sz="2400" kern="1200" cap="none">
+                <a:solidFill>
+                  <a:schemeClr val="tx1"/>
+                </a:solidFill>
+                <a:effectLst/>
+                <a:latin typeface="+mn-lt"/>
+                <a:ea typeface="+mn-ea"/>
+                <a:cs typeface="+mn-cs"/>
+              </a:defRPr>
+            </a:lvl1pPr>
+            <a:lvl2pPr marL="742950" indent="-285750" algn="l" defTabSz="457200" rtl="0" eaLnBrk="1" latinLnBrk="0" hangingPunct="1">
+              <a:spcBef>
+                <a:spcPct val="20000"/>
+              </a:spcBef>
+              <a:spcAft>
+                <a:spcPts val="600"/>
+              </a:spcAft>
+              <a:buClr>
+                <a:schemeClr val="accent1">
+                  <a:lumMod val="75000"/>
+                </a:schemeClr>
+              </a:buClr>
+              <a:buSzPct val="145000"/>
+              <a:buFont typeface="Arial"/>
+              <a:buChar char="•"/>
+              <a:defRPr sz="2000" kern="1200" cap="none">
+                <a:solidFill>
+                  <a:schemeClr val="tx1"/>
+                </a:solidFill>
+                <a:effectLst/>
+                <a:latin typeface="+mn-lt"/>
+                <a:ea typeface="+mn-ea"/>
+                <a:cs typeface="+mn-cs"/>
+              </a:defRPr>
+            </a:lvl2pPr>
+            <a:lvl3pPr marL="1200150" indent="-285750" algn="l" defTabSz="457200" rtl="0" eaLnBrk="1" latinLnBrk="0" hangingPunct="1">
+              <a:spcBef>
+                <a:spcPct val="20000"/>
+              </a:spcBef>
+              <a:spcAft>
+                <a:spcPts val="600"/>
+              </a:spcAft>
+              <a:buClr>
+                <a:schemeClr val="accent1">
+                  <a:lumMod val="75000"/>
+                </a:schemeClr>
+              </a:buClr>
+              <a:buSzPct val="145000"/>
+              <a:buFont typeface="Arial"/>
+              <a:buChar char="•"/>
+              <a:defRPr sz="1800" kern="1200" cap="none">
+                <a:solidFill>
+                  <a:schemeClr val="tx1"/>
+                </a:solidFill>
+                <a:effectLst/>
+                <a:latin typeface="+mn-lt"/>
+                <a:ea typeface="+mn-ea"/>
+                <a:cs typeface="+mn-cs"/>
+              </a:defRPr>
+            </a:lvl3pPr>
+            <a:lvl4pPr marL="1543050" indent="-171450" algn="l" defTabSz="457200" rtl="0" eaLnBrk="1" latinLnBrk="0" hangingPunct="1">
+              <a:spcBef>
+                <a:spcPct val="20000"/>
+              </a:spcBef>
+              <a:spcAft>
+                <a:spcPts val="600"/>
+              </a:spcAft>
+              <a:buClr>
+                <a:schemeClr val="accent1">
+                  <a:lumMod val="75000"/>
+                </a:schemeClr>
+              </a:buClr>
+              <a:buSzPct val="145000"/>
+              <a:buFont typeface="Arial"/>
+              <a:buChar char="•"/>
+              <a:defRPr sz="1600" kern="1200" cap="none">
+                <a:solidFill>
+                  <a:schemeClr val="tx1"/>
+                </a:solidFill>
+                <a:effectLst/>
+                <a:latin typeface="+mn-lt"/>
+                <a:ea typeface="+mn-ea"/>
+                <a:cs typeface="+mn-cs"/>
+              </a:defRPr>
+            </a:lvl4pPr>
+            <a:lvl5pPr marL="2000250" indent="-171450" algn="l" defTabSz="457200" rtl="0" eaLnBrk="1" latinLnBrk="0" hangingPunct="1">
+              <a:spcBef>
+                <a:spcPct val="20000"/>
+              </a:spcBef>
+              <a:spcAft>
+                <a:spcPts val="600"/>
+              </a:spcAft>
+              <a:buClr>
+                <a:schemeClr val="accent1">
+                  <a:lumMod val="75000"/>
+                </a:schemeClr>
+              </a:buClr>
+              <a:buSzPct val="145000"/>
+              <a:buFont typeface="Arial"/>
+              <a:buChar char="•"/>
+              <a:defRPr sz="1400" kern="1200" cap="none">
+                <a:solidFill>
+                  <a:schemeClr val="tx1"/>
+                </a:solidFill>
+                <a:effectLst/>
+                <a:latin typeface="+mn-lt"/>
+                <a:ea typeface="+mn-ea"/>
+                <a:cs typeface="+mn-cs"/>
+              </a:defRPr>
+            </a:lvl5pPr>
+            <a:lvl6pPr marL="2514600" indent="-228600" algn="l" defTabSz="457200" rtl="0" eaLnBrk="1" latinLnBrk="0" hangingPunct="1">
+              <a:spcBef>
+                <a:spcPct val="20000"/>
+              </a:spcBef>
+              <a:spcAft>
+                <a:spcPts val="600"/>
+              </a:spcAft>
+              <a:buClr>
+                <a:schemeClr val="accent1">
+                  <a:lumMod val="75000"/>
+                </a:schemeClr>
+              </a:buClr>
+              <a:buSzPct val="145000"/>
+              <a:buFont typeface="Arial"/>
+              <a:buChar char="•"/>
+              <a:defRPr sz="1400" kern="1200" cap="none">
+                <a:solidFill>
+                  <a:schemeClr val="tx1"/>
+                </a:solidFill>
+                <a:effectLst/>
+                <a:latin typeface="+mn-lt"/>
+                <a:ea typeface="+mn-ea"/>
+                <a:cs typeface="+mn-cs"/>
+              </a:defRPr>
+            </a:lvl6pPr>
+            <a:lvl7pPr marL="2971800" indent="-228600" algn="l" defTabSz="457200" rtl="0" eaLnBrk="1" latinLnBrk="0" hangingPunct="1">
+              <a:spcBef>
+                <a:spcPct val="20000"/>
+              </a:spcBef>
+              <a:spcAft>
+                <a:spcPts val="600"/>
+              </a:spcAft>
+              <a:buClr>
+                <a:schemeClr val="accent1">
+                  <a:lumMod val="75000"/>
+                </a:schemeClr>
+              </a:buClr>
+              <a:buSzPct val="145000"/>
+              <a:buFont typeface="Arial"/>
+              <a:buChar char="•"/>
+              <a:defRPr sz="1400" kern="1200" cap="none">
+                <a:solidFill>
+                  <a:schemeClr val="tx1"/>
+                </a:solidFill>
+                <a:effectLst/>
+                <a:latin typeface="+mn-lt"/>
+                <a:ea typeface="+mn-ea"/>
+                <a:cs typeface="+mn-cs"/>
+              </a:defRPr>
+            </a:lvl7pPr>
+            <a:lvl8pPr marL="3429000" indent="-228600" algn="l" defTabSz="457200" rtl="0" eaLnBrk="1" latinLnBrk="0" hangingPunct="1">
+              <a:spcBef>
+                <a:spcPct val="20000"/>
+              </a:spcBef>
+              <a:spcAft>
+                <a:spcPts val="600"/>
+              </a:spcAft>
+              <a:buClr>
+                <a:schemeClr val="accent1">
+                  <a:lumMod val="75000"/>
+                </a:schemeClr>
+              </a:buClr>
+              <a:buSzPct val="145000"/>
+              <a:buFont typeface="Arial"/>
+              <a:buChar char="•"/>
+              <a:defRPr sz="1400" kern="1200" cap="none">
+                <a:solidFill>
+                  <a:schemeClr val="tx1"/>
+                </a:solidFill>
+                <a:effectLst/>
+                <a:latin typeface="+mn-lt"/>
+                <a:ea typeface="+mn-ea"/>
+                <a:cs typeface="+mn-cs"/>
+              </a:defRPr>
+            </a:lvl8pPr>
+            <a:lvl9pPr marL="3886200" indent="-228600" algn="l" defTabSz="457200" rtl="0" eaLnBrk="1" latinLnBrk="0" hangingPunct="1">
+              <a:spcBef>
+                <a:spcPct val="20000"/>
+              </a:spcBef>
+              <a:spcAft>
+                <a:spcPts val="600"/>
+              </a:spcAft>
+              <a:buClr>
+                <a:schemeClr val="accent1">
+                  <a:lumMod val="75000"/>
+                </a:schemeClr>
+              </a:buClr>
+              <a:buSzPct val="145000"/>
+              <a:buFont typeface="Arial"/>
+              <a:buChar char="•"/>
+              <a:defRPr sz="1400" kern="1200" cap="none">
+                <a:solidFill>
+                  <a:schemeClr val="tx1"/>
+                </a:solidFill>
+                <a:effectLst/>
+                <a:latin typeface="+mn-lt"/>
+                <a:ea typeface="+mn-ea"/>
+                <a:cs typeface="+mn-cs"/>
+              </a:defRPr>
+            </a:lvl9pPr>
+          </a:lstStyle>
+          <a:p>
+            <a:r>
+              <a:rPr lang="en-GB" sz="2000" dirty="0"/>
               <a:t>Visual Studio Code</a:t>
+            </a:r>
+          </a:p>
+        </p:txBody>
+      </p:sp>
+      <p:sp>
+        <p:nvSpPr>
+          <p:cNvPr id="6" name="TextBox 5">
+            <a:extLst>
+              <a:ext uri="{FF2B5EF4-FFF2-40B4-BE49-F238E27FC236}">
+                <a16:creationId xmlns:a16="http://schemas.microsoft.com/office/drawing/2014/main" id="{38264FD5-7081-943E-8A42-7ABCFB4D9969}"/>
+              </a:ext>
+            </a:extLst>
+          </p:cNvPr>
+          <p:cNvSpPr txBox="1"/>
+          <p:nvPr/>
+        </p:nvSpPr>
+        <p:spPr>
+          <a:xfrm>
+            <a:off x="7203303" y="4494872"/>
+            <a:ext cx="2881879" cy="461665"/>
+          </a:xfrm>
+          <a:prstGeom prst="rect">
+            <a:avLst/>
+          </a:prstGeom>
+          <a:noFill/>
+        </p:spPr>
+        <p:txBody>
+          <a:bodyPr wrap="none" rtlCol="0">
+            <a:spAutoFit/>
+          </a:bodyPr>
+          <a:lstStyle/>
+          <a:p>
+            <a:r>
+              <a:rPr lang="en-GB" sz="2400" b="1" dirty="0"/>
+              <a:t>Web Server Solution</a:t>
+            </a:r>
+          </a:p>
+        </p:txBody>
+      </p:sp>
+      <p:sp>
+        <p:nvSpPr>
+          <p:cNvPr id="7" name="Content Placeholder 2">
+            <a:extLst>
+              <a:ext uri="{FF2B5EF4-FFF2-40B4-BE49-F238E27FC236}">
+                <a16:creationId xmlns:a16="http://schemas.microsoft.com/office/drawing/2014/main" id="{F802A89D-EACE-6798-F60C-22C2FBCDC642}"/>
+              </a:ext>
+            </a:extLst>
+          </p:cNvPr>
+          <p:cNvSpPr txBox="1">
+            <a:spLocks/>
+          </p:cNvSpPr>
+          <p:nvPr/>
+        </p:nvSpPr>
+        <p:spPr>
+          <a:xfrm>
+            <a:off x="7411476" y="5061938"/>
+            <a:ext cx="2900664" cy="503582"/>
+          </a:xfrm>
+          <a:prstGeom prst="rect">
+            <a:avLst/>
+          </a:prstGeom>
+        </p:spPr>
+        <p:txBody>
+          <a:bodyPr vert="horz" lIns="91440" tIns="45720" rIns="91440" bIns="45720" rtlCol="0" anchor="ctr">
+            <a:normAutofit/>
+          </a:bodyPr>
+          <a:lstStyle>
+            <a:lvl1pPr marL="285750" indent="-285750" algn="l" defTabSz="457200" rtl="0" eaLnBrk="1" latinLnBrk="0" hangingPunct="1">
+              <a:spcBef>
+                <a:spcPct val="20000"/>
+              </a:spcBef>
+              <a:spcAft>
+                <a:spcPts val="600"/>
+              </a:spcAft>
+              <a:buClr>
+                <a:schemeClr val="accent1">
+                  <a:lumMod val="75000"/>
+                </a:schemeClr>
+              </a:buClr>
+              <a:buSzPct val="145000"/>
+              <a:buFont typeface="Arial"/>
+              <a:buChar char="•"/>
+              <a:defRPr sz="2400" kern="1200" cap="none">
+                <a:solidFill>
+                  <a:schemeClr val="tx1"/>
+                </a:solidFill>
+                <a:effectLst/>
+                <a:latin typeface="+mn-lt"/>
+                <a:ea typeface="+mn-ea"/>
+                <a:cs typeface="+mn-cs"/>
+              </a:defRPr>
+            </a:lvl1pPr>
+            <a:lvl2pPr marL="742950" indent="-285750" algn="l" defTabSz="457200" rtl="0" eaLnBrk="1" latinLnBrk="0" hangingPunct="1">
+              <a:spcBef>
+                <a:spcPct val="20000"/>
+              </a:spcBef>
+              <a:spcAft>
+                <a:spcPts val="600"/>
+              </a:spcAft>
+              <a:buClr>
+                <a:schemeClr val="accent1">
+                  <a:lumMod val="75000"/>
+                </a:schemeClr>
+              </a:buClr>
+              <a:buSzPct val="145000"/>
+              <a:buFont typeface="Arial"/>
+              <a:buChar char="•"/>
+              <a:defRPr sz="2000" kern="1200" cap="none">
+                <a:solidFill>
+                  <a:schemeClr val="tx1"/>
+                </a:solidFill>
+                <a:effectLst/>
+                <a:latin typeface="+mn-lt"/>
+                <a:ea typeface="+mn-ea"/>
+                <a:cs typeface="+mn-cs"/>
+              </a:defRPr>
+            </a:lvl2pPr>
+            <a:lvl3pPr marL="1200150" indent="-285750" algn="l" defTabSz="457200" rtl="0" eaLnBrk="1" latinLnBrk="0" hangingPunct="1">
+              <a:spcBef>
+                <a:spcPct val="20000"/>
+              </a:spcBef>
+              <a:spcAft>
+                <a:spcPts val="600"/>
+              </a:spcAft>
+              <a:buClr>
+                <a:schemeClr val="accent1">
+                  <a:lumMod val="75000"/>
+                </a:schemeClr>
+              </a:buClr>
+              <a:buSzPct val="145000"/>
+              <a:buFont typeface="Arial"/>
+              <a:buChar char="•"/>
+              <a:defRPr sz="1800" kern="1200" cap="none">
+                <a:solidFill>
+                  <a:schemeClr val="tx1"/>
+                </a:solidFill>
+                <a:effectLst/>
+                <a:latin typeface="+mn-lt"/>
+                <a:ea typeface="+mn-ea"/>
+                <a:cs typeface="+mn-cs"/>
+              </a:defRPr>
+            </a:lvl3pPr>
+            <a:lvl4pPr marL="1543050" indent="-171450" algn="l" defTabSz="457200" rtl="0" eaLnBrk="1" latinLnBrk="0" hangingPunct="1">
+              <a:spcBef>
+                <a:spcPct val="20000"/>
+              </a:spcBef>
+              <a:spcAft>
+                <a:spcPts val="600"/>
+              </a:spcAft>
+              <a:buClr>
+                <a:schemeClr val="accent1">
+                  <a:lumMod val="75000"/>
+                </a:schemeClr>
+              </a:buClr>
+              <a:buSzPct val="145000"/>
+              <a:buFont typeface="Arial"/>
+              <a:buChar char="•"/>
+              <a:defRPr sz="1600" kern="1200" cap="none">
+                <a:solidFill>
+                  <a:schemeClr val="tx1"/>
+                </a:solidFill>
+                <a:effectLst/>
+                <a:latin typeface="+mn-lt"/>
+                <a:ea typeface="+mn-ea"/>
+                <a:cs typeface="+mn-cs"/>
+              </a:defRPr>
+            </a:lvl4pPr>
+            <a:lvl5pPr marL="2000250" indent="-171450" algn="l" defTabSz="457200" rtl="0" eaLnBrk="1" latinLnBrk="0" hangingPunct="1">
+              <a:spcBef>
+                <a:spcPct val="20000"/>
+              </a:spcBef>
+              <a:spcAft>
+                <a:spcPts val="600"/>
+              </a:spcAft>
+              <a:buClr>
+                <a:schemeClr val="accent1">
+                  <a:lumMod val="75000"/>
+                </a:schemeClr>
+              </a:buClr>
+              <a:buSzPct val="145000"/>
+              <a:buFont typeface="Arial"/>
+              <a:buChar char="•"/>
+              <a:defRPr sz="1400" kern="1200" cap="none">
+                <a:solidFill>
+                  <a:schemeClr val="tx1"/>
+                </a:solidFill>
+                <a:effectLst/>
+                <a:latin typeface="+mn-lt"/>
+                <a:ea typeface="+mn-ea"/>
+                <a:cs typeface="+mn-cs"/>
+              </a:defRPr>
+            </a:lvl5pPr>
+            <a:lvl6pPr marL="2514600" indent="-228600" algn="l" defTabSz="457200" rtl="0" eaLnBrk="1" latinLnBrk="0" hangingPunct="1">
+              <a:spcBef>
+                <a:spcPct val="20000"/>
+              </a:spcBef>
+              <a:spcAft>
+                <a:spcPts val="600"/>
+              </a:spcAft>
+              <a:buClr>
+                <a:schemeClr val="accent1">
+                  <a:lumMod val="75000"/>
+                </a:schemeClr>
+              </a:buClr>
+              <a:buSzPct val="145000"/>
+              <a:buFont typeface="Arial"/>
+              <a:buChar char="•"/>
+              <a:defRPr sz="1400" kern="1200" cap="none">
+                <a:solidFill>
+                  <a:schemeClr val="tx1"/>
+                </a:solidFill>
+                <a:effectLst/>
+                <a:latin typeface="+mn-lt"/>
+                <a:ea typeface="+mn-ea"/>
+                <a:cs typeface="+mn-cs"/>
+              </a:defRPr>
+            </a:lvl6pPr>
+            <a:lvl7pPr marL="2971800" indent="-228600" algn="l" defTabSz="457200" rtl="0" eaLnBrk="1" latinLnBrk="0" hangingPunct="1">
+              <a:spcBef>
+                <a:spcPct val="20000"/>
+              </a:spcBef>
+              <a:spcAft>
+                <a:spcPts val="600"/>
+              </a:spcAft>
+              <a:buClr>
+                <a:schemeClr val="accent1">
+                  <a:lumMod val="75000"/>
+                </a:schemeClr>
+              </a:buClr>
+              <a:buSzPct val="145000"/>
+              <a:buFont typeface="Arial"/>
+              <a:buChar char="•"/>
+              <a:defRPr sz="1400" kern="1200" cap="none">
+                <a:solidFill>
+                  <a:schemeClr val="tx1"/>
+                </a:solidFill>
+                <a:effectLst/>
+                <a:latin typeface="+mn-lt"/>
+                <a:ea typeface="+mn-ea"/>
+                <a:cs typeface="+mn-cs"/>
+              </a:defRPr>
+            </a:lvl7pPr>
+            <a:lvl8pPr marL="3429000" indent="-228600" algn="l" defTabSz="457200" rtl="0" eaLnBrk="1" latinLnBrk="0" hangingPunct="1">
+              <a:spcBef>
+                <a:spcPct val="20000"/>
+              </a:spcBef>
+              <a:spcAft>
+                <a:spcPts val="600"/>
+              </a:spcAft>
+              <a:buClr>
+                <a:schemeClr val="accent1">
+                  <a:lumMod val="75000"/>
+                </a:schemeClr>
+              </a:buClr>
+              <a:buSzPct val="145000"/>
+              <a:buFont typeface="Arial"/>
+              <a:buChar char="•"/>
+              <a:defRPr sz="1400" kern="1200" cap="none">
+                <a:solidFill>
+                  <a:schemeClr val="tx1"/>
+                </a:solidFill>
+                <a:effectLst/>
+                <a:latin typeface="+mn-lt"/>
+                <a:ea typeface="+mn-ea"/>
+                <a:cs typeface="+mn-cs"/>
+              </a:defRPr>
+            </a:lvl8pPr>
+            <a:lvl9pPr marL="3886200" indent="-228600" algn="l" defTabSz="457200" rtl="0" eaLnBrk="1" latinLnBrk="0" hangingPunct="1">
+              <a:spcBef>
+                <a:spcPct val="20000"/>
+              </a:spcBef>
+              <a:spcAft>
+                <a:spcPts val="600"/>
+              </a:spcAft>
+              <a:buClr>
+                <a:schemeClr val="accent1">
+                  <a:lumMod val="75000"/>
+                </a:schemeClr>
+              </a:buClr>
+              <a:buSzPct val="145000"/>
+              <a:buFont typeface="Arial"/>
+              <a:buChar char="•"/>
+              <a:defRPr sz="1400" kern="1200" cap="none">
+                <a:solidFill>
+                  <a:schemeClr val="tx1"/>
+                </a:solidFill>
+                <a:effectLst/>
+                <a:latin typeface="+mn-lt"/>
+                <a:ea typeface="+mn-ea"/>
+                <a:cs typeface="+mn-cs"/>
+              </a:defRPr>
+            </a:lvl9pPr>
+          </a:lstStyle>
+          <a:p>
+            <a:r>
+              <a:rPr lang="en-GB" sz="2000" dirty="0"/>
+              <a:t>WAMPP</a:t>
+            </a:r>
+          </a:p>
+        </p:txBody>
+      </p:sp>
+      <p:sp>
+        <p:nvSpPr>
+          <p:cNvPr id="8" name="TextBox 7">
+            <a:extLst>
+              <a:ext uri="{FF2B5EF4-FFF2-40B4-BE49-F238E27FC236}">
+                <a16:creationId xmlns:a16="http://schemas.microsoft.com/office/drawing/2014/main" id="{85F116F3-FB97-EBE9-473F-305485125C15}"/>
+              </a:ext>
+            </a:extLst>
+          </p:cNvPr>
+          <p:cNvSpPr txBox="1"/>
+          <p:nvPr/>
+        </p:nvSpPr>
+        <p:spPr>
+          <a:xfrm>
+            <a:off x="1720675" y="3013312"/>
+            <a:ext cx="3539752" cy="461665"/>
+          </a:xfrm>
+          <a:prstGeom prst="rect">
+            <a:avLst/>
+          </a:prstGeom>
+          <a:noFill/>
+        </p:spPr>
+        <p:txBody>
+          <a:bodyPr wrap="none" rtlCol="0">
+            <a:spAutoFit/>
+          </a:bodyPr>
+          <a:lstStyle/>
+          <a:p>
+            <a:r>
+              <a:rPr lang="en-GB" sz="2400" b="1" dirty="0"/>
+              <a:t>Programming Languages</a:t>
+            </a:r>
+          </a:p>
+        </p:txBody>
+      </p:sp>
+      <p:sp>
+        <p:nvSpPr>
+          <p:cNvPr id="9" name="Content Placeholder 2">
+            <a:extLst>
+              <a:ext uri="{FF2B5EF4-FFF2-40B4-BE49-F238E27FC236}">
+                <a16:creationId xmlns:a16="http://schemas.microsoft.com/office/drawing/2014/main" id="{A9672B96-11B1-8959-BA97-62AB1B1BB79D}"/>
+              </a:ext>
+            </a:extLst>
+          </p:cNvPr>
+          <p:cNvSpPr txBox="1">
+            <a:spLocks/>
+          </p:cNvSpPr>
+          <p:nvPr/>
+        </p:nvSpPr>
+        <p:spPr>
+          <a:xfrm>
+            <a:off x="7411476" y="2143583"/>
+            <a:ext cx="1912557" cy="503582"/>
+          </a:xfrm>
+          <a:prstGeom prst="rect">
+            <a:avLst/>
+          </a:prstGeom>
+        </p:spPr>
+        <p:txBody>
+          <a:bodyPr vert="horz" lIns="91440" tIns="45720" rIns="91440" bIns="45720" rtlCol="0" anchor="ctr">
+            <a:normAutofit/>
+          </a:bodyPr>
+          <a:lstStyle>
+            <a:lvl1pPr marL="285750" indent="-285750" algn="l" defTabSz="457200" rtl="0" eaLnBrk="1" latinLnBrk="0" hangingPunct="1">
+              <a:spcBef>
+                <a:spcPct val="20000"/>
+              </a:spcBef>
+              <a:spcAft>
+                <a:spcPts val="600"/>
+              </a:spcAft>
+              <a:buClr>
+                <a:schemeClr val="accent1">
+                  <a:lumMod val="75000"/>
+                </a:schemeClr>
+              </a:buClr>
+              <a:buSzPct val="145000"/>
+              <a:buFont typeface="Arial"/>
+              <a:buChar char="•"/>
+              <a:defRPr sz="2400" kern="1200" cap="none">
+                <a:solidFill>
+                  <a:schemeClr val="tx1"/>
+                </a:solidFill>
+                <a:effectLst/>
+                <a:latin typeface="+mn-lt"/>
+                <a:ea typeface="+mn-ea"/>
+                <a:cs typeface="+mn-cs"/>
+              </a:defRPr>
+            </a:lvl1pPr>
+            <a:lvl2pPr marL="742950" indent="-285750" algn="l" defTabSz="457200" rtl="0" eaLnBrk="1" latinLnBrk="0" hangingPunct="1">
+              <a:spcBef>
+                <a:spcPct val="20000"/>
+              </a:spcBef>
+              <a:spcAft>
+                <a:spcPts val="600"/>
+              </a:spcAft>
+              <a:buClr>
+                <a:schemeClr val="accent1">
+                  <a:lumMod val="75000"/>
+                </a:schemeClr>
+              </a:buClr>
+              <a:buSzPct val="145000"/>
+              <a:buFont typeface="Arial"/>
+              <a:buChar char="•"/>
+              <a:defRPr sz="2000" kern="1200" cap="none">
+                <a:solidFill>
+                  <a:schemeClr val="tx1"/>
+                </a:solidFill>
+                <a:effectLst/>
+                <a:latin typeface="+mn-lt"/>
+                <a:ea typeface="+mn-ea"/>
+                <a:cs typeface="+mn-cs"/>
+              </a:defRPr>
+            </a:lvl2pPr>
+            <a:lvl3pPr marL="1200150" indent="-285750" algn="l" defTabSz="457200" rtl="0" eaLnBrk="1" latinLnBrk="0" hangingPunct="1">
+              <a:spcBef>
+                <a:spcPct val="20000"/>
+              </a:spcBef>
+              <a:spcAft>
+                <a:spcPts val="600"/>
+              </a:spcAft>
+              <a:buClr>
+                <a:schemeClr val="accent1">
+                  <a:lumMod val="75000"/>
+                </a:schemeClr>
+              </a:buClr>
+              <a:buSzPct val="145000"/>
+              <a:buFont typeface="Arial"/>
+              <a:buChar char="•"/>
+              <a:defRPr sz="1800" kern="1200" cap="none">
+                <a:solidFill>
+                  <a:schemeClr val="tx1"/>
+                </a:solidFill>
+                <a:effectLst/>
+                <a:latin typeface="+mn-lt"/>
+                <a:ea typeface="+mn-ea"/>
+                <a:cs typeface="+mn-cs"/>
+              </a:defRPr>
+            </a:lvl3pPr>
+            <a:lvl4pPr marL="1543050" indent="-171450" algn="l" defTabSz="457200" rtl="0" eaLnBrk="1" latinLnBrk="0" hangingPunct="1">
+              <a:spcBef>
+                <a:spcPct val="20000"/>
+              </a:spcBef>
+              <a:spcAft>
+                <a:spcPts val="600"/>
+              </a:spcAft>
+              <a:buClr>
+                <a:schemeClr val="accent1">
+                  <a:lumMod val="75000"/>
+                </a:schemeClr>
+              </a:buClr>
+              <a:buSzPct val="145000"/>
+              <a:buFont typeface="Arial"/>
+              <a:buChar char="•"/>
+              <a:defRPr sz="1600" kern="1200" cap="none">
+                <a:solidFill>
+                  <a:schemeClr val="tx1"/>
+                </a:solidFill>
+                <a:effectLst/>
+                <a:latin typeface="+mn-lt"/>
+                <a:ea typeface="+mn-ea"/>
+                <a:cs typeface="+mn-cs"/>
+              </a:defRPr>
+            </a:lvl4pPr>
+            <a:lvl5pPr marL="2000250" indent="-171450" algn="l" defTabSz="457200" rtl="0" eaLnBrk="1" latinLnBrk="0" hangingPunct="1">
+              <a:spcBef>
+                <a:spcPct val="20000"/>
+              </a:spcBef>
+              <a:spcAft>
+                <a:spcPts val="600"/>
+              </a:spcAft>
+              <a:buClr>
+                <a:schemeClr val="accent1">
+                  <a:lumMod val="75000"/>
+                </a:schemeClr>
+              </a:buClr>
+              <a:buSzPct val="145000"/>
+              <a:buFont typeface="Arial"/>
+              <a:buChar char="•"/>
+              <a:defRPr sz="1400" kern="1200" cap="none">
+                <a:solidFill>
+                  <a:schemeClr val="tx1"/>
+                </a:solidFill>
+                <a:effectLst/>
+                <a:latin typeface="+mn-lt"/>
+                <a:ea typeface="+mn-ea"/>
+                <a:cs typeface="+mn-cs"/>
+              </a:defRPr>
+            </a:lvl5pPr>
+            <a:lvl6pPr marL="2514600" indent="-228600" algn="l" defTabSz="457200" rtl="0" eaLnBrk="1" latinLnBrk="0" hangingPunct="1">
+              <a:spcBef>
+                <a:spcPct val="20000"/>
+              </a:spcBef>
+              <a:spcAft>
+                <a:spcPts val="600"/>
+              </a:spcAft>
+              <a:buClr>
+                <a:schemeClr val="accent1">
+                  <a:lumMod val="75000"/>
+                </a:schemeClr>
+              </a:buClr>
+              <a:buSzPct val="145000"/>
+              <a:buFont typeface="Arial"/>
+              <a:buChar char="•"/>
+              <a:defRPr sz="1400" kern="1200" cap="none">
+                <a:solidFill>
+                  <a:schemeClr val="tx1"/>
+                </a:solidFill>
+                <a:effectLst/>
+                <a:latin typeface="+mn-lt"/>
+                <a:ea typeface="+mn-ea"/>
+                <a:cs typeface="+mn-cs"/>
+              </a:defRPr>
+            </a:lvl6pPr>
+            <a:lvl7pPr marL="2971800" indent="-228600" algn="l" defTabSz="457200" rtl="0" eaLnBrk="1" latinLnBrk="0" hangingPunct="1">
+              <a:spcBef>
+                <a:spcPct val="20000"/>
+              </a:spcBef>
+              <a:spcAft>
+                <a:spcPts val="600"/>
+              </a:spcAft>
+              <a:buClr>
+                <a:schemeClr val="accent1">
+                  <a:lumMod val="75000"/>
+                </a:schemeClr>
+              </a:buClr>
+              <a:buSzPct val="145000"/>
+              <a:buFont typeface="Arial"/>
+              <a:buChar char="•"/>
+              <a:defRPr sz="1400" kern="1200" cap="none">
+                <a:solidFill>
+                  <a:schemeClr val="tx1"/>
+                </a:solidFill>
+                <a:effectLst/>
+                <a:latin typeface="+mn-lt"/>
+                <a:ea typeface="+mn-ea"/>
+                <a:cs typeface="+mn-cs"/>
+              </a:defRPr>
+            </a:lvl7pPr>
+            <a:lvl8pPr marL="3429000" indent="-228600" algn="l" defTabSz="457200" rtl="0" eaLnBrk="1" latinLnBrk="0" hangingPunct="1">
+              <a:spcBef>
+                <a:spcPct val="20000"/>
+              </a:spcBef>
+              <a:spcAft>
+                <a:spcPts val="600"/>
+              </a:spcAft>
+              <a:buClr>
+                <a:schemeClr val="accent1">
+                  <a:lumMod val="75000"/>
+                </a:schemeClr>
+              </a:buClr>
+              <a:buSzPct val="145000"/>
+              <a:buFont typeface="Arial"/>
+              <a:buChar char="•"/>
+              <a:defRPr sz="1400" kern="1200" cap="none">
+                <a:solidFill>
+                  <a:schemeClr val="tx1"/>
+                </a:solidFill>
+                <a:effectLst/>
+                <a:latin typeface="+mn-lt"/>
+                <a:ea typeface="+mn-ea"/>
+                <a:cs typeface="+mn-cs"/>
+              </a:defRPr>
+            </a:lvl8pPr>
+            <a:lvl9pPr marL="3886200" indent="-228600" algn="l" defTabSz="457200" rtl="0" eaLnBrk="1" latinLnBrk="0" hangingPunct="1">
+              <a:spcBef>
+                <a:spcPct val="20000"/>
+              </a:spcBef>
+              <a:spcAft>
+                <a:spcPts val="600"/>
+              </a:spcAft>
+              <a:buClr>
+                <a:schemeClr val="accent1">
+                  <a:lumMod val="75000"/>
+                </a:schemeClr>
+              </a:buClr>
+              <a:buSzPct val="145000"/>
+              <a:buFont typeface="Arial"/>
+              <a:buChar char="•"/>
+              <a:defRPr sz="1400" kern="1200" cap="none">
+                <a:solidFill>
+                  <a:schemeClr val="tx1"/>
+                </a:solidFill>
+                <a:effectLst/>
+                <a:latin typeface="+mn-lt"/>
+                <a:ea typeface="+mn-ea"/>
+                <a:cs typeface="+mn-cs"/>
+              </a:defRPr>
+            </a:lvl9pPr>
+          </a:lstStyle>
+          <a:p>
+            <a:r>
+              <a:rPr lang="en-GB" sz="2000" dirty="0"/>
+              <a:t>MySQL</a:t>
+            </a:r>
+          </a:p>
+        </p:txBody>
+      </p:sp>
+      <p:sp>
+        <p:nvSpPr>
+          <p:cNvPr id="10" name="TextBox 9">
+            <a:extLst>
+              <a:ext uri="{FF2B5EF4-FFF2-40B4-BE49-F238E27FC236}">
+                <a16:creationId xmlns:a16="http://schemas.microsoft.com/office/drawing/2014/main" id="{C3EADF07-96E9-2646-B146-8EB88CF54F9D}"/>
+              </a:ext>
+            </a:extLst>
+          </p:cNvPr>
+          <p:cNvSpPr txBox="1"/>
+          <p:nvPr/>
+        </p:nvSpPr>
+        <p:spPr>
+          <a:xfrm>
+            <a:off x="1720675" y="1628517"/>
+            <a:ext cx="1362874" cy="461665"/>
+          </a:xfrm>
+          <a:prstGeom prst="rect">
+            <a:avLst/>
+          </a:prstGeom>
+          <a:noFill/>
+        </p:spPr>
+        <p:txBody>
+          <a:bodyPr wrap="none" rtlCol="0">
+            <a:spAutoFit/>
+          </a:bodyPr>
+          <a:lstStyle/>
+          <a:p>
+            <a:r>
+              <a:rPr lang="en-GB" sz="2400" b="1" dirty="0"/>
+              <a:t>Platform</a:t>
+            </a:r>
+          </a:p>
+        </p:txBody>
+      </p:sp>
+      <p:sp>
+        <p:nvSpPr>
+          <p:cNvPr id="11" name="Content Placeholder 2">
+            <a:extLst>
+              <a:ext uri="{FF2B5EF4-FFF2-40B4-BE49-F238E27FC236}">
+                <a16:creationId xmlns:a16="http://schemas.microsoft.com/office/drawing/2014/main" id="{6DBEB9C8-B585-43E5-4B2C-9E04AAE42523}"/>
+              </a:ext>
+            </a:extLst>
+          </p:cNvPr>
+          <p:cNvSpPr txBox="1">
+            <a:spLocks/>
+          </p:cNvSpPr>
+          <p:nvPr/>
+        </p:nvSpPr>
+        <p:spPr>
+          <a:xfrm>
+            <a:off x="1964531" y="2131164"/>
+            <a:ext cx="3296622" cy="503582"/>
+          </a:xfrm>
+          <a:prstGeom prst="rect">
+            <a:avLst/>
+          </a:prstGeom>
+        </p:spPr>
+        <p:txBody>
+          <a:bodyPr vert="horz" lIns="91440" tIns="45720" rIns="91440" bIns="45720" rtlCol="0" anchor="ctr">
+            <a:normAutofit/>
+          </a:bodyPr>
+          <a:lstStyle>
+            <a:lvl1pPr marL="285750" indent="-285750" algn="l" defTabSz="457200" rtl="0" eaLnBrk="1" latinLnBrk="0" hangingPunct="1">
+              <a:spcBef>
+                <a:spcPct val="20000"/>
+              </a:spcBef>
+              <a:spcAft>
+                <a:spcPts val="600"/>
+              </a:spcAft>
+              <a:buClr>
+                <a:schemeClr val="accent1">
+                  <a:lumMod val="75000"/>
+                </a:schemeClr>
+              </a:buClr>
+              <a:buSzPct val="145000"/>
+              <a:buFont typeface="Arial"/>
+              <a:buChar char="•"/>
+              <a:defRPr sz="2400" kern="1200" cap="none">
+                <a:solidFill>
+                  <a:schemeClr val="tx1"/>
+                </a:solidFill>
+                <a:effectLst/>
+                <a:latin typeface="+mn-lt"/>
+                <a:ea typeface="+mn-ea"/>
+                <a:cs typeface="+mn-cs"/>
+              </a:defRPr>
+            </a:lvl1pPr>
+            <a:lvl2pPr marL="742950" indent="-285750" algn="l" defTabSz="457200" rtl="0" eaLnBrk="1" latinLnBrk="0" hangingPunct="1">
+              <a:spcBef>
+                <a:spcPct val="20000"/>
+              </a:spcBef>
+              <a:spcAft>
+                <a:spcPts val="600"/>
+              </a:spcAft>
+              <a:buClr>
+                <a:schemeClr val="accent1">
+                  <a:lumMod val="75000"/>
+                </a:schemeClr>
+              </a:buClr>
+              <a:buSzPct val="145000"/>
+              <a:buFont typeface="Arial"/>
+              <a:buChar char="•"/>
+              <a:defRPr sz="2000" kern="1200" cap="none">
+                <a:solidFill>
+                  <a:schemeClr val="tx1"/>
+                </a:solidFill>
+                <a:effectLst/>
+                <a:latin typeface="+mn-lt"/>
+                <a:ea typeface="+mn-ea"/>
+                <a:cs typeface="+mn-cs"/>
+              </a:defRPr>
+            </a:lvl2pPr>
+            <a:lvl3pPr marL="1200150" indent="-285750" algn="l" defTabSz="457200" rtl="0" eaLnBrk="1" latinLnBrk="0" hangingPunct="1">
+              <a:spcBef>
+                <a:spcPct val="20000"/>
+              </a:spcBef>
+              <a:spcAft>
+                <a:spcPts val="600"/>
+              </a:spcAft>
+              <a:buClr>
+                <a:schemeClr val="accent1">
+                  <a:lumMod val="75000"/>
+                </a:schemeClr>
+              </a:buClr>
+              <a:buSzPct val="145000"/>
+              <a:buFont typeface="Arial"/>
+              <a:buChar char="•"/>
+              <a:defRPr sz="1800" kern="1200" cap="none">
+                <a:solidFill>
+                  <a:schemeClr val="tx1"/>
+                </a:solidFill>
+                <a:effectLst/>
+                <a:latin typeface="+mn-lt"/>
+                <a:ea typeface="+mn-ea"/>
+                <a:cs typeface="+mn-cs"/>
+              </a:defRPr>
+            </a:lvl3pPr>
+            <a:lvl4pPr marL="1543050" indent="-171450" algn="l" defTabSz="457200" rtl="0" eaLnBrk="1" latinLnBrk="0" hangingPunct="1">
+              <a:spcBef>
+                <a:spcPct val="20000"/>
+              </a:spcBef>
+              <a:spcAft>
+                <a:spcPts val="600"/>
+              </a:spcAft>
+              <a:buClr>
+                <a:schemeClr val="accent1">
+                  <a:lumMod val="75000"/>
+                </a:schemeClr>
+              </a:buClr>
+              <a:buSzPct val="145000"/>
+              <a:buFont typeface="Arial"/>
+              <a:buChar char="•"/>
+              <a:defRPr sz="1600" kern="1200" cap="none">
+                <a:solidFill>
+                  <a:schemeClr val="tx1"/>
+                </a:solidFill>
+                <a:effectLst/>
+                <a:latin typeface="+mn-lt"/>
+                <a:ea typeface="+mn-ea"/>
+                <a:cs typeface="+mn-cs"/>
+              </a:defRPr>
+            </a:lvl4pPr>
+            <a:lvl5pPr marL="2000250" indent="-171450" algn="l" defTabSz="457200" rtl="0" eaLnBrk="1" latinLnBrk="0" hangingPunct="1">
+              <a:spcBef>
+                <a:spcPct val="20000"/>
+              </a:spcBef>
+              <a:spcAft>
+                <a:spcPts val="600"/>
+              </a:spcAft>
+              <a:buClr>
+                <a:schemeClr val="accent1">
+                  <a:lumMod val="75000"/>
+                </a:schemeClr>
+              </a:buClr>
+              <a:buSzPct val="145000"/>
+              <a:buFont typeface="Arial"/>
+              <a:buChar char="•"/>
+              <a:defRPr sz="1400" kern="1200" cap="none">
+                <a:solidFill>
+                  <a:schemeClr val="tx1"/>
+                </a:solidFill>
+                <a:effectLst/>
+                <a:latin typeface="+mn-lt"/>
+                <a:ea typeface="+mn-ea"/>
+                <a:cs typeface="+mn-cs"/>
+              </a:defRPr>
+            </a:lvl5pPr>
+            <a:lvl6pPr marL="2514600" indent="-228600" algn="l" defTabSz="457200" rtl="0" eaLnBrk="1" latinLnBrk="0" hangingPunct="1">
+              <a:spcBef>
+                <a:spcPct val="20000"/>
+              </a:spcBef>
+              <a:spcAft>
+                <a:spcPts val="600"/>
+              </a:spcAft>
+              <a:buClr>
+                <a:schemeClr val="accent1">
+                  <a:lumMod val="75000"/>
+                </a:schemeClr>
+              </a:buClr>
+              <a:buSzPct val="145000"/>
+              <a:buFont typeface="Arial"/>
+              <a:buChar char="•"/>
+              <a:defRPr sz="1400" kern="1200" cap="none">
+                <a:solidFill>
+                  <a:schemeClr val="tx1"/>
+                </a:solidFill>
+                <a:effectLst/>
+                <a:latin typeface="+mn-lt"/>
+                <a:ea typeface="+mn-ea"/>
+                <a:cs typeface="+mn-cs"/>
+              </a:defRPr>
+            </a:lvl6pPr>
+            <a:lvl7pPr marL="2971800" indent="-228600" algn="l" defTabSz="457200" rtl="0" eaLnBrk="1" latinLnBrk="0" hangingPunct="1">
+              <a:spcBef>
+                <a:spcPct val="20000"/>
+              </a:spcBef>
+              <a:spcAft>
+                <a:spcPts val="600"/>
+              </a:spcAft>
+              <a:buClr>
+                <a:schemeClr val="accent1">
+                  <a:lumMod val="75000"/>
+                </a:schemeClr>
+              </a:buClr>
+              <a:buSzPct val="145000"/>
+              <a:buFont typeface="Arial"/>
+              <a:buChar char="•"/>
+              <a:defRPr sz="1400" kern="1200" cap="none">
+                <a:solidFill>
+                  <a:schemeClr val="tx1"/>
+                </a:solidFill>
+                <a:effectLst/>
+                <a:latin typeface="+mn-lt"/>
+                <a:ea typeface="+mn-ea"/>
+                <a:cs typeface="+mn-cs"/>
+              </a:defRPr>
+            </a:lvl7pPr>
+            <a:lvl8pPr marL="3429000" indent="-228600" algn="l" defTabSz="457200" rtl="0" eaLnBrk="1" latinLnBrk="0" hangingPunct="1">
+              <a:spcBef>
+                <a:spcPct val="20000"/>
+              </a:spcBef>
+              <a:spcAft>
+                <a:spcPts val="600"/>
+              </a:spcAft>
+              <a:buClr>
+                <a:schemeClr val="accent1">
+                  <a:lumMod val="75000"/>
+                </a:schemeClr>
+              </a:buClr>
+              <a:buSzPct val="145000"/>
+              <a:buFont typeface="Arial"/>
+              <a:buChar char="•"/>
+              <a:defRPr sz="1400" kern="1200" cap="none">
+                <a:solidFill>
+                  <a:schemeClr val="tx1"/>
+                </a:solidFill>
+                <a:effectLst/>
+                <a:latin typeface="+mn-lt"/>
+                <a:ea typeface="+mn-ea"/>
+                <a:cs typeface="+mn-cs"/>
+              </a:defRPr>
+            </a:lvl8pPr>
+            <a:lvl9pPr marL="3886200" indent="-228600" algn="l" defTabSz="457200" rtl="0" eaLnBrk="1" latinLnBrk="0" hangingPunct="1">
+              <a:spcBef>
+                <a:spcPct val="20000"/>
+              </a:spcBef>
+              <a:spcAft>
+                <a:spcPts val="600"/>
+              </a:spcAft>
+              <a:buClr>
+                <a:schemeClr val="accent1">
+                  <a:lumMod val="75000"/>
+                </a:schemeClr>
+              </a:buClr>
+              <a:buSzPct val="145000"/>
+              <a:buFont typeface="Arial"/>
+              <a:buChar char="•"/>
+              <a:defRPr sz="1400" kern="1200" cap="none">
+                <a:solidFill>
+                  <a:schemeClr val="tx1"/>
+                </a:solidFill>
+                <a:effectLst/>
+                <a:latin typeface="+mn-lt"/>
+                <a:ea typeface="+mn-ea"/>
+                <a:cs typeface="+mn-cs"/>
+              </a:defRPr>
+            </a:lvl9pPr>
+          </a:lstStyle>
+          <a:p>
+            <a:r>
+              <a:rPr lang="en-GB" sz="2000" dirty="0"/>
+              <a:t>Web Application</a:t>
+            </a:r>
+          </a:p>
+        </p:txBody>
+      </p:sp>
+      <p:sp>
+        <p:nvSpPr>
+          <p:cNvPr id="12" name="TextBox 11">
+            <a:extLst>
+              <a:ext uri="{FF2B5EF4-FFF2-40B4-BE49-F238E27FC236}">
+                <a16:creationId xmlns:a16="http://schemas.microsoft.com/office/drawing/2014/main" id="{B66A75F6-CE30-4277-4991-1DBD1F118453}"/>
+              </a:ext>
+            </a:extLst>
+          </p:cNvPr>
+          <p:cNvSpPr txBox="1"/>
+          <p:nvPr/>
+        </p:nvSpPr>
+        <p:spPr>
+          <a:xfrm>
+            <a:off x="7203303" y="1628517"/>
+            <a:ext cx="1447832" cy="461665"/>
+          </a:xfrm>
+          <a:prstGeom prst="rect">
+            <a:avLst/>
+          </a:prstGeom>
+          <a:noFill/>
+        </p:spPr>
+        <p:txBody>
+          <a:bodyPr wrap="none" rtlCol="0">
+            <a:spAutoFit/>
+          </a:bodyPr>
+          <a:lstStyle/>
+          <a:p>
+            <a:r>
+              <a:rPr lang="en-GB" sz="2400" b="1" dirty="0"/>
+              <a:t>Database</a:t>
             </a:r>
           </a:p>
         </p:txBody>
@@ -22649,23 +24416,6 @@
 </file>
 
 <file path=customXml/item1.xml><?xml version="1.0" encoding="utf-8"?>
-<?mso-contentType ?>
-<FormTemplates xmlns="http://schemas.microsoft.com/sharepoint/v3/contenttype/forms">
-  <Display>DocumentLibraryForm</Display>
-  <Edit>DocumentLibraryForm</Edit>
-  <New>DocumentLibraryForm</New>
-</FormTemplates>
-</file>
-
-<file path=customXml/item2.xml><?xml version="1.0" encoding="utf-8"?>
-<p:properties xmlns:p="http://schemas.microsoft.com/office/2006/metadata/properties" xmlns:xsi="http://www.w3.org/2001/XMLSchema-instance" xmlns:pc="http://schemas.microsoft.com/office/infopath/2007/PartnerControls">
-  <documentManagement>
-    <MediaServiceKeyPoints xmlns="71af3243-3dd4-4a8d-8c0d-dd76da1f02a5" xsi:nil="true"/>
-  </documentManagement>
-</p:properties>
-</file>
-
-<file path=customXml/item3.xml><?xml version="1.0" encoding="utf-8"?>
 <ct:contentTypeSchema xmlns:ct="http://schemas.microsoft.com/office/2006/metadata/contentType" xmlns:ma="http://schemas.microsoft.com/office/2006/metadata/properties/metaAttributes" ct:_="" ma:_="" ma:contentTypeName="Document" ma:contentTypeID="0x01010079F111ED35F8CC479449609E8A0923A6" ma:contentTypeVersion="11" ma:contentTypeDescription="Create a new document." ma:contentTypeScope="" ma:versionID="9677210f24a1be23c92c90fd886aa0aa">
   <xsd:schema xmlns:xsd="http://www.w3.org/2001/XMLSchema" xmlns:xs="http://www.w3.org/2001/XMLSchema" xmlns:p="http://schemas.microsoft.com/office/2006/metadata/properties" xmlns:ns2="71af3243-3dd4-4a8d-8c0d-dd76da1f02a5" xmlns:ns3="16c05727-aa75-4e4a-9b5f-8a80a1165891" targetNamespace="http://schemas.microsoft.com/office/2006/metadata/properties" ma:root="true" ma:fieldsID="60e05723c5c1908df1a1a4ebf11d344e" ns2:_="" ns3:_="">
     <xsd:import namespace="71af3243-3dd4-4a8d-8c0d-dd76da1f02a5"/>
@@ -22876,25 +24626,24 @@
 </ct:contentTypeSchema>
 </file>
 
-<file path=customXml/itemProps1.xml><?xml version="1.0" encoding="utf-8"?>
-<ds:datastoreItem xmlns:ds="http://schemas.openxmlformats.org/officeDocument/2006/customXml" ds:itemID="{33315AA3-EAE3-44ED-8368-BAC2FFFB4817}">
-  <ds:schemaRefs>
-    <ds:schemaRef ds:uri="http://schemas.microsoft.com/sharepoint/v3/contenttype/forms"/>
-  </ds:schemaRefs>
-</ds:datastoreItem>
+<file path=customXml/item2.xml><?xml version="1.0" encoding="utf-8"?>
+<p:properties xmlns:p="http://schemas.microsoft.com/office/2006/metadata/properties" xmlns:xsi="http://www.w3.org/2001/XMLSchema-instance" xmlns:pc="http://schemas.microsoft.com/office/infopath/2007/PartnerControls">
+  <documentManagement>
+    <MediaServiceKeyPoints xmlns="71af3243-3dd4-4a8d-8c0d-dd76da1f02a5" xsi:nil="true"/>
+  </documentManagement>
+</p:properties>
 </file>
 
-<file path=customXml/itemProps2.xml><?xml version="1.0" encoding="utf-8"?>
-<ds:datastoreItem xmlns:ds="http://schemas.openxmlformats.org/officeDocument/2006/customXml" ds:itemID="{D7023227-530E-4024-91EF-312A851A758C}">
-  <ds:schemaRefs>
-    <ds:schemaRef ds:uri="http://schemas.microsoft.com/office/2006/metadata/properties"/>
-    <ds:schemaRef ds:uri="http://schemas.microsoft.com/office/infopath/2007/PartnerControls"/>
-    <ds:schemaRef ds:uri="71af3243-3dd4-4a8d-8c0d-dd76da1f02a5"/>
-  </ds:schemaRefs>
-</ds:datastoreItem>
+<file path=customXml/item3.xml><?xml version="1.0" encoding="utf-8"?>
+<?mso-contentType ?>
+<FormTemplates xmlns="http://schemas.microsoft.com/sharepoint/v3/contenttype/forms">
+  <Display>DocumentLibraryForm</Display>
+  <Edit>DocumentLibraryForm</Edit>
+  <New>DocumentLibraryForm</New>
+</FormTemplates>
 </file>
 
-<file path=customXml/itemProps3.xml><?xml version="1.0" encoding="utf-8"?>
+<file path=customXml/itemProps1.xml><?xml version="1.0" encoding="utf-8"?>
 <ds:datastoreItem xmlns:ds="http://schemas.openxmlformats.org/officeDocument/2006/customXml" ds:itemID="{627C19A7-3107-4CB2-BD0D-F7C79BE028CC}">
   <ds:schemaRefs>
     <ds:schemaRef ds:uri="http://schemas.microsoft.com/office/2006/metadata/contentType"/>
@@ -22911,4 +24660,22 @@
     <ds:schemaRef ds:uri="http://schemas.microsoft.com/internal/obd"/>
   </ds:schemaRefs>
 </ds:datastoreItem>
+</file>
+
+<file path=customXml/itemProps2.xml><?xml version="1.0" encoding="utf-8"?>
+<ds:datastoreItem xmlns:ds="http://schemas.openxmlformats.org/officeDocument/2006/customXml" ds:itemID="{D7023227-530E-4024-91EF-312A851A758C}">
+  <ds:schemaRefs>
+    <ds:schemaRef ds:uri="http://schemas.microsoft.com/office/2006/metadata/properties"/>
+    <ds:schemaRef ds:uri="http://schemas.microsoft.com/office/infopath/2007/PartnerControls"/>
+    <ds:schemaRef ds:uri="71af3243-3dd4-4a8d-8c0d-dd76da1f02a5"/>
+  </ds:schemaRefs>
+</ds:datastoreItem>
+</file>
+
+<file path=customXml/itemProps3.xml><?xml version="1.0" encoding="utf-8"?>
+<ds:datastoreItem xmlns:ds="http://schemas.openxmlformats.org/officeDocument/2006/customXml" ds:itemID="{33315AA3-EAE3-44ED-8368-BAC2FFFB4817}">
+  <ds:schemaRefs>
+    <ds:schemaRef ds:uri="http://schemas.microsoft.com/sharepoint/v3/contenttype/forms"/>
+  </ds:schemaRefs>
+</ds:datastoreItem>
 </file>
</xml_diff>